<commit_message>
Reworked our profile pictures, some review done
</commit_message>
<xml_diff>
--- a/Challenges_at_Marquardt.pptx
+++ b/Challenges_at_Marquardt.pptx
@@ -11559,113 +11559,6 @@
           </a:extLst>
         </p:spPr>
       </p:pic>
-      <p:pic>
-        <p:nvPicPr>
-          <p:cNvPr id="1030" name="Picture 6" descr="https://avatars.githubusercontent.com/u/2987157?v=4"/>
-          <p:cNvPicPr>
-            <a:picLocks noChangeAspect="1" noChangeArrowheads="1"/>
-          </p:cNvPicPr>
-          <p:nvPr/>
-        </p:nvPicPr>
-        <p:blipFill rotWithShape="1">
-          <a:blip r:embed="rId4" cstate="print">
-            <a:extLst>
-              <a:ext uri="{28A0092B-C50C-407E-A947-70E740481C1C}">
-                <a14:useLocalDpi xmlns:a14="http://schemas.microsoft.com/office/drawing/2010/main" val="0"/>
-              </a:ext>
-            </a:extLst>
-          </a:blip>
-          <a:srcRect l="14039" r="9654"/>
-          <a:stretch/>
-        </p:blipFill>
-        <p:spPr bwMode="auto">
-          <a:xfrm>
-            <a:off x="3993746" y="4965083"/>
-            <a:ext cx="685368" cy="855163"/>
-          </a:xfrm>
-          <a:prstGeom prst="rect">
-            <a:avLst/>
-          </a:prstGeom>
-          <a:noFill/>
-          <a:extLst>
-            <a:ext uri="{909E8E84-426E-40DD-AFC4-6F175D3DCCD1}">
-              <a14:hiddenFill xmlns:a14="http://schemas.microsoft.com/office/drawing/2010/main">
-                <a:solidFill>
-                  <a:srgbClr val="FFFFFF"/>
-                </a:solidFill>
-              </a14:hiddenFill>
-            </a:ext>
-          </a:extLst>
-        </p:spPr>
-      </p:pic>
-      <p:pic>
-        <p:nvPicPr>
-          <p:cNvPr id="1034" name="Picture 10" descr="https://avatars.githubusercontent.com/u/104486478?v=4"/>
-          <p:cNvPicPr>
-            <a:picLocks noChangeAspect="1" noChangeArrowheads="1"/>
-          </p:cNvPicPr>
-          <p:nvPr/>
-        </p:nvPicPr>
-        <p:blipFill rotWithShape="1">
-          <a:blip r:embed="rId5" cstate="print">
-            <a:extLst>
-              <a:ext uri="{28A0092B-C50C-407E-A947-70E740481C1C}">
-                <a14:useLocalDpi xmlns:a14="http://schemas.microsoft.com/office/drawing/2010/main" val="0"/>
-              </a:ext>
-            </a:extLst>
-          </a:blip>
-          <a:srcRect l="39850" t="12326" r="1"/>
-          <a:stretch/>
-        </p:blipFill>
-        <p:spPr bwMode="auto">
-          <a:xfrm>
-            <a:off x="6471046" y="4969863"/>
-            <a:ext cx="656705" cy="845605"/>
-          </a:xfrm>
-          <a:prstGeom prst="rect">
-            <a:avLst/>
-          </a:prstGeom>
-          <a:noFill/>
-          <a:extLst>
-            <a:ext uri="{909E8E84-426E-40DD-AFC4-6F175D3DCCD1}">
-              <a14:hiddenFill xmlns:a14="http://schemas.microsoft.com/office/drawing/2010/main">
-                <a:solidFill>
-                  <a:srgbClr val="FFFFFF"/>
-                </a:solidFill>
-              </a14:hiddenFill>
-            </a:ext>
-          </a:extLst>
-        </p:spPr>
-      </p:pic>
-      <p:pic>
-        <p:nvPicPr>
-          <p:cNvPr id="6" name="Picture 5"/>
-          <p:cNvPicPr>
-            <a:picLocks noChangeAspect="1"/>
-          </p:cNvPicPr>
-          <p:nvPr/>
-        </p:nvPicPr>
-        <p:blipFill rotWithShape="1">
-          <a:blip r:embed="rId6" cstate="print">
-            <a:extLst>
-              <a:ext uri="{28A0092B-C50C-407E-A947-70E740481C1C}">
-                <a14:useLocalDpi xmlns:a14="http://schemas.microsoft.com/office/drawing/2010/main" val="0"/>
-              </a:ext>
-            </a:extLst>
-          </a:blip>
-          <a:srcRect l="10995" t="1" r="5235" b="17188"/>
-          <a:stretch/>
-        </p:blipFill>
-        <p:spPr>
-          <a:xfrm>
-            <a:off x="2811028" y="4969863"/>
-            <a:ext cx="698270" cy="855163"/>
-          </a:xfrm>
-          <a:prstGeom prst="rect">
-            <a:avLst/>
-          </a:prstGeom>
-        </p:spPr>
-      </p:pic>
       <p:sp>
         <p:nvSpPr>
           <p:cNvPr id="11" name="Title 1"/>
@@ -12040,7 +11933,7 @@
               <a:rPr lang="en-US" sz="1000" b="1" cap="none" dirty="0" smtClean="0">
                 <a:latin typeface="+mn-lt"/>
               </a:rPr>
-              <a:t>Karsten </a:t>
+              <a:t>Karsten</a:t>
             </a:r>
             <a:r>
               <a:rPr lang="de-DE" sz="1000" b="1" cap="none" dirty="0" smtClean="0">
@@ -12613,11 +12506,14 @@
           </a:lstStyle>
           <a:p>
             <a:r>
-              <a:rPr lang="en-US" sz="1000" cap="none" dirty="0">
+              <a:rPr lang="en-US" sz="1000" cap="none" dirty="0" smtClean="0">
                 <a:latin typeface="+mn-lt"/>
               </a:rPr>
-              <a:t> Frank</a:t>
-            </a:r>
+              <a:t>Frank</a:t>
+            </a:r>
+            <a:endParaRPr lang="en-US" sz="1000" cap="none" dirty="0">
+              <a:latin typeface="+mn-lt"/>
+            </a:endParaRPr>
           </a:p>
           <a:p>
             <a:r>
@@ -12822,28 +12718,104 @@
       </p:sp>
       <p:pic>
         <p:nvPicPr>
-          <p:cNvPr id="14" name="Picture 13"/>
+          <p:cNvPr id="4" name="Picture 2" descr="https://avatars.githubusercontent.com/u/2987157?s=800"/>
+          <p:cNvPicPr>
+            <a:picLocks noChangeAspect="1" noChangeArrowheads="1"/>
+          </p:cNvPicPr>
+          <p:nvPr/>
+        </p:nvPicPr>
+        <p:blipFill>
+          <a:blip r:embed="rId4" cstate="print">
+            <a:extLst>
+              <a:ext uri="{28A0092B-C50C-407E-A947-70E740481C1C}">
+                <a14:useLocalDpi xmlns:a14="http://schemas.microsoft.com/office/drawing/2010/main" val="0"/>
+              </a:ext>
+            </a:extLst>
+          </a:blip>
+          <a:srcRect/>
+          <a:stretch>
+            <a:fillRect/>
+          </a:stretch>
+        </p:blipFill>
+        <p:spPr bwMode="auto">
+          <a:xfrm>
+            <a:off x="3866665" y="4821039"/>
+            <a:ext cx="1011878" cy="1011878"/>
+          </a:xfrm>
+          <a:prstGeom prst="rect">
+            <a:avLst/>
+          </a:prstGeom>
+          <a:noFill/>
+          <a:extLst>
+            <a:ext uri="{909E8E84-426E-40DD-AFC4-6F175D3DCCD1}">
+              <a14:hiddenFill xmlns:a14="http://schemas.microsoft.com/office/drawing/2010/main">
+                <a:solidFill>
+                  <a:srgbClr val="FFFFFF"/>
+                </a:solidFill>
+              </a14:hiddenFill>
+            </a:ext>
+          </a:extLst>
+        </p:spPr>
+      </p:pic>
+      <p:pic>
+        <p:nvPicPr>
+          <p:cNvPr id="1028" name="Picture 4" descr="https://avatars.githubusercontent.com/u/22344617?s=400"/>
+          <p:cNvPicPr>
+            <a:picLocks noChangeAspect="1" noChangeArrowheads="1"/>
+          </p:cNvPicPr>
+          <p:nvPr/>
+        </p:nvPicPr>
+        <p:blipFill>
+          <a:blip r:embed="rId5" cstate="print">
+            <a:extLst>
+              <a:ext uri="{28A0092B-C50C-407E-A947-70E740481C1C}">
+                <a14:useLocalDpi xmlns:a14="http://schemas.microsoft.com/office/drawing/2010/main" val="0"/>
+              </a:ext>
+            </a:extLst>
+          </a:blip>
+          <a:srcRect/>
+          <a:stretch>
+            <a:fillRect/>
+          </a:stretch>
+        </p:blipFill>
+        <p:spPr bwMode="auto">
+          <a:xfrm>
+            <a:off x="5059140" y="4821038"/>
+            <a:ext cx="1020119" cy="1020119"/>
+          </a:xfrm>
+          <a:prstGeom prst="rect">
+            <a:avLst/>
+          </a:prstGeom>
+          <a:noFill/>
+          <a:extLst>
+            <a:ext uri="{909E8E84-426E-40DD-AFC4-6F175D3DCCD1}">
+              <a14:hiddenFill xmlns:a14="http://schemas.microsoft.com/office/drawing/2010/main">
+                <a:solidFill>
+                  <a:srgbClr val="FFFFFF"/>
+                </a:solidFill>
+              </a14:hiddenFill>
+            </a:ext>
+          </a:extLst>
+        </p:spPr>
+      </p:pic>
+      <p:pic>
+        <p:nvPicPr>
+          <p:cNvPr id="5" name="Picture 4"/>
           <p:cNvPicPr>
             <a:picLocks noChangeAspect="1"/>
           </p:cNvPicPr>
           <p:nvPr/>
         </p:nvPicPr>
         <p:blipFill>
-          <a:blip r:embed="rId7">
-            <a:extLst>
-              <a:ext uri="{28A0092B-C50C-407E-A947-70E740481C1C}">
-                <a14:useLocalDpi xmlns:a14="http://schemas.microsoft.com/office/drawing/2010/main" val="0"/>
-              </a:ext>
-            </a:extLst>
-          </a:blip>
+          <a:blip r:embed="rId6"/>
           <a:stretch>
             <a:fillRect/>
           </a:stretch>
         </p:blipFill>
         <p:spPr>
           <a:xfrm>
-            <a:off x="7615454" y="4958887"/>
-            <a:ext cx="698107" cy="882271"/>
+            <a:off x="8617148" y="4821038"/>
+            <a:ext cx="1011879" cy="1011879"/>
           </a:xfrm>
           <a:prstGeom prst="rect">
             <a:avLst/>
@@ -12852,27 +12824,63 @@
       </p:pic>
       <p:pic>
         <p:nvPicPr>
-          <p:cNvPr id="20" name="Picture 19"/>
+          <p:cNvPr id="7" name="Picture 6" descr="https://media.licdn.com/dms/image/C4E03AQGb3AmvGrWleg/profile-displayphoto-shrink_800_800/0/1624690838505?e=1697673600&amp;v=beta&amp;t=E66W3YEPXzKuDnoJ-9T4goYNt0zoAAPCp7xmWRpLgcE"/>
           <p:cNvPicPr>
-            <a:picLocks noChangeAspect="1"/>
+            <a:picLocks noChangeAspect="1" noChangeArrowheads="1"/>
           </p:cNvPicPr>
           <p:nvPr/>
         </p:nvPicPr>
-        <p:blipFill rotWithShape="1">
-          <a:blip r:embed="rId8" cstate="print">
+        <p:blipFill>
+          <a:blip r:embed="rId7" cstate="print">
             <a:extLst>
               <a:ext uri="{28A0092B-C50C-407E-A947-70E740481C1C}">
                 <a14:useLocalDpi xmlns:a14="http://schemas.microsoft.com/office/drawing/2010/main" val="0"/>
               </a:ext>
             </a:extLst>
           </a:blip>
-          <a:srcRect l="8397" t="8373" r="22106"/>
-          <a:stretch/>
+          <a:srcRect/>
+          <a:stretch>
+            <a:fillRect/>
+          </a:stretch>
+        </p:blipFill>
+        <p:spPr bwMode="auto">
+          <a:xfrm>
+            <a:off x="13587257" y="11271528"/>
+            <a:ext cx="133295" cy="133295"/>
+          </a:xfrm>
+          <a:prstGeom prst="rect">
+            <a:avLst/>
+          </a:prstGeom>
+          <a:noFill/>
+          <a:extLst>
+            <a:ext uri="{909E8E84-426E-40DD-AFC4-6F175D3DCCD1}">
+              <a14:hiddenFill xmlns:a14="http://schemas.microsoft.com/office/drawing/2010/main">
+                <a:solidFill>
+                  <a:srgbClr val="FFFFFF"/>
+                </a:solidFill>
+              </a14:hiddenFill>
+            </a:ext>
+          </a:extLst>
+        </p:spPr>
+      </p:pic>
+      <p:pic>
+        <p:nvPicPr>
+          <p:cNvPr id="8" name="Picture 7"/>
+          <p:cNvPicPr>
+            <a:picLocks noChangeAspect="1"/>
+          </p:cNvPicPr>
+          <p:nvPr/>
+        </p:nvPicPr>
+        <p:blipFill>
+          <a:blip r:embed="rId8"/>
+          <a:stretch>
+            <a:fillRect/>
+          </a:stretch>
         </p:blipFill>
         <p:spPr>
           <a:xfrm>
-            <a:off x="8801264" y="4958887"/>
-            <a:ext cx="698107" cy="885403"/>
+            <a:off x="6259856" y="4821038"/>
+            <a:ext cx="1003988" cy="1003988"/>
           </a:xfrm>
           <a:prstGeom prst="rect">
             <a:avLst/>
@@ -12881,31 +12889,84 @@
       </p:pic>
       <p:pic>
         <p:nvPicPr>
-          <p:cNvPr id="21" name="Picture 20"/>
+          <p:cNvPr id="9" name="Picture 10" descr="https://media.licdn.com/dms/image/C4E03AQGb3AmvGrWleg/profile-displayphoto-shrink_800_800/0/1624690838505?e=1697673600&amp;v=beta&amp;t=E66W3YEPXzKuDnoJ-9T4goYNt0zoAAPCp7xmWRpLgcE"/>
           <p:cNvPicPr>
-            <a:picLocks noChangeAspect="1"/>
+            <a:picLocks noChangeAspect="1" noChangeArrowheads="1"/>
           </p:cNvPicPr>
           <p:nvPr/>
         </p:nvPicPr>
-        <p:blipFill rotWithShape="1">
-          <a:blip r:embed="rId9" cstate="print">
+        <p:blipFill>
+          <a:blip r:embed="rId9">
             <a:extLst>
               <a:ext uri="{28A0092B-C50C-407E-A947-70E740481C1C}">
                 <a14:useLocalDpi xmlns:a14="http://schemas.microsoft.com/office/drawing/2010/main" val="0"/>
               </a:ext>
             </a:extLst>
           </a:blip>
-          <a:srcRect l="12156" r="6428" b="6739"/>
-          <a:stretch/>
+          <a:srcRect/>
+          <a:stretch>
+            <a:fillRect/>
+          </a:stretch>
         </p:blipFill>
-        <p:spPr>
+        <p:spPr bwMode="auto">
           <a:xfrm>
-            <a:off x="5238578" y="4964374"/>
-            <a:ext cx="685368" cy="874431"/>
+            <a:off x="7444441" y="4821037"/>
+            <a:ext cx="992109" cy="992109"/>
           </a:xfrm>
           <a:prstGeom prst="rect">
             <a:avLst/>
           </a:prstGeom>
+          <a:noFill/>
+          <a:extLst>
+            <a:ext uri="{909E8E84-426E-40DD-AFC4-6F175D3DCCD1}">
+              <a14:hiddenFill xmlns:a14="http://schemas.microsoft.com/office/drawing/2010/main">
+                <a:solidFill>
+                  <a:srgbClr val="FFFFFF"/>
+                </a:solidFill>
+              </a14:hiddenFill>
+            </a:ext>
+          </a:extLst>
+        </p:spPr>
+      </p:pic>
+      <p:pic>
+        <p:nvPicPr>
+          <p:cNvPr id="1036" name="Picture 12" descr="https://media.licdn.com/dms/image/C5603AQGSe1V__FP4_A/profile-displayphoto-shrink_800_800/0/1639480194827?e=1697673600&amp;v=beta&amp;t=xI4_y9zBwGE9RqkQdZi3MI1TLq5kxTsv-GWXI7yLZdw"/>
+          <p:cNvPicPr>
+            <a:picLocks noChangeAspect="1" noChangeArrowheads="1"/>
+          </p:cNvPicPr>
+          <p:nvPr/>
+        </p:nvPicPr>
+        <p:blipFill>
+          <a:blip r:embed="rId10" cstate="print">
+            <a:extLst>
+              <a:ext uri="{28A0092B-C50C-407E-A947-70E740481C1C}">
+                <a14:useLocalDpi xmlns:a14="http://schemas.microsoft.com/office/drawing/2010/main" val="0"/>
+              </a:ext>
+            </a:extLst>
+          </a:blip>
+          <a:srcRect/>
+          <a:stretch>
+            <a:fillRect/>
+          </a:stretch>
+        </p:blipFill>
+        <p:spPr bwMode="auto">
+          <a:xfrm>
+            <a:off x="2675187" y="4814145"/>
+            <a:ext cx="1010881" cy="1010881"/>
+          </a:xfrm>
+          <a:prstGeom prst="rect">
+            <a:avLst/>
+          </a:prstGeom>
+          <a:noFill/>
+          <a:extLst>
+            <a:ext uri="{909E8E84-426E-40DD-AFC4-6F175D3DCCD1}">
+              <a14:hiddenFill xmlns:a14="http://schemas.microsoft.com/office/drawing/2010/main">
+                <a:solidFill>
+                  <a:srgbClr val="FFFFFF"/>
+                </a:solidFill>
+              </a14:hiddenFill>
+            </a:ext>
+          </a:extLst>
         </p:spPr>
       </p:pic>
     </p:spTree>
@@ -13046,10 +13107,10 @@
           <a:lstStyle/>
           <a:p>
             <a:r>
-              <a:rPr lang="de-DE" dirty="0" err="1" smtClean="0"/>
+              <a:rPr lang="en-US" dirty="0" smtClean="0"/>
               <a:t>Contact</a:t>
             </a:r>
-            <a:endParaRPr lang="de-DE" dirty="0"/>
+            <a:endParaRPr lang="en-US" dirty="0"/>
           </a:p>
         </p:txBody>
       </p:sp>
@@ -13106,7 +13167,7 @@
           <a:lstStyle/>
           <a:p>
             <a:r>
-              <a:rPr lang="de-DE" dirty="0"/>
+              <a:rPr lang="en-US" dirty="0" smtClean="0"/>
               <a:t>Agenda</a:t>
             </a:r>
             <a:endParaRPr lang="en-US" dirty="0"/>
@@ -13405,7 +13466,7 @@
               <a:defRPr/>
             </a:pPr>
             <a:r>
-              <a:rPr kumimoji="0" lang="de-DE" sz="2800" b="1" i="0" u="none" strike="noStrike" kern="1200" cap="none" spc="0" normalizeH="0" baseline="0" noProof="0" dirty="0" err="1" smtClean="0">
+              <a:rPr kumimoji="0" lang="en-US" sz="2800" b="1" i="0" u="none" strike="noStrike" kern="1200" cap="none" spc="0" normalizeH="0" baseline="0" dirty="0" smtClean="0">
                 <a:ln>
                   <a:noFill/>
                 </a:ln>
@@ -13421,7 +13482,7 @@
               </a:rPr>
               <a:t>Introduction</a:t>
             </a:r>
-            <a:endParaRPr kumimoji="0" lang="de-DE" sz="2400" b="1" i="0" u="none" strike="noStrike" kern="1200" cap="none" spc="0" normalizeH="0" baseline="0" noProof="0" dirty="0" smtClean="0">
+            <a:endParaRPr kumimoji="0" lang="en-US" sz="2400" b="1" i="0" u="none" strike="noStrike" kern="1200" cap="none" spc="0" normalizeH="0" baseline="0" dirty="0" smtClean="0">
               <a:ln>
                 <a:noFill/>
               </a:ln>
@@ -13457,7 +13518,7 @@
               <a:defRPr/>
             </a:pPr>
             <a:r>
-              <a:rPr kumimoji="0" lang="de-DE" sz="2400" b="0" i="0" u="none" strike="noStrike" kern="1200" cap="none" spc="0" normalizeH="0" baseline="0" noProof="0" dirty="0" smtClean="0">
+              <a:rPr kumimoji="0" lang="en-US" sz="2400" b="0" i="0" u="none" strike="noStrike" kern="1200" cap="none" spc="0" normalizeH="0" baseline="0" dirty="0" smtClean="0">
                 <a:ln>
                   <a:noFill/>
                 </a:ln>
@@ -13495,7 +13556,7 @@
               <a:defRPr/>
             </a:pPr>
             <a:r>
-              <a:rPr kumimoji="0" lang="de-DE" sz="2400" b="0" i="0" u="none" strike="noStrike" kern="1200" cap="none" spc="0" normalizeH="0" baseline="0" noProof="0" dirty="0" smtClean="0">
+              <a:rPr kumimoji="0" lang="en-US" sz="2400" b="0" i="0" u="none" strike="noStrike" kern="1200" cap="none" spc="0" normalizeH="0" baseline="0" dirty="0" smtClean="0">
                 <a:ln>
                   <a:noFill/>
                 </a:ln>
@@ -13509,118 +13570,16 @@
                 <a:ea typeface="+mn-ea"/>
                 <a:cs typeface="+mn-cs"/>
               </a:rPr>
-              <a:t>Who </a:t>
-            </a:r>
-            <a:r>
-              <a:rPr kumimoji="0" lang="de-DE" sz="2400" b="0" i="0" u="none" strike="noStrike" kern="1200" cap="none" spc="0" normalizeH="0" baseline="0" noProof="0" dirty="0" err="1" smtClean="0">
-                <a:ln>
-                  <a:noFill/>
-                </a:ln>
-                <a:solidFill>
-                  <a:srgbClr val="595959"/>
-                </a:solidFill>
-                <a:effectLst/>
-                <a:uLnTx/>
-                <a:uFillTx/>
-                <a:latin typeface="Franklin Gothic Book"/>
-                <a:ea typeface="+mn-ea"/>
-                <a:cs typeface="+mn-cs"/>
-              </a:rPr>
-              <a:t>are</a:t>
-            </a:r>
-            <a:r>
-              <a:rPr kumimoji="0" lang="de-DE" sz="2400" b="0" i="0" u="none" strike="noStrike" kern="1200" cap="none" spc="0" normalizeH="0" baseline="0" noProof="0" dirty="0" smtClean="0">
-                <a:ln>
-                  <a:noFill/>
-                </a:ln>
-                <a:solidFill>
-                  <a:srgbClr val="595959"/>
-                </a:solidFill>
-                <a:effectLst/>
-                <a:uLnTx/>
-                <a:uFillTx/>
-                <a:latin typeface="Franklin Gothic Book"/>
-                <a:ea typeface="+mn-ea"/>
-                <a:cs typeface="+mn-cs"/>
-              </a:rPr>
-              <a:t> (</a:t>
-            </a:r>
-            <a:r>
-              <a:rPr kumimoji="0" lang="de-DE" sz="2400" b="0" i="1" u="none" strike="noStrike" kern="1200" cap="none" spc="0" normalizeH="0" baseline="0" noProof="0" dirty="0" smtClean="0">
-                <a:ln>
-                  <a:noFill/>
-                </a:ln>
-                <a:solidFill>
-                  <a:srgbClr val="595959"/>
-                </a:solidFill>
-                <a:effectLst/>
-                <a:uLnTx/>
-                <a:uFillTx/>
-                <a:latin typeface="Franklin Gothic Book"/>
-                <a:ea typeface="+mn-ea"/>
-                <a:cs typeface="+mn-cs"/>
-              </a:rPr>
-              <a:t>Rhine-Main Team</a:t>
-            </a:r>
-            <a:r>
-              <a:rPr kumimoji="0" lang="de-DE" sz="2400" b="0" i="0" u="none" strike="noStrike" kern="1200" cap="none" spc="0" normalizeH="0" baseline="0" noProof="0" dirty="0" smtClean="0">
-                <a:ln>
-                  <a:noFill/>
-                </a:ln>
-                <a:solidFill>
-                  <a:srgbClr val="595959"/>
-                </a:solidFill>
-                <a:effectLst/>
-                <a:uLnTx/>
-                <a:uFillTx/>
-                <a:latin typeface="Franklin Gothic Book"/>
-                <a:ea typeface="+mn-ea"/>
-                <a:cs typeface="+mn-cs"/>
-              </a:rPr>
-              <a:t>) </a:t>
-            </a:r>
-            <a:r>
-              <a:rPr kumimoji="0" lang="de-DE" sz="2400" b="0" i="0" u="none" strike="noStrike" kern="1200" cap="none" spc="0" normalizeH="0" baseline="0" noProof="0" dirty="0" err="1" smtClean="0">
-                <a:ln>
-                  <a:noFill/>
-                </a:ln>
-                <a:solidFill>
-                  <a:srgbClr val="595959"/>
-                </a:solidFill>
-                <a:effectLst/>
-                <a:uLnTx/>
-                <a:uFillTx/>
-                <a:latin typeface="Franklin Gothic Book"/>
-                <a:ea typeface="+mn-ea"/>
-                <a:cs typeface="+mn-cs"/>
-              </a:rPr>
-              <a:t>we</a:t>
-            </a:r>
-            <a:r>
-              <a:rPr kumimoji="0" lang="de-DE" sz="2400" b="0" i="0" u="none" strike="noStrike" kern="1200" cap="none" spc="0" normalizeH="0" baseline="0" noProof="0" dirty="0" smtClean="0">
-                <a:ln>
-                  <a:noFill/>
-                </a:ln>
-                <a:solidFill>
-                  <a:srgbClr val="595959"/>
-                </a:solidFill>
-                <a:effectLst/>
-                <a:uLnTx/>
-                <a:uFillTx/>
-                <a:latin typeface="Franklin Gothic Book"/>
-                <a:ea typeface="+mn-ea"/>
-                <a:cs typeface="+mn-cs"/>
-              </a:rPr>
-              <a:t>?</a:t>
-            </a:r>
-          </a:p>
-          <a:p>
-            <a:pPr marL="412750" marR="0" lvl="0" indent="-412750" algn="l" defTabSz="914400" rtl="0" eaLnBrk="1" fontAlgn="base" latinLnBrk="0" hangingPunct="1">
+              <a:t>Who are we?</a:t>
+            </a:r>
+          </a:p>
+          <a:p>
+            <a:pPr marL="892175" marR="0" lvl="1" indent="-412750" algn="l" defTabSz="914400" rtl="0" eaLnBrk="1" fontAlgn="base" latinLnBrk="0" hangingPunct="1">
               <a:lnSpc>
                 <a:spcPct val="103000"/>
               </a:lnSpc>
               <a:spcBef>
-                <a:spcPts val="1000"/>
+                <a:spcPts val="500"/>
               </a:spcBef>
               <a:spcAft>
                 <a:spcPct val="0"/>
@@ -13634,75 +13593,7 @@
               <a:tabLst/>
               <a:defRPr/>
             </a:pPr>
-            <a:r>
-              <a:rPr kumimoji="0" lang="de-DE" sz="2800" b="1" i="0" u="none" strike="noStrike" kern="1200" cap="none" spc="0" normalizeH="0" baseline="0" noProof="0" dirty="0" smtClean="0">
-                <a:ln>
-                  <a:noFill/>
-                </a:ln>
-                <a:solidFill>
-                  <a:srgbClr val="595959"/>
-                </a:solidFill>
-                <a:effectLst/>
-                <a:uLnTx/>
-                <a:uFillTx/>
-                <a:latin typeface="Franklin Gothic Book"/>
-                <a:ea typeface="+mn-ea"/>
-                <a:cs typeface="+mn-cs"/>
-              </a:rPr>
-              <a:t>Topics </a:t>
-            </a:r>
-            <a:r>
-              <a:rPr kumimoji="0" lang="de-DE" sz="2800" b="1" i="0" u="none" strike="noStrike" kern="1200" cap="none" spc="0" normalizeH="0" baseline="0" noProof="0" dirty="0" err="1" smtClean="0">
-                <a:ln>
-                  <a:noFill/>
-                </a:ln>
-                <a:solidFill>
-                  <a:srgbClr val="595959"/>
-                </a:solidFill>
-                <a:effectLst/>
-                <a:uLnTx/>
-                <a:uFillTx/>
-                <a:latin typeface="Franklin Gothic Book"/>
-                <a:ea typeface="+mn-ea"/>
-                <a:cs typeface="+mn-cs"/>
-              </a:rPr>
-              <a:t>for</a:t>
-            </a:r>
-            <a:r>
-              <a:rPr kumimoji="0" lang="de-DE" sz="2800" b="1" i="0" u="none" strike="noStrike" kern="1200" cap="none" spc="0" normalizeH="0" baseline="0" noProof="0" dirty="0" smtClean="0">
-                <a:ln>
-                  <a:noFill/>
-                </a:ln>
-                <a:solidFill>
-                  <a:srgbClr val="595959"/>
-                </a:solidFill>
-                <a:effectLst/>
-                <a:uLnTx/>
-                <a:uFillTx/>
-                <a:latin typeface="Franklin Gothic Book"/>
-                <a:ea typeface="+mn-ea"/>
-                <a:cs typeface="+mn-cs"/>
-              </a:rPr>
-              <a:t> </a:t>
-            </a:r>
-            <a:r>
-              <a:rPr kumimoji="0" lang="de-DE" sz="2800" b="1" i="0" u="none" strike="noStrike" kern="1200" cap="none" spc="0" normalizeH="0" baseline="0" noProof="0" dirty="0" err="1" smtClean="0">
-                <a:ln>
-                  <a:noFill/>
-                </a:ln>
-                <a:solidFill>
-                  <a:srgbClr val="595959"/>
-                </a:solidFill>
-                <a:effectLst/>
-                <a:uLnTx/>
-                <a:uFillTx/>
-                <a:latin typeface="Franklin Gothic Book"/>
-                <a:ea typeface="+mn-ea"/>
-                <a:cs typeface="+mn-cs"/>
-              </a:rPr>
-              <a:t>discussion</a:t>
-            </a:r>
-            <a:endParaRPr kumimoji="0" lang="de-DE" sz="2800" b="1" i="0" u="none" strike="noStrike" kern="1200" cap="none" spc="0" normalizeH="0" baseline="0" noProof="0" dirty="0" smtClean="0">
+            <a:endParaRPr kumimoji="0" lang="en-US" sz="2400" b="0" i="0" u="none" strike="noStrike" kern="1200" cap="none" spc="0" normalizeH="0" baseline="0" dirty="0" smtClean="0">
               <a:ln>
                 <a:noFill/>
               </a:ln>
@@ -13718,12 +13609,12 @@
             </a:endParaRPr>
           </a:p>
           <a:p>
-            <a:pPr marL="892175" marR="0" lvl="1" indent="-412750" algn="l" defTabSz="914400" rtl="0" eaLnBrk="1" fontAlgn="base" latinLnBrk="0" hangingPunct="1">
+            <a:pPr marL="412750" marR="0" lvl="0" indent="-412750" algn="l" defTabSz="914400" rtl="0" eaLnBrk="1" fontAlgn="base" latinLnBrk="0" hangingPunct="1">
               <a:lnSpc>
                 <a:spcPct val="103000"/>
               </a:lnSpc>
               <a:spcBef>
-                <a:spcPts val="500"/>
+                <a:spcPts val="1000"/>
               </a:spcBef>
               <a:spcAft>
                 <a:spcPct val="0"/>
@@ -13738,7 +13629,7 @@
               <a:defRPr/>
             </a:pPr>
             <a:r>
-              <a:rPr kumimoji="0" lang="de-DE" sz="2400" b="0" i="0" u="none" strike="noStrike" kern="1200" cap="none" spc="0" normalizeH="0" baseline="0" noProof="0" dirty="0" err="1" smtClean="0">
+              <a:rPr kumimoji="0" lang="en-US" sz="2800" b="1" i="0" u="none" strike="noStrike" kern="1200" cap="none" spc="0" normalizeH="0" baseline="0" dirty="0" smtClean="0">
                 <a:ln>
                   <a:noFill/>
                 </a:ln>
@@ -13752,9 +13643,103 @@
                 <a:ea typeface="+mn-ea"/>
                 <a:cs typeface="+mn-cs"/>
               </a:rPr>
-              <a:t>Kconfig</a:t>
-            </a:r>
-            <a:endParaRPr kumimoji="0" lang="de-DE" sz="2400" b="0" i="0" u="none" strike="noStrike" kern="1200" cap="none" spc="0" normalizeH="0" baseline="0" noProof="0" dirty="0" smtClean="0">
+              <a:t>Challenges</a:t>
+            </a:r>
+          </a:p>
+          <a:p>
+            <a:pPr marL="892175" marR="0" lvl="1" indent="-412750" algn="l" defTabSz="914400" rtl="0" eaLnBrk="1" fontAlgn="base" latinLnBrk="0" hangingPunct="1">
+              <a:lnSpc>
+                <a:spcPct val="103000"/>
+              </a:lnSpc>
+              <a:spcBef>
+                <a:spcPts val="500"/>
+              </a:spcBef>
+              <a:spcAft>
+                <a:spcPct val="0"/>
+              </a:spcAft>
+              <a:buClr>
+                <a:srgbClr val="006470"/>
+              </a:buClr>
+              <a:buSzPct val="100000"/>
+              <a:buFont typeface="Arial" panose="020B0604020202020204" pitchFamily="34" charset="0"/>
+              <a:buChar char="•"/>
+              <a:tabLst/>
+              <a:defRPr/>
+            </a:pPr>
+            <a:r>
+              <a:rPr kumimoji="0" lang="en-US" sz="2400" b="0" i="0" u="none" strike="noStrike" kern="1200" cap="none" spc="0" normalizeH="0" baseline="0" dirty="0" smtClean="0">
+                <a:ln>
+                  <a:noFill/>
+                </a:ln>
+                <a:solidFill>
+                  <a:srgbClr val="595959"/>
+                </a:solidFill>
+                <a:effectLst/>
+                <a:uLnTx/>
+                <a:uFillTx/>
+                <a:latin typeface="Franklin Gothic Book"/>
+                <a:ea typeface="+mn-ea"/>
+                <a:cs typeface="+mn-cs"/>
+              </a:rPr>
+              <a:t>Variant Configuration</a:t>
+            </a:r>
+            <a:r>
+              <a:rPr kumimoji="0" lang="en-US" sz="2400" b="0" i="0" u="none" strike="noStrike" kern="1200" cap="none" spc="0" normalizeH="0" dirty="0" smtClean="0">
+                <a:ln>
+                  <a:noFill/>
+                </a:ln>
+                <a:solidFill>
+                  <a:srgbClr val="595959"/>
+                </a:solidFill>
+                <a:effectLst/>
+                <a:uLnTx/>
+                <a:uFillTx/>
+                <a:latin typeface="Franklin Gothic Book"/>
+                <a:ea typeface="+mn-ea"/>
+                <a:cs typeface="+mn-cs"/>
+              </a:rPr>
+              <a:t> with Kconfig</a:t>
+            </a:r>
+          </a:p>
+          <a:p>
+            <a:pPr marL="892175" marR="0" lvl="1" indent="-412750" algn="l" defTabSz="914400" rtl="0" eaLnBrk="1" fontAlgn="base" latinLnBrk="0" hangingPunct="1">
+              <a:lnSpc>
+                <a:spcPct val="103000"/>
+              </a:lnSpc>
+              <a:spcBef>
+                <a:spcPts val="500"/>
+              </a:spcBef>
+              <a:spcAft>
+                <a:spcPct val="0"/>
+              </a:spcAft>
+              <a:buClr>
+                <a:srgbClr val="006470"/>
+              </a:buClr>
+              <a:buSzPct val="100000"/>
+              <a:buFont typeface="Arial" panose="020B0604020202020204" pitchFamily="34" charset="0"/>
+              <a:buChar char="•"/>
+              <a:tabLst/>
+              <a:defRPr/>
+            </a:pPr>
+            <a:r>
+              <a:rPr lang="en-US" baseline="0" dirty="0" smtClean="0">
+                <a:solidFill>
+                  <a:srgbClr val="595959"/>
+                </a:solidFill>
+                <a:latin typeface="Franklin Gothic Book"/>
+              </a:rPr>
+              <a:t>Automotive</a:t>
+            </a:r>
+            <a:r>
+              <a:rPr lang="en-US" dirty="0" smtClean="0">
+                <a:solidFill>
+                  <a:srgbClr val="595959"/>
+                </a:solidFill>
+                <a:latin typeface="Franklin Gothic Book"/>
+              </a:rPr>
+              <a:t> SPICE</a:t>
+            </a:r>
+            <a:endParaRPr kumimoji="0" lang="en-US" sz="2400" b="0" i="0" u="none" strike="noStrike" kern="1200" cap="none" spc="0" normalizeH="0" baseline="0" dirty="0" smtClean="0">
               <a:ln>
                 <a:noFill/>
               </a:ln>
@@ -13790,7 +13775,7 @@
               <a:defRPr/>
             </a:pPr>
             <a:r>
-              <a:rPr kumimoji="0" lang="de-DE" sz="2400" b="0" i="0" u="none" strike="noStrike" kern="1200" cap="none" spc="0" normalizeH="0" baseline="0" noProof="0" dirty="0" err="1" smtClean="0">
+              <a:rPr kumimoji="0" lang="en-US" sz="2400" b="0" i="0" u="none" strike="noStrike" kern="1200" cap="none" spc="0" normalizeH="0" baseline="0" dirty="0" smtClean="0">
                 <a:ln>
                   <a:noFill/>
                 </a:ln>
@@ -13804,124 +13789,8 @@
                 <a:ea typeface="+mn-ea"/>
                 <a:cs typeface="+mn-cs"/>
               </a:rPr>
-              <a:t>Documentation</a:t>
-            </a:r>
-            <a:r>
-              <a:rPr kumimoji="0" lang="de-DE" sz="2400" b="0" i="0" u="none" strike="noStrike" kern="1200" cap="none" spc="0" normalizeH="0" baseline="0" noProof="0" dirty="0" smtClean="0">
-                <a:ln>
-                  <a:noFill/>
-                </a:ln>
-                <a:solidFill>
-                  <a:srgbClr val="595959"/>
-                </a:solidFill>
-                <a:effectLst/>
-                <a:uLnTx/>
-                <a:uFillTx/>
-                <a:latin typeface="Franklin Gothic Book"/>
-                <a:ea typeface="+mn-ea"/>
-                <a:cs typeface="+mn-cs"/>
-              </a:rPr>
-              <a:t>, </a:t>
-            </a:r>
-            <a:r>
-              <a:rPr kumimoji="0" lang="de-DE" sz="2400" b="0" i="0" u="none" strike="noStrike" kern="1200" cap="none" spc="0" normalizeH="0" baseline="0" noProof="0" dirty="0" err="1" smtClean="0">
-                <a:ln>
-                  <a:noFill/>
-                </a:ln>
-                <a:solidFill>
-                  <a:srgbClr val="595959"/>
-                </a:solidFill>
-                <a:effectLst/>
-                <a:uLnTx/>
-                <a:uFillTx/>
-                <a:latin typeface="Franklin Gothic Book"/>
-                <a:ea typeface="+mn-ea"/>
-                <a:cs typeface="+mn-cs"/>
-              </a:rPr>
-              <a:t>requirements</a:t>
-            </a:r>
-            <a:r>
-              <a:rPr kumimoji="0" lang="de-DE" sz="2400" b="0" i="0" u="none" strike="noStrike" kern="1200" cap="none" spc="0" normalizeH="0" baseline="0" noProof="0" dirty="0" smtClean="0">
-                <a:ln>
-                  <a:noFill/>
-                </a:ln>
-                <a:solidFill>
-                  <a:srgbClr val="595959"/>
-                </a:solidFill>
-                <a:effectLst/>
-                <a:uLnTx/>
-                <a:uFillTx/>
-                <a:latin typeface="Franklin Gothic Book"/>
-                <a:ea typeface="+mn-ea"/>
-                <a:cs typeface="+mn-cs"/>
-              </a:rPr>
-              <a:t>, </a:t>
-            </a:r>
-            <a:r>
-              <a:rPr kumimoji="0" lang="de-DE" sz="2400" b="0" i="0" u="none" strike="noStrike" kern="1200" cap="none" spc="0" normalizeH="0" baseline="0" noProof="0" dirty="0" err="1" smtClean="0">
-                <a:ln>
-                  <a:noFill/>
-                </a:ln>
-                <a:solidFill>
-                  <a:srgbClr val="595959"/>
-                </a:solidFill>
-                <a:effectLst/>
-                <a:uLnTx/>
-                <a:uFillTx/>
-                <a:latin typeface="Franklin Gothic Book"/>
-                <a:ea typeface="+mn-ea"/>
-                <a:cs typeface="+mn-cs"/>
-              </a:rPr>
-              <a:t>report</a:t>
-            </a:r>
-            <a:r>
-              <a:rPr kumimoji="0" lang="de-DE" sz="2400" b="0" i="0" u="none" strike="noStrike" kern="1200" cap="none" spc="0" normalizeH="0" baseline="0" noProof="0" dirty="0" smtClean="0">
-                <a:ln>
-                  <a:noFill/>
-                </a:ln>
-                <a:solidFill>
-                  <a:srgbClr val="595959"/>
-                </a:solidFill>
-                <a:effectLst/>
-                <a:uLnTx/>
-                <a:uFillTx/>
-                <a:latin typeface="Franklin Gothic Book"/>
-                <a:ea typeface="+mn-ea"/>
-                <a:cs typeface="+mn-cs"/>
-              </a:rPr>
-              <a:t>, </a:t>
-            </a:r>
-            <a:r>
-              <a:rPr kumimoji="0" lang="de-DE" sz="2400" b="0" i="0" u="none" strike="noStrike" kern="1200" cap="none" spc="0" normalizeH="0" baseline="0" noProof="0" dirty="0" err="1" smtClean="0">
-                <a:ln>
-                  <a:noFill/>
-                </a:ln>
-                <a:solidFill>
-                  <a:srgbClr val="595959"/>
-                </a:solidFill>
-                <a:effectLst/>
-                <a:uLnTx/>
-                <a:uFillTx/>
-                <a:latin typeface="Franklin Gothic Book"/>
-                <a:ea typeface="+mn-ea"/>
-                <a:cs typeface="+mn-cs"/>
-              </a:rPr>
-              <a:t>traceability</a:t>
-            </a:r>
-            <a:endParaRPr kumimoji="0" lang="de-DE" sz="2400" b="0" i="0" u="none" strike="noStrike" kern="1200" cap="none" spc="0" normalizeH="0" baseline="0" noProof="0" dirty="0" smtClean="0">
-              <a:ln>
-                <a:noFill/>
-              </a:ln>
-              <a:solidFill>
-                <a:srgbClr val="595959"/>
-              </a:solidFill>
-              <a:effectLst/>
-              <a:uLnTx/>
-              <a:uFillTx/>
-              <a:latin typeface="Franklin Gothic Book"/>
-              <a:ea typeface="+mn-ea"/>
-              <a:cs typeface="+mn-cs"/>
-            </a:endParaRPr>
+              <a:t>Organizational Challenges</a:t>
+            </a:r>
           </a:p>
           <a:p>
             <a:pPr marL="892175" marR="0" lvl="1" indent="-412750" algn="l" defTabSz="914400" rtl="0" eaLnBrk="1" fontAlgn="base" latinLnBrk="0" hangingPunct="1">
@@ -13944,57 +13813,15 @@
               <a:defRPr/>
             </a:pPr>
             <a:r>
-              <a:rPr kumimoji="0" lang="de-DE" sz="2400" b="0" i="0" u="none" strike="noStrike" kern="1200" cap="none" spc="0" normalizeH="0" baseline="0" noProof="0" dirty="0" err="1" smtClean="0">
-                <a:ln>
-                  <a:noFill/>
-                </a:ln>
+              <a:rPr lang="en-US" dirty="0" smtClean="0">
                 <a:solidFill>
                   <a:srgbClr val="595959"/>
                 </a:solidFill>
-                <a:effectLst/>
-                <a:uLnTx/>
-                <a:uFillTx/>
                 <a:latin typeface="Franklin Gothic Book"/>
-                <a:ea typeface="+mn-ea"/>
-                <a:cs typeface="+mn-cs"/>
               </a:rPr>
-              <a:t>Organizational</a:t>
-            </a:r>
-            <a:r>
-              <a:rPr kumimoji="0" lang="de-DE" sz="2400" b="0" i="0" u="none" strike="noStrike" kern="1200" cap="none" spc="0" normalizeH="0" baseline="0" noProof="0" dirty="0" smtClean="0">
-                <a:ln>
-                  <a:noFill/>
-                </a:ln>
-                <a:solidFill>
-                  <a:srgbClr val="595959"/>
-                </a:solidFill>
-                <a:effectLst/>
-                <a:uLnTx/>
-                <a:uFillTx/>
-                <a:latin typeface="Franklin Gothic Book"/>
-                <a:ea typeface="+mn-ea"/>
-                <a:cs typeface="+mn-cs"/>
-              </a:rPr>
-              <a:t> </a:t>
-            </a:r>
-            <a:r>
-              <a:rPr kumimoji="0" lang="de-DE" sz="2400" b="0" i="0" u="none" strike="noStrike" kern="1200" cap="none" spc="0" normalizeH="0" baseline="0" noProof="0" dirty="0" err="1" smtClean="0">
-                <a:ln>
-                  <a:noFill/>
-                </a:ln>
-                <a:solidFill>
-                  <a:srgbClr val="595959"/>
-                </a:solidFill>
-                <a:effectLst/>
-                <a:uLnTx/>
-                <a:uFillTx/>
-                <a:latin typeface="Franklin Gothic Book"/>
-                <a:ea typeface="+mn-ea"/>
-                <a:cs typeface="+mn-cs"/>
-              </a:rPr>
-              <a:t>challenges</a:t>
-            </a:r>
-            <a:endParaRPr kumimoji="0" lang="de-DE" sz="2400" b="0" i="0" u="none" strike="noStrike" kern="1200" cap="none" spc="0" normalizeH="0" baseline="0" noProof="0" dirty="0">
+              <a:t>Continuous Integration</a:t>
+            </a:r>
+            <a:endParaRPr kumimoji="0" lang="en-US" sz="2400" b="0" i="0" u="none" strike="noStrike" kern="1200" cap="none" spc="0" normalizeH="0" baseline="0" dirty="0">
               <a:ln>
                 <a:noFill/>
               </a:ln>
@@ -14064,10 +13891,10 @@
           <a:lstStyle/>
           <a:p>
             <a:r>
-              <a:rPr lang="de-DE" dirty="0" err="1" smtClean="0"/>
+              <a:rPr lang="en-US" dirty="0" smtClean="0"/>
               <a:t>Introduction</a:t>
             </a:r>
-            <a:endParaRPr lang="de-DE" dirty="0"/>
+            <a:endParaRPr lang="en-US" dirty="0"/>
           </a:p>
         </p:txBody>
       </p:sp>
@@ -14083,233 +13910,129 @@
         </p:nvSpPr>
         <p:spPr>
           <a:xfrm>
-            <a:off x="471237" y="1443037"/>
-            <a:ext cx="10941830" cy="5232400"/>
+            <a:off x="471237" y="1141111"/>
+            <a:ext cx="10941830" cy="5534326"/>
           </a:xfrm>
         </p:spPr>
         <p:txBody>
           <a:bodyPr>
-            <a:normAutofit fontScale="92500" lnSpcReduction="10000"/>
+            <a:normAutofit fontScale="92500"/>
           </a:bodyPr>
           <a:lstStyle/>
           <a:p>
-            <a:pPr fontAlgn="base"/>
-            <a:r>
-              <a:rPr lang="de-DE" sz="3000" dirty="0"/>
-              <a:t>Marquardt </a:t>
-            </a:r>
-            <a:r>
-              <a:rPr lang="de-DE" sz="3000" dirty="0" err="1"/>
-              <a:t>is</a:t>
-            </a:r>
-            <a:r>
-              <a:rPr lang="de-DE" sz="3000" dirty="0"/>
-              <a:t> </a:t>
-            </a:r>
-            <a:r>
-              <a:rPr lang="de-DE" sz="3000" dirty="0" smtClean="0"/>
-              <a:t>a </a:t>
-            </a:r>
-            <a:r>
-              <a:rPr lang="de-DE" sz="3000" dirty="0" err="1" smtClean="0"/>
-              <a:t>creative</a:t>
-            </a:r>
-            <a:r>
-              <a:rPr lang="de-DE" sz="3000" dirty="0" smtClean="0"/>
-              <a:t> </a:t>
-            </a:r>
-            <a:r>
-              <a:rPr lang="de-DE" sz="3000" dirty="0" err="1" smtClean="0"/>
-              <a:t>mechatronics</a:t>
-            </a:r>
-            <a:r>
-              <a:rPr lang="de-DE" sz="3000" dirty="0" smtClean="0"/>
-              <a:t> expert, </a:t>
-            </a:r>
-            <a:r>
-              <a:rPr lang="de-DE" sz="3000" dirty="0" err="1"/>
-              <a:t>founded</a:t>
-            </a:r>
-            <a:r>
-              <a:rPr lang="de-DE" sz="3000" dirty="0"/>
-              <a:t> in </a:t>
-            </a:r>
-            <a:r>
-              <a:rPr lang="de-DE" sz="3000" b="1" dirty="0" smtClean="0"/>
-              <a:t>1925</a:t>
-            </a:r>
-            <a:endParaRPr lang="de-DE" sz="3000" dirty="0"/>
-          </a:p>
-          <a:p>
-            <a:pPr fontAlgn="base"/>
-            <a:r>
-              <a:rPr lang="de-DE" sz="3000" dirty="0"/>
-              <a:t>W</a:t>
-            </a:r>
-            <a:r>
-              <a:rPr lang="de-DE" sz="3000" dirty="0" smtClean="0"/>
-              <a:t>orldwide </a:t>
-            </a:r>
-            <a:r>
-              <a:rPr lang="de-DE" sz="3000" dirty="0"/>
-              <a:t>on </a:t>
-            </a:r>
-            <a:r>
-              <a:rPr lang="de-DE" sz="3000" dirty="0" err="1"/>
-              <a:t>site</a:t>
-            </a:r>
-            <a:r>
-              <a:rPr lang="de-DE" sz="3000" dirty="0"/>
-              <a:t> </a:t>
-            </a:r>
-            <a:r>
-              <a:rPr lang="de-DE" sz="3000" dirty="0" err="1"/>
-              <a:t>with</a:t>
-            </a:r>
-            <a:r>
-              <a:rPr lang="de-DE" sz="3000" dirty="0"/>
-              <a:t> </a:t>
-            </a:r>
-            <a:r>
-              <a:rPr lang="de-DE" sz="3000" b="1" dirty="0"/>
-              <a:t>22</a:t>
-            </a:r>
-            <a:r>
-              <a:rPr lang="de-DE" sz="3000" dirty="0"/>
-              <a:t> </a:t>
-            </a:r>
-            <a:r>
-              <a:rPr lang="de-DE" sz="3000" dirty="0" err="1"/>
-              <a:t>locations</a:t>
-            </a:r>
-            <a:r>
-              <a:rPr lang="de-DE" sz="3000" dirty="0"/>
-              <a:t> </a:t>
-            </a:r>
-            <a:r>
-              <a:rPr lang="de-DE" sz="3000" dirty="0" err="1"/>
-              <a:t>and</a:t>
-            </a:r>
-            <a:r>
-              <a:rPr lang="de-DE" sz="3000" dirty="0"/>
-              <a:t> </a:t>
-            </a:r>
-            <a:r>
-              <a:rPr lang="en-US" sz="3000" b="1" dirty="0"/>
-              <a:t>11,000</a:t>
-            </a:r>
-            <a:r>
-              <a:rPr lang="en-US" sz="3000" dirty="0"/>
-              <a:t> employees</a:t>
-            </a:r>
-            <a:endParaRPr lang="de-DE" sz="3000" dirty="0"/>
-          </a:p>
-          <a:p>
-            <a:pPr lvl="1" fontAlgn="base"/>
+            <a:r>
+              <a:rPr lang="en-US" sz="3300" dirty="0"/>
+              <a:t>Marquardt is a creative mechatronics expert, founded in 1925</a:t>
+            </a:r>
+          </a:p>
+          <a:p>
+            <a:r>
+              <a:rPr lang="en-US" sz="3300" dirty="0"/>
+              <a:t>Worldwide on site with 22 locations and 11,000 employees</a:t>
+            </a:r>
+          </a:p>
+          <a:p>
+            <a:pPr lvl="1"/>
             <a:r>
               <a:rPr lang="en-US" sz="2200" dirty="0"/>
               <a:t>Germany</a:t>
             </a:r>
-            <a:endParaRPr lang="de-DE" sz="2200" dirty="0"/>
-          </a:p>
-          <a:p>
-            <a:pPr lvl="1" fontAlgn="base"/>
+          </a:p>
+          <a:p>
+            <a:pPr lvl="1"/>
             <a:r>
               <a:rPr lang="en-US" sz="2200" dirty="0"/>
               <a:t>France</a:t>
             </a:r>
-            <a:endParaRPr lang="de-DE" sz="2200" dirty="0"/>
-          </a:p>
-          <a:p>
-            <a:pPr lvl="1" fontAlgn="base"/>
+          </a:p>
+          <a:p>
+            <a:pPr lvl="1"/>
             <a:r>
               <a:rPr lang="en-US" sz="2200" dirty="0"/>
               <a:t>Italy</a:t>
             </a:r>
-            <a:endParaRPr lang="de-DE" sz="2200" dirty="0"/>
-          </a:p>
-          <a:p>
-            <a:pPr lvl="1" fontAlgn="base"/>
+          </a:p>
+          <a:p>
+            <a:pPr lvl="1"/>
             <a:r>
               <a:rPr lang="en-US" sz="2200" dirty="0"/>
               <a:t>Great Britain</a:t>
             </a:r>
-            <a:endParaRPr lang="de-DE" sz="2200" dirty="0"/>
-          </a:p>
-          <a:p>
-            <a:pPr lvl="1" fontAlgn="base"/>
+          </a:p>
+          <a:p>
+            <a:pPr lvl="1"/>
             <a:r>
               <a:rPr lang="en-US" sz="2200" dirty="0"/>
               <a:t>North Macedonia</a:t>
             </a:r>
-            <a:endParaRPr lang="de-DE" sz="2200" dirty="0"/>
-          </a:p>
-          <a:p>
-            <a:pPr lvl="1" fontAlgn="base"/>
+          </a:p>
+          <a:p>
+            <a:pPr lvl="1"/>
             <a:r>
               <a:rPr lang="en-US" sz="2200" dirty="0"/>
               <a:t>Romania</a:t>
             </a:r>
-            <a:endParaRPr lang="de-DE" sz="2200" dirty="0"/>
-          </a:p>
-          <a:p>
-            <a:pPr lvl="1" fontAlgn="base"/>
+          </a:p>
+          <a:p>
+            <a:pPr lvl="1"/>
             <a:r>
               <a:rPr lang="en-US" sz="2200" dirty="0"/>
               <a:t>USA</a:t>
             </a:r>
-            <a:endParaRPr lang="de-DE" sz="2200" dirty="0"/>
-          </a:p>
-          <a:p>
-            <a:pPr lvl="1" fontAlgn="base"/>
+          </a:p>
+          <a:p>
+            <a:pPr lvl="1"/>
             <a:r>
               <a:rPr lang="en-US" sz="2200" dirty="0"/>
               <a:t>Mexico</a:t>
             </a:r>
-            <a:endParaRPr lang="de-DE" sz="2200" dirty="0"/>
-          </a:p>
-          <a:p>
-            <a:pPr lvl="1" fontAlgn="base"/>
+          </a:p>
+          <a:p>
+            <a:pPr lvl="1"/>
             <a:r>
               <a:rPr lang="en-US" sz="2200" dirty="0"/>
               <a:t>China</a:t>
             </a:r>
-            <a:endParaRPr lang="de-DE" sz="2200" dirty="0"/>
-          </a:p>
-          <a:p>
-            <a:pPr lvl="1" fontAlgn="base"/>
+          </a:p>
+          <a:p>
+            <a:pPr lvl="1"/>
             <a:r>
               <a:rPr lang="en-US" sz="2200" dirty="0"/>
               <a:t>India</a:t>
             </a:r>
-            <a:endParaRPr lang="de-DE" sz="2200" dirty="0"/>
-          </a:p>
-          <a:p>
-            <a:pPr lvl="1" fontAlgn="base"/>
+          </a:p>
+          <a:p>
+            <a:pPr lvl="1"/>
             <a:r>
               <a:rPr lang="en-US" sz="2200" dirty="0"/>
               <a:t>South Korea</a:t>
             </a:r>
-            <a:endParaRPr lang="de-DE" sz="2200" dirty="0"/>
-          </a:p>
-          <a:p>
-            <a:pPr lvl="1" fontAlgn="base"/>
+          </a:p>
+          <a:p>
+            <a:pPr lvl="1"/>
             <a:r>
               <a:rPr lang="en-US" sz="2200" dirty="0"/>
               <a:t>Japan</a:t>
             </a:r>
-            <a:endParaRPr lang="de-DE" sz="2200" dirty="0"/>
-          </a:p>
-          <a:p>
-            <a:pPr lvl="1" fontAlgn="base"/>
+          </a:p>
+          <a:p>
+            <a:pPr lvl="1"/>
             <a:r>
               <a:rPr lang="en-US" sz="2200" dirty="0"/>
               <a:t>Africa</a:t>
             </a:r>
-            <a:endParaRPr lang="de-DE" sz="2200" dirty="0"/>
-          </a:p>
-          <a:p>
-            <a:endParaRPr lang="de-DE" dirty="0"/>
+          </a:p>
+          <a:p>
+            <a:pPr marL="0" indent="0">
+              <a:buNone/>
+            </a:pPr>
+            <a:endParaRPr lang="en-US" dirty="0"/>
+          </a:p>
+          <a:p>
+            <a:pPr marL="0" indent="0">
+              <a:buNone/>
+            </a:pPr>
+            <a:endParaRPr lang="en-US" dirty="0"/>
           </a:p>
         </p:txBody>
       </p:sp>
@@ -14485,7 +14208,7 @@
         </p:nvSpPr>
         <p:spPr>
           <a:xfrm>
-            <a:off x="341139" y="3518152"/>
+            <a:off x="205113" y="3291442"/>
             <a:ext cx="2923459" cy="319665"/>
           </a:xfrm>
           <a:prstGeom prst="rect">
@@ -14666,18 +14389,18 @@
               <a:buNone/>
             </a:pPr>
             <a:r>
-              <a:rPr lang="de-DE" sz="1800" dirty="0" smtClean="0"/>
+              <a:rPr lang="en-US" sz="1800" dirty="0" smtClean="0"/>
               <a:t>Operating </a:t>
             </a:r>
             <a:r>
-              <a:rPr lang="de-DE" sz="1800" dirty="0" err="1" smtClean="0"/>
-              <a:t>components</a:t>
-            </a:r>
-            <a:r>
-              <a:rPr lang="de-DE" sz="1800" dirty="0" smtClean="0"/>
-              <a:t> (HMI)</a:t>
-            </a:r>
-            <a:endParaRPr lang="de-DE" sz="1800" dirty="0"/>
+              <a:rPr lang="en-US" sz="1800" dirty="0" smtClean="0"/>
+              <a:t>C</a:t>
+            </a:r>
+            <a:r>
+              <a:rPr lang="en-US" sz="1800" dirty="0" smtClean="0"/>
+              <a:t>omponents (HMI)</a:t>
+            </a:r>
+            <a:endParaRPr lang="en-US" sz="1800" dirty="0"/>
           </a:p>
         </p:txBody>
       </p:sp>
@@ -14704,7 +14427,7 @@
         </p:blipFill>
         <p:spPr bwMode="auto">
           <a:xfrm>
-            <a:off x="419283" y="1640429"/>
+            <a:off x="283256" y="1292748"/>
             <a:ext cx="2767172" cy="1752542"/>
           </a:xfrm>
           <a:prstGeom prst="rect">
@@ -14745,7 +14468,7 @@
         </p:blipFill>
         <p:spPr bwMode="auto">
           <a:xfrm>
-            <a:off x="3396208" y="1640429"/>
+            <a:off x="3260181" y="1292748"/>
             <a:ext cx="2768131" cy="1752542"/>
           </a:xfrm>
           <a:prstGeom prst="rect">
@@ -14786,7 +14509,7 @@
         </p:blipFill>
         <p:spPr bwMode="auto">
           <a:xfrm>
-            <a:off x="6386648" y="1640429"/>
+            <a:off x="6250621" y="1292748"/>
             <a:ext cx="2768131" cy="1753150"/>
           </a:xfrm>
           <a:prstGeom prst="rect">
@@ -14827,7 +14550,7 @@
         </p:blipFill>
         <p:spPr bwMode="auto">
           <a:xfrm>
-            <a:off x="419283" y="3968742"/>
+            <a:off x="283256" y="4172782"/>
             <a:ext cx="2768131" cy="1753149"/>
           </a:xfrm>
           <a:prstGeom prst="rect">
@@ -14868,7 +14591,7 @@
         </p:blipFill>
         <p:spPr bwMode="auto">
           <a:xfrm>
-            <a:off x="3396208" y="3960778"/>
+            <a:off x="3260181" y="4164818"/>
             <a:ext cx="2768131" cy="1753579"/>
           </a:xfrm>
           <a:prstGeom prst="rect">
@@ -14909,7 +14632,7 @@
         </p:blipFill>
         <p:spPr bwMode="auto">
           <a:xfrm>
-            <a:off x="6386648" y="3960778"/>
+            <a:off x="6250621" y="4164818"/>
             <a:ext cx="2768131" cy="1752395"/>
           </a:xfrm>
           <a:prstGeom prst="rect">
@@ -14978,7 +14701,7 @@
         </p:nvSpPr>
         <p:spPr bwMode="auto">
           <a:xfrm>
-            <a:off x="4228205" y="3513006"/>
+            <a:off x="4092179" y="3286296"/>
             <a:ext cx="1104135" cy="319665"/>
           </a:xfrm>
           <a:prstGeom prst="rect">
@@ -15219,12 +14942,12 @@
               <a:buNone/>
             </a:pPr>
             <a:r>
-              <a:rPr lang="de-DE" sz="1800" dirty="0" smtClean="0">
+              <a:rPr lang="en-US" sz="1800" dirty="0" smtClean="0">
                 <a:latin typeface="Franklin Gothic Book" panose="020B0503020102020204" pitchFamily="34" charset="0"/>
               </a:rPr>
               <a:t>Switches</a:t>
             </a:r>
-            <a:endParaRPr lang="de-DE" sz="1800" dirty="0">
+            <a:endParaRPr lang="en-US" sz="1800" dirty="0">
               <a:latin typeface="Franklin Gothic Book" panose="020B0503020102020204" pitchFamily="34" charset="0"/>
             </a:endParaRPr>
           </a:p>
@@ -15240,8 +14963,8 @@
         </p:nvSpPr>
         <p:spPr bwMode="auto">
           <a:xfrm>
-            <a:off x="6325190" y="3517346"/>
-            <a:ext cx="2752616" cy="319665"/>
+            <a:off x="6189163" y="3290636"/>
+            <a:ext cx="2829589" cy="319665"/>
           </a:xfrm>
           <a:prstGeom prst="rect">
             <a:avLst/>
@@ -15480,30 +15203,36 @@
               <a:buNone/>
             </a:pPr>
             <a:r>
-              <a:rPr lang="de-DE" sz="1800" dirty="0">
+              <a:rPr lang="en-US" sz="1800" dirty="0" smtClean="0">
                 <a:latin typeface="Franklin Gothic Book" panose="020B0503020102020204" pitchFamily="34" charset="0"/>
               </a:rPr>
               <a:t>Drive </a:t>
             </a:r>
             <a:r>
-              <a:rPr lang="de-DE" sz="1800" dirty="0" err="1">
+              <a:rPr lang="en-US" sz="1800" dirty="0" smtClean="0">
                 <a:latin typeface="Franklin Gothic Book" panose="020B0503020102020204" pitchFamily="34" charset="0"/>
               </a:rPr>
-              <a:t>authorization</a:t>
-            </a:r>
-            <a:r>
-              <a:rPr lang="de-DE" sz="1800" dirty="0">
+              <a:t>A</a:t>
+            </a:r>
+            <a:r>
+              <a:rPr lang="en-US" sz="1800" dirty="0" smtClean="0">
                 <a:latin typeface="Franklin Gothic Book" panose="020B0503020102020204" pitchFamily="34" charset="0"/>
               </a:rPr>
-              <a:t> </a:t>
-            </a:r>
-            <a:r>
-              <a:rPr lang="de-DE" sz="1800" dirty="0" err="1">
+              <a:t>uthorization </a:t>
+            </a:r>
+            <a:r>
+              <a:rPr lang="en-US" sz="1800" dirty="0" smtClean="0">
                 <a:latin typeface="Franklin Gothic Book" panose="020B0503020102020204" pitchFamily="34" charset="0"/>
               </a:rPr>
-              <a:t>systems</a:t>
-            </a:r>
-            <a:endParaRPr lang="de-DE" sz="1800" dirty="0">
+              <a:t>S</a:t>
+            </a:r>
+            <a:r>
+              <a:rPr lang="en-US" sz="1800" dirty="0" smtClean="0">
+                <a:latin typeface="Franklin Gothic Book" panose="020B0503020102020204" pitchFamily="34" charset="0"/>
+              </a:rPr>
+              <a:t>ystems</a:t>
+            </a:r>
+            <a:endParaRPr lang="en-US" sz="1800" dirty="0">
               <a:latin typeface="Franklin Gothic Book" panose="020B0503020102020204" pitchFamily="34" charset="0"/>
             </a:endParaRPr>
           </a:p>
@@ -15519,7 +15248,7 @@
         </p:nvSpPr>
         <p:spPr bwMode="auto">
           <a:xfrm>
-            <a:off x="1330712" y="5805711"/>
+            <a:off x="1194685" y="6009751"/>
             <a:ext cx="944312" cy="319665"/>
           </a:xfrm>
           <a:prstGeom prst="rect">
@@ -15759,12 +15488,12 @@
               <a:buNone/>
             </a:pPr>
             <a:r>
-              <a:rPr lang="de-DE" sz="1800" dirty="0" err="1">
+              <a:rPr lang="en-US" sz="1800" dirty="0" smtClean="0">
                 <a:latin typeface="Franklin Gothic Book" panose="020B0503020102020204" pitchFamily="34" charset="0"/>
               </a:rPr>
               <a:t>Lighting</a:t>
             </a:r>
-            <a:endParaRPr lang="de-DE" sz="1800" dirty="0">
+            <a:endParaRPr lang="en-US" sz="1800" dirty="0">
               <a:latin typeface="Franklin Gothic Book" panose="020B0503020102020204" pitchFamily="34" charset="0"/>
             </a:endParaRPr>
           </a:p>
@@ -15780,7 +15509,7 @@
         </p:nvSpPr>
         <p:spPr bwMode="auto">
           <a:xfrm>
-            <a:off x="3653898" y="5805711"/>
+            <a:off x="3517871" y="6009751"/>
             <a:ext cx="2252748" cy="319665"/>
           </a:xfrm>
           <a:prstGeom prst="rect">
@@ -16020,17 +15749,14 @@
               <a:buNone/>
             </a:pPr>
             <a:r>
-              <a:rPr lang="de-DE" sz="1800" dirty="0" err="1">
+              <a:rPr lang="en-US" sz="1800" dirty="0" smtClean="0">
                 <a:latin typeface="Franklin Gothic Book" panose="020B0503020102020204" pitchFamily="34" charset="0"/>
               </a:rPr>
-              <a:t>Battery</a:t>
-            </a:r>
-            <a:r>
-              <a:rPr lang="de-DE" sz="1800" dirty="0">
-                <a:latin typeface="Franklin Gothic Book" panose="020B0503020102020204" pitchFamily="34" charset="0"/>
-              </a:rPr>
-              <a:t> Management</a:t>
-            </a:r>
+              <a:t>Battery Management</a:t>
+            </a:r>
+            <a:endParaRPr lang="en-US" sz="1800" dirty="0">
+              <a:latin typeface="Franklin Gothic Book" panose="020B0503020102020204" pitchFamily="34" charset="0"/>
+            </a:endParaRPr>
           </a:p>
         </p:txBody>
       </p:sp>
@@ -16044,7 +15770,7 @@
         </p:nvSpPr>
         <p:spPr bwMode="auto">
           <a:xfrm>
-            <a:off x="7285520" y="5805711"/>
+            <a:off x="7149493" y="6009751"/>
             <a:ext cx="944312" cy="319665"/>
           </a:xfrm>
           <a:prstGeom prst="rect">
@@ -16284,12 +16010,12 @@
               <a:buNone/>
             </a:pPr>
             <a:r>
-              <a:rPr lang="de-DE" sz="1800" dirty="0" smtClean="0">
+              <a:rPr lang="en-US" sz="1800" dirty="0" smtClean="0">
                 <a:latin typeface="Franklin Gothic Book" panose="020B0503020102020204" pitchFamily="34" charset="0"/>
               </a:rPr>
               <a:t>Sensors</a:t>
             </a:r>
-            <a:endParaRPr lang="de-DE" sz="1800" dirty="0">
+            <a:endParaRPr lang="en-US" sz="1800" dirty="0">
               <a:latin typeface="Franklin Gothic Book" panose="020B0503020102020204" pitchFamily="34" charset="0"/>
             </a:endParaRPr>
           </a:p>
@@ -16545,12 +16271,12 @@
               <a:buNone/>
             </a:pPr>
             <a:r>
-              <a:rPr lang="de-DE" sz="1800" dirty="0" smtClean="0">
+              <a:rPr lang="en-US" sz="1800" dirty="0" smtClean="0">
                 <a:latin typeface="Franklin Gothic Book" panose="020B0503020102020204" pitchFamily="34" charset="0"/>
               </a:rPr>
               <a:t>Pumps</a:t>
             </a:r>
-            <a:endParaRPr lang="de-DE" sz="1800" dirty="0">
+            <a:endParaRPr lang="en-US" sz="1800" dirty="0">
               <a:latin typeface="Franklin Gothic Book" panose="020B0503020102020204" pitchFamily="34" charset="0"/>
             </a:endParaRPr>
           </a:p>
@@ -16609,12 +16335,8 @@
           <a:lstStyle/>
           <a:p>
             <a:r>
-              <a:rPr lang="en-US" dirty="0"/>
-              <a:t>Who is the Rhine-Main </a:t>
-            </a:r>
-            <a:r>
               <a:rPr lang="en-US" dirty="0" smtClean="0"/>
-              <a:t>Team?</a:t>
+              <a:t>Rhine-Main Team (RMT)</a:t>
             </a:r>
             <a:endParaRPr lang="de-DE" dirty="0"/>
           </a:p>
@@ -16630,7 +16352,12 @@
             <p:ph idx="1"/>
           </p:nvPr>
         </p:nvSpPr>
-        <p:spPr/>
+        <p:spPr>
+          <a:xfrm>
+            <a:off x="838200" y="1331948"/>
+            <a:ext cx="10515600" cy="4351338"/>
+          </a:xfrm>
+        </p:spPr>
         <p:txBody>
           <a:bodyPr/>
           <a:lstStyle/>
@@ -16642,15 +16369,7 @@
             </a:r>
             <a:r>
               <a:rPr lang="en-US" dirty="0" smtClean="0"/>
-              <a:t>in </a:t>
-            </a:r>
-            <a:r>
-              <a:rPr lang="en-US" dirty="0" err="1" smtClean="0"/>
-              <a:t>Sulzbach</a:t>
-            </a:r>
-            <a:r>
-              <a:rPr lang="en-US" dirty="0" smtClean="0"/>
-              <a:t>, Germany (Rhine-Main area)</a:t>
+              <a:t>in Sulzbach, Germany (Rhine-Main area)</a:t>
             </a:r>
             <a:endParaRPr lang="de-DE" dirty="0"/>
           </a:p>
@@ -16750,7 +16469,7 @@
         </p:blipFill>
         <p:spPr>
           <a:xfrm>
-            <a:off x="1072961" y="4396862"/>
+            <a:off x="857414" y="4223050"/>
             <a:ext cx="4704629" cy="2178050"/>
           </a:xfrm>
           <a:prstGeom prst="rect">
@@ -16776,8 +16495,8 @@
         </p:nvCxnSpPr>
         <p:spPr>
           <a:xfrm flipV="1">
-            <a:off x="5749204" y="4546542"/>
-            <a:ext cx="583235" cy="6408"/>
+            <a:off x="5661307" y="4383074"/>
+            <a:ext cx="434693" cy="109695"/>
           </a:xfrm>
           <a:prstGeom prst="straightConnector1">
             <a:avLst/>
@@ -16816,7 +16535,7 @@
         </p:blipFill>
         <p:spPr>
           <a:xfrm>
-            <a:off x="7661049" y="2505954"/>
+            <a:off x="7661049" y="2280406"/>
             <a:ext cx="3692751" cy="2979933"/>
           </a:xfrm>
           <a:prstGeom prst="rect">
@@ -16907,8 +16626,8 @@
         </p:nvCxnSpPr>
         <p:spPr>
           <a:xfrm>
-            <a:off x="9713515" y="5565366"/>
-            <a:ext cx="235585" cy="235841"/>
+            <a:off x="9507424" y="5388327"/>
+            <a:ext cx="282355" cy="352592"/>
           </a:xfrm>
           <a:prstGeom prst="straightConnector1">
             <a:avLst/>
@@ -16948,7 +16667,7 @@
         </p:blipFill>
         <p:spPr>
           <a:xfrm>
-            <a:off x="6345854" y="4276373"/>
+            <a:off x="6130307" y="4102561"/>
             <a:ext cx="769871" cy="780417"/>
           </a:xfrm>
           <a:prstGeom prst="rect">
@@ -17417,38 +17136,10 @@
           <a:lstStyle/>
           <a:p>
             <a:r>
-              <a:rPr lang="de-DE" dirty="0" err="1" smtClean="0"/>
-              <a:t>Variants</a:t>
-            </a:r>
-            <a:r>
-              <a:rPr lang="de-DE" dirty="0" smtClean="0"/>
-              <a:t> </a:t>
-            </a:r>
-            <a:r>
-              <a:rPr lang="de-DE" dirty="0" err="1"/>
-              <a:t>C</a:t>
-            </a:r>
-            <a:r>
-              <a:rPr lang="de-DE" dirty="0" err="1" smtClean="0"/>
-              <a:t>onfiguration</a:t>
-            </a:r>
-            <a:r>
-              <a:rPr lang="de-DE" dirty="0" smtClean="0"/>
-              <a:t> </a:t>
-            </a:r>
-            <a:r>
-              <a:rPr lang="de-DE" dirty="0" err="1" smtClean="0"/>
-              <a:t>with</a:t>
-            </a:r>
-            <a:r>
-              <a:rPr lang="de-DE" dirty="0" smtClean="0"/>
-              <a:t> </a:t>
-            </a:r>
-            <a:r>
-              <a:rPr lang="de-DE" dirty="0" err="1" smtClean="0"/>
-              <a:t>Kconfig</a:t>
-            </a:r>
-            <a:endParaRPr lang="de-DE" dirty="0"/>
+              <a:rPr lang="en-US" dirty="0" smtClean="0"/>
+              <a:t>Variants Configuration with Kconfig</a:t>
+            </a:r>
+            <a:endParaRPr lang="en-US" dirty="0"/>
           </a:p>
         </p:txBody>
       </p:sp>
@@ -17475,8 +17166,31 @@
             <a:pPr fontAlgn="base"/>
             <a:r>
               <a:rPr lang="en-US" dirty="0" smtClean="0"/>
-              <a:t>Overview of features</a:t>
-            </a:r>
+              <a:t>Usability</a:t>
+            </a:r>
+          </a:p>
+          <a:p>
+            <a:pPr fontAlgn="base"/>
+            <a:endParaRPr lang="en-US" dirty="0"/>
+          </a:p>
+          <a:p>
+            <a:pPr fontAlgn="base"/>
+            <a:r>
+              <a:rPr lang="en-US" dirty="0" smtClean="0"/>
+              <a:t>Overview </a:t>
+            </a:r>
+            <a:r>
+              <a:rPr lang="en-US" dirty="0" smtClean="0"/>
+              <a:t>of </a:t>
+            </a:r>
+            <a:r>
+              <a:rPr lang="en-US" dirty="0" smtClean="0"/>
+              <a:t>features</a:t>
+            </a:r>
+          </a:p>
+          <a:p>
+            <a:pPr fontAlgn="base"/>
+            <a:endParaRPr lang="en-US" dirty="0" smtClean="0"/>
           </a:p>
           <a:p>
             <a:pPr fontAlgn="base"/>
@@ -17623,7 +17337,6 @@
               <a:rPr lang="de-DE" dirty="0"/>
               <a:t> Automotive SPICE</a:t>
             </a:r>
-            <a:endParaRPr lang="de-DE" dirty="0"/>
           </a:p>
         </p:txBody>
       </p:sp>
@@ -17652,6 +17365,9 @@
               <a:rPr lang="en-US" dirty="0" smtClean="0"/>
               <a:t>Documentation</a:t>
             </a:r>
+          </a:p>
+          <a:p>
+            <a:pPr fontAlgn="base"/>
             <a:endParaRPr lang="de-DE" dirty="0"/>
           </a:p>
           <a:p>
@@ -17660,14 +17376,21 @@
               <a:rPr lang="en-US" dirty="0" smtClean="0"/>
               <a:t>Requirements</a:t>
             </a:r>
+          </a:p>
+          <a:p>
+            <a:pPr fontAlgn="base"/>
             <a:endParaRPr lang="de-DE" dirty="0"/>
           </a:p>
           <a:p>
             <a:pPr fontAlgn="base"/>
             <a:r>
               <a:rPr lang="en-US" dirty="0" smtClean="0"/>
-              <a:t>Test report</a:t>
-            </a:r>
+              <a:t>Reporting</a:t>
+            </a:r>
+          </a:p>
+          <a:p>
+            <a:pPr fontAlgn="base"/>
+            <a:endParaRPr lang="en-US" dirty="0" smtClean="0"/>
           </a:p>
           <a:p>
             <a:pPr fontAlgn="base"/>
@@ -17837,7 +17560,7 @@
         </p:nvSpPr>
         <p:spPr>
           <a:xfrm>
-            <a:off x="838200" y="1825625"/>
+            <a:off x="838200" y="1266405"/>
             <a:ext cx="10148637" cy="4351338"/>
           </a:xfrm>
         </p:spPr>
@@ -17916,7 +17639,7 @@
         </p:blipFill>
         <p:spPr>
           <a:xfrm>
-            <a:off x="2408906" y="2697163"/>
+            <a:off x="2307306" y="2394882"/>
             <a:ext cx="7210423" cy="3605212"/>
           </a:xfrm>
           <a:prstGeom prst="rect">
@@ -17977,14 +17700,10 @@
           <a:lstStyle/>
           <a:p>
             <a:r>
-              <a:rPr lang="de-DE" dirty="0" err="1" smtClean="0"/>
-              <a:t>Continuous</a:t>
-            </a:r>
-            <a:r>
-              <a:rPr lang="de-DE" dirty="0" smtClean="0"/>
-              <a:t> Integration</a:t>
-            </a:r>
-            <a:endParaRPr lang="de-DE" dirty="0"/>
+              <a:rPr lang="en-US" dirty="0" smtClean="0"/>
+              <a:t>Continuous Integration</a:t>
+            </a:r>
+            <a:endParaRPr lang="en-US" dirty="0"/>
           </a:p>
         </p:txBody>
       </p:sp>
@@ -17998,45 +17717,50 @@
             <p:ph idx="1"/>
           </p:nvPr>
         </p:nvSpPr>
-        <p:spPr/>
+        <p:spPr>
+          <a:xfrm>
+            <a:off x="838200" y="1571861"/>
+            <a:ext cx="10515600" cy="4605102"/>
+          </a:xfrm>
+        </p:spPr>
         <p:txBody>
           <a:bodyPr/>
           <a:lstStyle/>
           <a:p>
             <a:r>
-              <a:rPr lang="de-DE" dirty="0" smtClean="0"/>
-              <a:t>Fast </a:t>
-            </a:r>
-            <a:r>
-              <a:rPr lang="de-DE" dirty="0" err="1" smtClean="0"/>
-              <a:t>feedback</a:t>
-            </a:r>
-            <a:endParaRPr lang="de-DE" dirty="0" smtClean="0"/>
-          </a:p>
-          <a:p>
-            <a:r>
-              <a:rPr lang="de-DE" dirty="0" smtClean="0"/>
-              <a:t>Quality </a:t>
-            </a:r>
-            <a:r>
-              <a:rPr lang="de-DE" dirty="0" err="1" smtClean="0"/>
-              <a:t>gates</a:t>
-            </a:r>
-            <a:endParaRPr lang="de-DE" dirty="0" smtClean="0"/>
-          </a:p>
-          <a:p>
-            <a:r>
-              <a:rPr lang="de-DE" dirty="0" smtClean="0"/>
-              <a:t>User </a:t>
-            </a:r>
-            <a:r>
-              <a:rPr lang="de-DE" dirty="0" err="1" smtClean="0"/>
-              <a:t>acceptance</a:t>
-            </a:r>
-            <a:endParaRPr lang="de-DE" dirty="0" smtClean="0"/>
-          </a:p>
-          <a:p>
-            <a:endParaRPr lang="de-DE" dirty="0"/>
+              <a:rPr lang="en-US" dirty="0" smtClean="0"/>
+              <a:t>Test strategy</a:t>
+            </a:r>
+          </a:p>
+          <a:p>
+            <a:endParaRPr lang="en-US" dirty="0" smtClean="0"/>
+          </a:p>
+          <a:p>
+            <a:r>
+              <a:rPr lang="en-US" dirty="0" smtClean="0"/>
+              <a:t>Fast feedback</a:t>
+            </a:r>
+          </a:p>
+          <a:p>
+            <a:endParaRPr lang="en-US" dirty="0" smtClean="0"/>
+          </a:p>
+          <a:p>
+            <a:r>
+              <a:rPr lang="en-US" dirty="0" smtClean="0"/>
+              <a:t>Quality gates</a:t>
+            </a:r>
+          </a:p>
+          <a:p>
+            <a:endParaRPr lang="en-US" dirty="0" smtClean="0"/>
+          </a:p>
+          <a:p>
+            <a:r>
+              <a:rPr lang="en-US" dirty="0" smtClean="0"/>
+              <a:t>User/customer/project acceptance</a:t>
+            </a:r>
+          </a:p>
+          <a:p>
+            <a:endParaRPr lang="en-US" dirty="0"/>
           </a:p>
         </p:txBody>
       </p:sp>

</xml_diff>

<commit_message>
Prepare presentation notes for challenges
</commit_message>
<xml_diff>
--- a/Challenges_at_Marquardt.pptx
+++ b/Challenges_at_Marquardt.pptx
@@ -12,8 +12,8 @@
     <p:sldId id="291" r:id="rId3"/>
     <p:sldId id="292" r:id="rId4"/>
     <p:sldId id="294" r:id="rId5"/>
-    <p:sldId id="295" r:id="rId6"/>
-    <p:sldId id="296" r:id="rId7"/>
+    <p:sldId id="296" r:id="rId6"/>
+    <p:sldId id="295" r:id="rId7"/>
     <p:sldId id="299" r:id="rId8"/>
     <p:sldId id="297" r:id="rId9"/>
     <p:sldId id="298" r:id="rId10"/>
@@ -205,7 +205,7 @@
           <a:p>
             <a:fld id="{BF03CDB5-E06A-44D8-95AE-B90958F409FC}" type="datetimeFigureOut">
               <a:rPr lang="en-US" smtClean="0"/>
-              <a:t>8/23/2023</a:t>
+              <a:t>8/26/2023</a:t>
             </a:fld>
             <a:endParaRPr lang="en-US"/>
           </a:p>
@@ -684,46 +684,108 @@
           <a:bodyPr/>
           <a:lstStyle/>
           <a:p>
-            <a:pPr lvl="1" fontAlgn="base"/>
-            <a:r>
-              <a:rPr lang="en-US" dirty="0" smtClean="0"/>
-              <a:t>Is</a:t>
-            </a:r>
-            <a:r>
-              <a:rPr lang="en-US" baseline="0" dirty="0" smtClean="0"/>
-              <a:t> it the best tool for C project?</a:t>
-            </a:r>
-          </a:p>
-          <a:p>
-            <a:pPr lvl="1" fontAlgn="base"/>
-            <a:r>
-              <a:rPr lang="en-US" dirty="0" smtClean="0"/>
-              <a:t>Tabular view</a:t>
-            </a:r>
-            <a:r>
-              <a:rPr lang="en-US" baseline="0" dirty="0" smtClean="0"/>
-              <a:t> to see the features and change the values for the variants </a:t>
-            </a:r>
-            <a:r>
-              <a:rPr lang="en-US" dirty="0" smtClean="0"/>
-              <a:t>(configuration for more than one variant)</a:t>
-            </a:r>
-          </a:p>
-          <a:p>
-            <a:pPr lvl="1" fontAlgn="base"/>
-            <a:r>
-              <a:rPr lang="en-US" dirty="0" smtClean="0"/>
-              <a:t>Which parameters, switches, </a:t>
-            </a:r>
-            <a:r>
-              <a:rPr lang="en-US" dirty="0" err="1" smtClean="0"/>
-              <a:t>etc</a:t>
-            </a:r>
-            <a:r>
-              <a:rPr lang="en-US" dirty="0" smtClean="0"/>
-              <a:t> other companies configure and how</a:t>
-            </a:r>
-            <a:endParaRPr lang="de-DE" dirty="0" smtClean="0"/>
+            <a:r>
+              <a:rPr lang="en-US" noProof="0" dirty="0"/>
+              <a:t>As Gabriela already explained,</a:t>
+            </a:r>
+            <a:r>
+              <a:rPr lang="en-US" baseline="0" noProof="0" dirty="0"/>
+              <a:t> our team is responsible for the introduction of Software Product Line Engineering (SPLE) into Marquardt’s SW development.</a:t>
+            </a:r>
+          </a:p>
+          <a:p>
+            <a:endParaRPr lang="en-US" baseline="0" noProof="0" dirty="0"/>
+          </a:p>
+          <a:p>
+            <a:r>
+              <a:rPr lang="en-US" baseline="0" noProof="0" dirty="0"/>
+              <a:t>So, we try to drive the transition away from project development towards product development.</a:t>
+            </a:r>
+          </a:p>
+          <a:p>
+            <a:endParaRPr lang="en-US" baseline="0" noProof="0" dirty="0"/>
+          </a:p>
+          <a:p>
+            <a:r>
+              <a:rPr lang="en-US" baseline="0" noProof="0" dirty="0"/>
+              <a:t>But as we are working in the automotive industry, we must fulfill the process requirements as defined in Automotive SPICE.</a:t>
+            </a:r>
+          </a:p>
+          <a:p>
+            <a:endParaRPr lang="en-US" baseline="0" noProof="0" dirty="0"/>
+          </a:p>
+          <a:p>
+            <a:r>
+              <a:rPr lang="en-US" baseline="0" noProof="0" dirty="0"/>
+              <a:t>This is essential to stay competitive.</a:t>
+            </a:r>
+          </a:p>
+          <a:p>
+            <a:endParaRPr lang="en-US" baseline="0" noProof="0" dirty="0"/>
+          </a:p>
+          <a:p>
+            <a:r>
+              <a:rPr lang="en-US" noProof="0" dirty="0"/>
+              <a:t>So, we must consider the variability of our products in all work products defined</a:t>
+            </a:r>
+            <a:r>
+              <a:rPr lang="en-US" baseline="0" noProof="0" dirty="0"/>
+              <a:t> in A.SPICE.</a:t>
+            </a:r>
+          </a:p>
+          <a:p>
+            <a:endParaRPr lang="en-US" baseline="0" noProof="0" dirty="0"/>
+          </a:p>
+          <a:p>
+            <a:r>
+              <a:rPr lang="en-US" baseline="0" noProof="0" dirty="0"/>
+              <a:t>Click</a:t>
+            </a:r>
+          </a:p>
+          <a:p>
+            <a:endParaRPr lang="en-US" baseline="0" noProof="0" dirty="0"/>
+          </a:p>
+          <a:p>
+            <a:r>
+              <a:rPr lang="en-US" baseline="0" noProof="0" dirty="0"/>
+              <a:t>As you can see here in the V-Model figure of A.SPICE there are a lot of work products from System requirements and System qualification test results down to software units.</a:t>
+            </a:r>
+          </a:p>
+          <a:p>
+            <a:endParaRPr lang="en-US" baseline="0" noProof="0" dirty="0"/>
+          </a:p>
+          <a:p>
+            <a:r>
+              <a:rPr lang="en-US" baseline="0" noProof="0" dirty="0"/>
+              <a:t>If you think about variant or feature configuration for the source code of software units one possible answer is Kconfig.</a:t>
+            </a:r>
+          </a:p>
+          <a:p>
+            <a:endParaRPr lang="en-US" baseline="0" noProof="0" dirty="0"/>
+          </a:p>
+          <a:p>
+            <a:r>
+              <a:rPr lang="en-US" baseline="0" noProof="0" dirty="0"/>
+              <a:t>We easily managed to introduce Kconfig to configure not only the source code but also the build system, the unit test specification and even the software detailed design.</a:t>
+            </a:r>
+          </a:p>
+          <a:p>
+            <a:endParaRPr lang="en-US" baseline="0" noProof="0" dirty="0"/>
+          </a:p>
+          <a:p>
+            <a:r>
+              <a:rPr lang="en-US" baseline="0" noProof="0" dirty="0"/>
+              <a:t>But what about requirements and architecture usually managed in automotive tools like Doors, IBM Rhapsody and others?</a:t>
+            </a:r>
+          </a:p>
+          <a:p>
+            <a:endParaRPr lang="en-US" baseline="0" noProof="0" dirty="0"/>
+          </a:p>
+          <a:p>
+            <a:r>
+              <a:rPr lang="en-US" baseline="0" noProof="0" dirty="0"/>
+              <a:t>There are a few solutions available, but we are missing the overall picture here.</a:t>
+            </a:r>
           </a:p>
         </p:txBody>
       </p:sp>
@@ -753,7 +815,7 @@
     </p:spTree>
     <p:extLst>
       <p:ext uri="{BB962C8B-B14F-4D97-AF65-F5344CB8AC3E}">
-        <p14:creationId xmlns:p14="http://schemas.microsoft.com/office/powerpoint/2010/main" val="2686744702"/>
+        <p14:creationId xmlns:p14="http://schemas.microsoft.com/office/powerpoint/2010/main" val="2740031897"/>
       </p:ext>
     </p:extLst>
   </p:cSld>
@@ -807,184 +869,74 @@
           <a:bodyPr/>
           <a:lstStyle/>
           <a:p>
-            <a:r>
-              <a:rPr lang="de-DE" dirty="0" err="1" smtClean="0"/>
-              <a:t>How</a:t>
-            </a:r>
-            <a:r>
-              <a:rPr lang="de-DE" dirty="0" smtClean="0"/>
-              <a:t> </a:t>
-            </a:r>
-            <a:r>
-              <a:rPr lang="de-DE" dirty="0" err="1" smtClean="0"/>
-              <a:t>we</a:t>
-            </a:r>
-            <a:r>
-              <a:rPr lang="de-DE" dirty="0" smtClean="0"/>
-              <a:t> </a:t>
-            </a:r>
-            <a:r>
-              <a:rPr lang="de-DE" dirty="0" err="1" smtClean="0"/>
-              <a:t>should</a:t>
-            </a:r>
-            <a:r>
-              <a:rPr lang="de-DE" baseline="0" dirty="0" smtClean="0"/>
-              <a:t> </a:t>
-            </a:r>
-            <a:r>
-              <a:rPr lang="de-DE" baseline="0" dirty="0" err="1" smtClean="0"/>
-              <a:t>consider</a:t>
-            </a:r>
-            <a:r>
-              <a:rPr lang="de-DE" baseline="0" dirty="0" smtClean="0"/>
-              <a:t> </a:t>
-            </a:r>
-            <a:r>
-              <a:rPr lang="de-DE" baseline="0" dirty="0" err="1" smtClean="0"/>
-              <a:t>variants</a:t>
-            </a:r>
-            <a:r>
-              <a:rPr lang="de-DE" baseline="0" dirty="0" smtClean="0"/>
-              <a:t> </a:t>
-            </a:r>
-            <a:r>
-              <a:rPr lang="de-DE" baseline="0" dirty="0" err="1" smtClean="0"/>
-              <a:t>or</a:t>
-            </a:r>
-            <a:r>
-              <a:rPr lang="de-DE" baseline="0" dirty="0" smtClean="0"/>
-              <a:t> </a:t>
-            </a:r>
-            <a:r>
-              <a:rPr lang="de-DE" baseline="0" dirty="0" err="1" smtClean="0"/>
-              <a:t>manipulate</a:t>
-            </a:r>
-            <a:r>
-              <a:rPr lang="de-DE" baseline="0" dirty="0" smtClean="0"/>
-              <a:t> an SPL on all </a:t>
-            </a:r>
-            <a:r>
-              <a:rPr lang="de-DE" baseline="0" dirty="0" err="1" smtClean="0"/>
-              <a:t>the</a:t>
-            </a:r>
-            <a:r>
-              <a:rPr lang="de-DE" baseline="0" dirty="0" smtClean="0"/>
-              <a:t> ASPICE </a:t>
-            </a:r>
-            <a:r>
-              <a:rPr lang="de-DE" baseline="0" dirty="0" err="1" smtClean="0"/>
-              <a:t>processes</a:t>
-            </a:r>
-            <a:endParaRPr lang="de-DE" baseline="0" dirty="0" smtClean="0"/>
-          </a:p>
-          <a:p>
-            <a:endParaRPr lang="de-DE" baseline="0" dirty="0" smtClean="0"/>
-          </a:p>
-          <a:p>
-            <a:r>
-              <a:rPr lang="de-DE" baseline="0" dirty="0" err="1" smtClean="0"/>
-              <a:t>Variability</a:t>
-            </a:r>
-            <a:r>
-              <a:rPr lang="de-DE" baseline="0" dirty="0" smtClean="0"/>
-              <a:t> </a:t>
-            </a:r>
-            <a:r>
-              <a:rPr lang="de-DE" baseline="0" dirty="0" err="1" smtClean="0"/>
-              <a:t>with</a:t>
-            </a:r>
-            <a:r>
-              <a:rPr lang="de-DE" baseline="0" dirty="0" smtClean="0"/>
-              <a:t> Kconfig </a:t>
-            </a:r>
-            <a:r>
-              <a:rPr lang="de-DE" baseline="0" dirty="0" err="1" smtClean="0"/>
-              <a:t>for</a:t>
-            </a:r>
-            <a:r>
-              <a:rPr lang="de-DE" baseline="0" dirty="0" smtClean="0"/>
-              <a:t> </a:t>
-            </a:r>
-            <a:r>
-              <a:rPr lang="de-DE" baseline="0" dirty="0" err="1" smtClean="0"/>
-              <a:t>code</a:t>
-            </a:r>
-            <a:r>
-              <a:rPr lang="de-DE" baseline="0" dirty="0" smtClean="0"/>
-              <a:t>. Easy</a:t>
-            </a:r>
-          </a:p>
-          <a:p>
-            <a:r>
-              <a:rPr lang="de-DE" baseline="0" dirty="0" err="1" smtClean="0"/>
-              <a:t>Variability</a:t>
-            </a:r>
-            <a:r>
-              <a:rPr lang="de-DE" baseline="0" dirty="0" smtClean="0"/>
-              <a:t> </a:t>
-            </a:r>
-            <a:r>
-              <a:rPr lang="de-DE" baseline="0" dirty="0" err="1" smtClean="0"/>
-              <a:t>for</a:t>
-            </a:r>
-            <a:r>
-              <a:rPr lang="de-DE" baseline="0" dirty="0" smtClean="0"/>
-              <a:t> </a:t>
-            </a:r>
-            <a:r>
-              <a:rPr lang="de-DE" baseline="0" dirty="0" err="1" smtClean="0"/>
-              <a:t>documentation</a:t>
-            </a:r>
-            <a:r>
-              <a:rPr lang="de-DE" baseline="0" dirty="0" smtClean="0"/>
-              <a:t> -&gt; Sphinx, Python, </a:t>
-            </a:r>
-            <a:r>
-              <a:rPr lang="de-DE" baseline="0" dirty="0" err="1" smtClean="0"/>
-              <a:t>rst</a:t>
-            </a:r>
-            <a:r>
-              <a:rPr lang="de-DE" baseline="0" dirty="0" smtClean="0"/>
-              <a:t>, </a:t>
-            </a:r>
-            <a:r>
-              <a:rPr lang="de-DE" baseline="0" dirty="0" err="1" smtClean="0"/>
-              <a:t>Jinja</a:t>
-            </a:r>
-            <a:endParaRPr lang="de-DE" baseline="0" dirty="0" smtClean="0"/>
-          </a:p>
-          <a:p>
-            <a:r>
-              <a:rPr lang="de-DE" baseline="0" dirty="0" err="1" smtClean="0"/>
-              <a:t>What</a:t>
-            </a:r>
-            <a:r>
-              <a:rPr lang="de-DE" baseline="0" dirty="0" smtClean="0"/>
-              <a:t> </a:t>
-            </a:r>
-            <a:r>
-              <a:rPr lang="de-DE" baseline="0" dirty="0" err="1" smtClean="0"/>
-              <a:t>about</a:t>
-            </a:r>
-            <a:r>
-              <a:rPr lang="de-DE" baseline="0" dirty="0" smtClean="0"/>
-              <a:t> </a:t>
-            </a:r>
-            <a:r>
-              <a:rPr lang="de-DE" baseline="0" dirty="0" err="1" smtClean="0"/>
-              <a:t>Architecture</a:t>
-            </a:r>
-            <a:r>
-              <a:rPr lang="de-DE" baseline="0" dirty="0" smtClean="0"/>
-              <a:t>, </a:t>
-            </a:r>
-            <a:r>
-              <a:rPr lang="de-DE" baseline="0" dirty="0" err="1" smtClean="0"/>
-              <a:t>requirements</a:t>
-            </a:r>
-            <a:r>
-              <a:rPr lang="de-DE" baseline="0" dirty="0" smtClean="0"/>
-              <a:t>?</a:t>
+            <a:pPr lvl="1" fontAlgn="base"/>
+            <a:r>
+              <a:rPr lang="en-US" dirty="0"/>
+              <a:t>Another challenge we face is</a:t>
+            </a:r>
+            <a:r>
+              <a:rPr lang="en-US" baseline="0" dirty="0"/>
+              <a:t> Kconfig itself.</a:t>
+            </a:r>
+          </a:p>
+          <a:p>
+            <a:pPr lvl="1" fontAlgn="base"/>
+            <a:endParaRPr lang="en-US" baseline="0" dirty="0"/>
+          </a:p>
+          <a:p>
+            <a:pPr lvl="1" fontAlgn="base"/>
+            <a:r>
+              <a:rPr lang="en-US" baseline="0" dirty="0"/>
+              <a:t>As far as we know, Kconfig does not know anything about variants nor components, so the usability in an SPL is rather limited.</a:t>
+            </a:r>
+          </a:p>
+          <a:p>
+            <a:pPr lvl="1" fontAlgn="base"/>
+            <a:endParaRPr lang="en-US" baseline="0" dirty="0"/>
+          </a:p>
+          <a:p>
+            <a:pPr lvl="1" fontAlgn="base"/>
+            <a:r>
+              <a:rPr lang="en-US" baseline="0" dirty="0"/>
+              <a:t>We are missing a GUI or similar that supports the overview of features and their configuration over all or even several variants of an SPL.</a:t>
+            </a:r>
+          </a:p>
+          <a:p>
+            <a:pPr lvl="1" fontAlgn="base"/>
+            <a:endParaRPr lang="en-US" baseline="0" dirty="0"/>
+          </a:p>
+          <a:p>
+            <a:pPr lvl="1" fontAlgn="base"/>
+            <a:r>
+              <a:rPr lang="en-US" baseline="0" dirty="0"/>
+              <a:t>We would like to be able to change the configuration of several variants at once in a GUI.</a:t>
+            </a:r>
+            <a:endParaRPr lang="en-US" dirty="0"/>
+          </a:p>
+          <a:p>
+            <a:pPr lvl="1" fontAlgn="base"/>
+            <a:endParaRPr lang="en-US" dirty="0"/>
+          </a:p>
+          <a:p>
+            <a:pPr lvl="1" fontAlgn="base"/>
+            <a:r>
+              <a:rPr lang="en-US" dirty="0"/>
+              <a:t>We are even asking ourselves if</a:t>
+            </a:r>
+            <a:r>
+              <a:rPr lang="en-US" baseline="0" dirty="0"/>
+              <a:t> Kconfig is the best tool for the job of variant configuration and management in an SPL and for the programming language C?</a:t>
+            </a:r>
+          </a:p>
+          <a:p>
+            <a:pPr lvl="1" fontAlgn="base"/>
+            <a:endParaRPr lang="en-US" baseline="0" dirty="0"/>
+          </a:p>
+          <a:p>
+            <a:pPr lvl="1" fontAlgn="base"/>
+            <a:r>
+              <a:rPr lang="en-US" baseline="0" dirty="0"/>
+              <a:t>And furthermore, we would like to know what tools other companies use for their SPLs and have a comparison of those tools with pros and cons.</a:t>
             </a:r>
           </a:p>
         </p:txBody>
@@ -1015,7 +967,7 @@
     </p:spTree>
     <p:extLst>
       <p:ext uri="{BB962C8B-B14F-4D97-AF65-F5344CB8AC3E}">
-        <p14:creationId xmlns:p14="http://schemas.microsoft.com/office/powerpoint/2010/main" val="2740031897"/>
+        <p14:creationId xmlns:p14="http://schemas.microsoft.com/office/powerpoint/2010/main" val="2686744702"/>
       </p:ext>
     </p:extLst>
   </p:cSld>
@@ -1070,134 +1022,147 @@
           <a:lstStyle/>
           <a:p>
             <a:r>
-              <a:rPr lang="de-DE" dirty="0" err="1" smtClean="0"/>
-              <a:t>How</a:t>
-            </a:r>
-            <a:r>
-              <a:rPr lang="de-DE" dirty="0" smtClean="0"/>
-              <a:t> </a:t>
-            </a:r>
-            <a:r>
-              <a:rPr lang="de-DE" dirty="0" err="1" smtClean="0"/>
-              <a:t>to</a:t>
-            </a:r>
-            <a:r>
-              <a:rPr lang="de-DE" dirty="0" smtClean="0"/>
-              <a:t> </a:t>
-            </a:r>
-            <a:r>
-              <a:rPr lang="de-DE" dirty="0" err="1" smtClean="0"/>
-              <a:t>get</a:t>
-            </a:r>
-            <a:r>
-              <a:rPr lang="de-DE" dirty="0" smtClean="0"/>
-              <a:t> fast </a:t>
-            </a:r>
-            <a:r>
-              <a:rPr lang="de-DE" dirty="0" err="1" smtClean="0"/>
-              <a:t>feedback</a:t>
-            </a:r>
-            <a:r>
-              <a:rPr lang="de-DE" baseline="0" dirty="0" smtClean="0"/>
-              <a:t> </a:t>
-            </a:r>
-            <a:r>
-              <a:rPr lang="de-DE" baseline="0" dirty="0" err="1" smtClean="0"/>
-              <a:t>if</a:t>
-            </a:r>
-            <a:r>
-              <a:rPr lang="de-DE" baseline="0" dirty="0" smtClean="0"/>
-              <a:t> </a:t>
-            </a:r>
-            <a:r>
-              <a:rPr lang="de-DE" baseline="0" dirty="0" err="1" smtClean="0"/>
-              <a:t>you</a:t>
-            </a:r>
-            <a:r>
-              <a:rPr lang="de-DE" baseline="0" dirty="0" smtClean="0"/>
-              <a:t> </a:t>
-            </a:r>
-            <a:r>
-              <a:rPr lang="de-DE" baseline="0" dirty="0" err="1" smtClean="0"/>
-              <a:t>have</a:t>
-            </a:r>
-            <a:r>
-              <a:rPr lang="de-DE" baseline="0" dirty="0" smtClean="0"/>
-              <a:t> an SPL </a:t>
-            </a:r>
-            <a:r>
-              <a:rPr lang="de-DE" baseline="0" dirty="0" err="1" smtClean="0"/>
-              <a:t>with</a:t>
-            </a:r>
-            <a:r>
-              <a:rPr lang="de-DE" baseline="0" dirty="0" smtClean="0"/>
-              <a:t> a </a:t>
-            </a:r>
-            <a:r>
-              <a:rPr lang="de-DE" baseline="0" dirty="0" err="1" smtClean="0"/>
-              <a:t>huge</a:t>
-            </a:r>
-            <a:r>
-              <a:rPr lang="de-DE" baseline="0" dirty="0" smtClean="0"/>
-              <a:t> </a:t>
-            </a:r>
-            <a:r>
-              <a:rPr lang="de-DE" baseline="0" dirty="0" err="1" smtClean="0"/>
-              <a:t>number</a:t>
-            </a:r>
-            <a:r>
-              <a:rPr lang="de-DE" baseline="0" dirty="0" smtClean="0"/>
-              <a:t> </a:t>
-            </a:r>
-            <a:r>
-              <a:rPr lang="de-DE" baseline="0" dirty="0" err="1" smtClean="0"/>
-              <a:t>of</a:t>
-            </a:r>
-            <a:r>
-              <a:rPr lang="de-DE" baseline="0" dirty="0" smtClean="0"/>
-              <a:t> </a:t>
-            </a:r>
-            <a:r>
-              <a:rPr lang="de-DE" baseline="0" dirty="0" err="1" smtClean="0"/>
-              <a:t>variants</a:t>
-            </a:r>
-            <a:endParaRPr lang="de-DE" baseline="0" dirty="0" smtClean="0"/>
-          </a:p>
-          <a:p>
-            <a:endParaRPr lang="de-DE" baseline="0" dirty="0" smtClean="0"/>
-          </a:p>
-          <a:p>
-            <a:r>
-              <a:rPr lang="de-DE" baseline="0" dirty="0" smtClean="0"/>
-              <a:t>SW </a:t>
-            </a:r>
-            <a:r>
-              <a:rPr lang="de-DE" baseline="0" dirty="0" err="1" smtClean="0"/>
-              <a:t>erosion</a:t>
-            </a:r>
-            <a:endParaRPr lang="de-DE" baseline="0" dirty="0" smtClean="0"/>
-          </a:p>
-          <a:p>
-            <a:r>
-              <a:rPr lang="de-DE" baseline="0" dirty="0" smtClean="0"/>
-              <a:t>Feature </a:t>
-            </a:r>
-            <a:r>
-              <a:rPr lang="de-DE" baseline="0" dirty="0" err="1" smtClean="0"/>
-              <a:t>creep</a:t>
-            </a:r>
-            <a:endParaRPr lang="de-DE" baseline="0" dirty="0" smtClean="0"/>
-          </a:p>
-          <a:p>
-            <a:r>
-              <a:rPr lang="de-DE" baseline="0" dirty="0" smtClean="0"/>
-              <a:t>Variant </a:t>
-            </a:r>
-            <a:r>
-              <a:rPr lang="de-DE" baseline="0" dirty="0" err="1" smtClean="0"/>
-              <a:t>creep</a:t>
-            </a:r>
-            <a:endParaRPr lang="de-DE" dirty="0"/>
+              <a:rPr lang="en-GB" baseline="0" noProof="0" dirty="0"/>
+              <a:t>Development of an SPL with many variants and a high variability requires a high degree of automation.</a:t>
+            </a:r>
+          </a:p>
+          <a:p>
+            <a:endParaRPr lang="en-GB" baseline="0" noProof="0" dirty="0"/>
+          </a:p>
+          <a:p>
+            <a:r>
+              <a:rPr lang="en-GB" baseline="0" noProof="0" dirty="0"/>
+              <a:t>Therefore, our team established common CI/CD methods like protected branches, automated builds and regression tests for every SW change.</a:t>
+            </a:r>
+          </a:p>
+          <a:p>
+            <a:endParaRPr lang="en-GB" baseline="0" noProof="0" dirty="0"/>
+          </a:p>
+          <a:p>
+            <a:r>
+              <a:rPr lang="en-GB" baseline="0" noProof="0" dirty="0"/>
+              <a:t>For the main development branch and all release branches all delivery artifacts are archived and published.</a:t>
+            </a:r>
+          </a:p>
+          <a:p>
+            <a:endParaRPr lang="en-GB" baseline="0" noProof="0" dirty="0"/>
+          </a:p>
+          <a:p>
+            <a:r>
+              <a:rPr lang="en-GB" baseline="0" noProof="0" dirty="0"/>
+              <a:t>Sound like CI/CD, right? So where is the challenge?</a:t>
+            </a:r>
+          </a:p>
+          <a:p>
+            <a:endParaRPr lang="en-GB" baseline="0" noProof="0" dirty="0"/>
+          </a:p>
+          <a:p>
+            <a:r>
+              <a:rPr lang="en-GB" baseline="0" noProof="0" dirty="0"/>
+              <a:t>Click</a:t>
+            </a:r>
+          </a:p>
+          <a:p>
+            <a:endParaRPr lang="en-GB" baseline="0" noProof="0" dirty="0"/>
+          </a:p>
+          <a:p>
+            <a:r>
+              <a:rPr lang="en-GB" baseline="0" noProof="0" dirty="0"/>
+              <a:t>Well: the main acceptance criteria for CI/CD is fast feedback.</a:t>
+            </a:r>
+          </a:p>
+          <a:p>
+            <a:endParaRPr lang="en-GB" baseline="0" noProof="0" dirty="0"/>
+          </a:p>
+          <a:p>
+            <a:r>
+              <a:rPr lang="en-GB" baseline="0" noProof="0" dirty="0"/>
+              <a:t>When a developer wants to verify her or his change, a feedback is required in a couple of minutes. NOT HOURS!</a:t>
+            </a:r>
+          </a:p>
+          <a:p>
+            <a:endParaRPr lang="en-GB" baseline="0" noProof="0" dirty="0"/>
+          </a:p>
+          <a:p>
+            <a:r>
+              <a:rPr lang="en-GB" baseline="0" noProof="0" dirty="0"/>
+              <a:t>But how to run every test for each SW change when you have an SPL with a huge number of variants and features?</a:t>
+            </a:r>
+          </a:p>
+          <a:p>
+            <a:endParaRPr lang="en-GB" baseline="0" noProof="0" dirty="0"/>
+          </a:p>
+          <a:p>
+            <a:r>
+              <a:rPr lang="en-GB" baseline="0" noProof="0" dirty="0"/>
+              <a:t>Click</a:t>
+            </a:r>
+          </a:p>
+          <a:p>
+            <a:endParaRPr lang="en-GB" baseline="0" noProof="0" dirty="0"/>
+          </a:p>
+          <a:p>
+            <a:r>
+              <a:rPr lang="en-GB" baseline="0" noProof="0" dirty="0"/>
+              <a:t>We believe a well-defined test strategy is needed here … </a:t>
+            </a:r>
+          </a:p>
+          <a:p>
+            <a:endParaRPr lang="en-GB" baseline="0" noProof="0" dirty="0"/>
+          </a:p>
+          <a:p>
+            <a:r>
+              <a:rPr lang="en-GB" baseline="0" noProof="0" dirty="0"/>
+              <a:t>Click</a:t>
+            </a:r>
+          </a:p>
+          <a:p>
+            <a:endParaRPr lang="en-GB" baseline="0" noProof="0" dirty="0"/>
+          </a:p>
+          <a:p>
+            <a:r>
+              <a:rPr lang="en-GB" baseline="0" noProof="0" dirty="0"/>
+              <a:t>… that defines certain quality gates that matches the development stages defined by A.SPICE.</a:t>
+            </a:r>
+          </a:p>
+          <a:p>
+            <a:endParaRPr lang="en-GB" baseline="0" noProof="0" dirty="0"/>
+          </a:p>
+          <a:p>
+            <a:r>
+              <a:rPr lang="en-GB" baseline="0" noProof="0" dirty="0"/>
+              <a:t>Such a test strategy for CI/CD must guarantee a feedback for each development stage matching the timing and verification requirements for that stage.</a:t>
+            </a:r>
+          </a:p>
+          <a:p>
+            <a:endParaRPr lang="en-GB" baseline="0" noProof="0" dirty="0"/>
+          </a:p>
+          <a:p>
+            <a:r>
+              <a:rPr lang="en-GB" baseline="0" noProof="0" dirty="0"/>
+              <a:t>Click</a:t>
+            </a:r>
+          </a:p>
+          <a:p>
+            <a:endParaRPr lang="en-GB" baseline="0" noProof="0" dirty="0"/>
+          </a:p>
+          <a:p>
+            <a:r>
+              <a:rPr lang="en-GB" baseline="0" noProof="0" dirty="0"/>
+              <a:t>It must establish a high degree of acceptance of each developer, customer and project.</a:t>
+            </a:r>
+          </a:p>
+          <a:p>
+            <a:endParaRPr lang="en-GB" baseline="0" noProof="0" dirty="0"/>
+          </a:p>
+          <a:p>
+            <a:r>
+              <a:rPr lang="en-GB" baseline="0" noProof="0" dirty="0"/>
+              <a:t>We are certain that we are not the only company looking for such a strategy and trying to develop one by ourselves.</a:t>
+            </a:r>
+          </a:p>
+          <a:p>
+            <a:endParaRPr lang="en-US" baseline="0" noProof="0" dirty="0"/>
           </a:p>
         </p:txBody>
       </p:sp>
@@ -1283,53 +1248,69 @@
           <a:p>
             <a:pPr lvl="1"/>
             <a:r>
-              <a:rPr lang="en-US" dirty="0" smtClean="0"/>
-              <a:t>change old and archaic style of work</a:t>
+              <a:rPr lang="en-US" dirty="0"/>
+              <a:t>But the biggest challenge we face is to drive changes within our organization.</a:t>
             </a:r>
           </a:p>
           <a:p>
             <a:pPr lvl="1"/>
-            <a:r>
-              <a:rPr lang="en-US" dirty="0" smtClean="0"/>
-              <a:t>hard to convince</a:t>
-            </a:r>
+            <a:endParaRPr lang="en-US" dirty="0"/>
           </a:p>
           <a:p>
             <a:pPr lvl="1"/>
             <a:r>
-              <a:rPr lang="en-US" dirty="0" smtClean="0"/>
-              <a:t>requires time and patience from people to adapt and </a:t>
-            </a:r>
-            <a:r>
-              <a:rPr lang="en-US" dirty="0" smtClean="0"/>
-              <a:t>learn</a:t>
+              <a:rPr lang="en-US" dirty="0"/>
+              <a:t>How to change the way of developing software?</a:t>
             </a:r>
           </a:p>
           <a:p>
             <a:pPr lvl="1"/>
-            <a:r>
-              <a:rPr lang="en-US" dirty="0" smtClean="0"/>
-              <a:t>Usage of expensive tools</a:t>
-            </a:r>
+            <a:endParaRPr lang="en-US" dirty="0"/>
           </a:p>
           <a:p>
             <a:pPr lvl="1"/>
             <a:r>
-              <a:rPr lang="en-US" dirty="0" smtClean="0"/>
-              <a:t>Open Source</a:t>
-            </a:r>
-            <a:r>
-              <a:rPr lang="en-US" baseline="0" dirty="0" smtClean="0"/>
-              <a:t> is bad</a:t>
+              <a:rPr lang="en-US" dirty="0"/>
+              <a:t>How to train developers in state-of-the-art methods with a high degree of acceptance?</a:t>
             </a:r>
           </a:p>
           <a:p>
             <a:pPr lvl="1"/>
-            <a:r>
-              <a:rPr lang="en-US" baseline="0" dirty="0" smtClean="0"/>
-              <a:t>From projects to products</a:t>
-            </a:r>
-            <a:endParaRPr lang="en-US" dirty="0" smtClean="0"/>
+            <a:endParaRPr lang="en-US" dirty="0"/>
+          </a:p>
+          <a:p>
+            <a:pPr lvl="1"/>
+            <a:r>
+              <a:rPr lang="en-US" dirty="0"/>
+              <a:t>How to avoid the unnecessary usage of expensive tools just because they are expensive and certified?</a:t>
+            </a:r>
+          </a:p>
+          <a:p>
+            <a:pPr lvl="1"/>
+            <a:endParaRPr lang="en-US" dirty="0"/>
+          </a:p>
+          <a:p>
+            <a:pPr lvl="1"/>
+            <a:r>
+              <a:rPr lang="en-US" dirty="0"/>
+              <a:t>How to raise the acceptance of Open-Source</a:t>
+            </a:r>
+            <a:r>
+              <a:rPr lang="en-US" baseline="0" dirty="0"/>
+              <a:t> SW as something good, not evil?</a:t>
+            </a:r>
+          </a:p>
+          <a:p>
+            <a:pPr lvl="1"/>
+            <a:endParaRPr lang="en-US" baseline="0" dirty="0"/>
+          </a:p>
+          <a:p>
+            <a:pPr lvl="1"/>
+            <a:r>
+              <a:rPr lang="en-US" baseline="0" dirty="0"/>
+              <a:t>And finally regarding SPLE how to foster the transition from project development towards product development?</a:t>
+            </a:r>
+            <a:endParaRPr lang="en-US" dirty="0"/>
           </a:p>
           <a:p>
             <a:endParaRPr lang="de-DE" dirty="0"/>
@@ -1363,6 +1344,93 @@
     <p:extLst>
       <p:ext uri="{BB962C8B-B14F-4D97-AF65-F5344CB8AC3E}">
         <p14:creationId xmlns:p14="http://schemas.microsoft.com/office/powerpoint/2010/main" val="2313142025"/>
+      </p:ext>
+    </p:extLst>
+  </p:cSld>
+  <p:clrMapOvr>
+    <a:masterClrMapping/>
+  </p:clrMapOvr>
+</p:notes>
+</file>
+
+<file path=ppt/notesSlides/notesSlide7.xml><?xml version="1.0" encoding="utf-8"?>
+<p:notes xmlns:a="http://schemas.openxmlformats.org/drawingml/2006/main" xmlns:r="http://schemas.openxmlformats.org/officeDocument/2006/relationships" xmlns:p="http://schemas.openxmlformats.org/presentationml/2006/main">
+  <p:cSld>
+    <p:spTree>
+      <p:nvGrpSpPr>
+        <p:cNvPr id="1" name=""/>
+        <p:cNvGrpSpPr/>
+        <p:nvPr/>
+      </p:nvGrpSpPr>
+      <p:grpSpPr>
+        <a:xfrm>
+          <a:off x="0" y="0"/>
+          <a:ext cx="0" cy="0"/>
+          <a:chOff x="0" y="0"/>
+          <a:chExt cx="0" cy="0"/>
+        </a:xfrm>
+      </p:grpSpPr>
+      <p:sp>
+        <p:nvSpPr>
+          <p:cNvPr id="2" name="Slide Image Placeholder 1"/>
+          <p:cNvSpPr>
+            <a:spLocks noGrp="1" noRot="1" noChangeAspect="1"/>
+          </p:cNvSpPr>
+          <p:nvPr>
+            <p:ph type="sldImg"/>
+          </p:nvPr>
+        </p:nvSpPr>
+        <p:spPr/>
+      </p:sp>
+      <p:sp>
+        <p:nvSpPr>
+          <p:cNvPr id="3" name="Notes Placeholder 2"/>
+          <p:cNvSpPr>
+            <a:spLocks noGrp="1"/>
+          </p:cNvSpPr>
+          <p:nvPr>
+            <p:ph type="body" idx="1"/>
+          </p:nvPr>
+        </p:nvSpPr>
+        <p:spPr/>
+        <p:txBody>
+          <a:bodyPr/>
+          <a:lstStyle/>
+          <a:p>
+            <a:r>
+              <a:rPr lang="en-US" noProof="0" dirty="0"/>
+              <a:t>Thank you very much for your attention.</a:t>
+            </a:r>
+          </a:p>
+        </p:txBody>
+      </p:sp>
+      <p:sp>
+        <p:nvSpPr>
+          <p:cNvPr id="4" name="Slide Number Placeholder 3"/>
+          <p:cNvSpPr>
+            <a:spLocks noGrp="1"/>
+          </p:cNvSpPr>
+          <p:nvPr>
+            <p:ph type="sldNum" sz="quarter" idx="5"/>
+          </p:nvPr>
+        </p:nvSpPr>
+        <p:spPr/>
+        <p:txBody>
+          <a:bodyPr/>
+          <a:lstStyle/>
+          <a:p>
+            <a:fld id="{6861DCA0-EA5B-40AF-B6FE-AD6C6DAB16C9}" type="slidenum">
+              <a:rPr lang="en-US" smtClean="0"/>
+              <a:t>8</a:t>
+            </a:fld>
+            <a:endParaRPr lang="en-US"/>
+          </a:p>
+        </p:txBody>
+      </p:sp>
+    </p:spTree>
+    <p:extLst>
+      <p:ext uri="{BB962C8B-B14F-4D97-AF65-F5344CB8AC3E}">
+        <p14:creationId xmlns:p14="http://schemas.microsoft.com/office/powerpoint/2010/main" val="1279548537"/>
       </p:ext>
     </p:extLst>
   </p:cSld>
@@ -2122,13 +2190,6 @@
   <p:clrMapOvr>
     <a:masterClrMapping/>
   </p:clrMapOvr>
-  <p:timing>
-    <p:tnLst>
-      <p:par>
-        <p:cTn id="1" dur="indefinite" restart="never" nodeType="tmRoot"/>
-      </p:par>
-    </p:tnLst>
-  </p:timing>
 </p:sldLayout>
 </file>
 
@@ -2358,13 +2419,6 @@
   <p:clrMapOvr>
     <a:masterClrMapping/>
   </p:clrMapOvr>
-  <p:timing>
-    <p:tnLst>
-      <p:par>
-        <p:cTn id="1" dur="indefinite" restart="never" nodeType="tmRoot"/>
-      </p:par>
-    </p:tnLst>
-  </p:timing>
 </p:sldLayout>
 </file>
 
@@ -2546,7 +2600,7 @@
             </a:pPr>
             <a:fld id="{5A041D07-D634-42E1-A207-F238794E15C1}" type="datetime1">
               <a:rPr lang="de-DE" smtClean="0"/>
-              <a:t>23.08.2023</a:t>
+              <a:t>26.08.2023</a:t>
             </a:fld>
             <a:r>
               <a:rPr lang="de-DE"/>
@@ -2569,13 +2623,6 @@
   <p:clrMapOvr>
     <a:masterClrMapping/>
   </p:clrMapOvr>
-  <p:timing>
-    <p:tnLst>
-      <p:par>
-        <p:cTn id="1" dur="indefinite" restart="never" nodeType="tmRoot"/>
-      </p:par>
-    </p:tnLst>
-  </p:timing>
 </p:sldLayout>
 </file>
 
@@ -3066,7 +3113,7 @@
             </a:pPr>
             <a:fld id="{F0673D75-DA8D-43FF-B525-D907D1F7F66A}" type="datetime1">
               <a:rPr lang="de-DE" smtClean="0"/>
-              <a:t>23.08.2023</a:t>
+              <a:t>26.08.2023</a:t>
             </a:fld>
             <a:r>
               <a:rPr lang="de-DE"/>
@@ -3089,13 +3136,6 @@
   <p:clrMapOvr>
     <a:masterClrMapping/>
   </p:clrMapOvr>
-  <p:timing>
-    <p:tnLst>
-      <p:par>
-        <p:cTn id="1" dur="indefinite" restart="never" nodeType="tmRoot"/>
-      </p:par>
-    </p:tnLst>
-  </p:timing>
 </p:sldLayout>
 </file>
 
@@ -3365,7 +3405,7 @@
             </a:pPr>
             <a:fld id="{DBD5DA68-7E84-4C0E-854E-B0F2B8DCA9D2}" type="datetime1">
               <a:rPr lang="de-DE" smtClean="0"/>
-              <a:t>23.08.2023</a:t>
+              <a:t>26.08.2023</a:t>
             </a:fld>
             <a:r>
               <a:rPr lang="de-DE"/>
@@ -3388,13 +3428,6 @@
   <p:clrMapOvr>
     <a:masterClrMapping/>
   </p:clrMapOvr>
-  <p:timing>
-    <p:tnLst>
-      <p:par>
-        <p:cTn id="1" dur="indefinite" restart="never" nodeType="tmRoot"/>
-      </p:par>
-    </p:tnLst>
-  </p:timing>
 </p:sldLayout>
 </file>
 
@@ -3644,7 +3677,7 @@
             </a:pPr>
             <a:fld id="{147A2559-3B61-4F5F-A7EF-5560E7D1A675}" type="datetime1">
               <a:rPr lang="de-DE" smtClean="0"/>
-              <a:t>23.08.2023</a:t>
+              <a:t>26.08.2023</a:t>
             </a:fld>
             <a:r>
               <a:rPr lang="de-DE"/>
@@ -3667,13 +3700,6 @@
   <p:clrMapOvr>
     <a:masterClrMapping/>
   </p:clrMapOvr>
-  <p:timing>
-    <p:tnLst>
-      <p:par>
-        <p:cTn id="1" dur="indefinite" restart="never" nodeType="tmRoot"/>
-      </p:par>
-    </p:tnLst>
-  </p:timing>
 </p:sldLayout>
 </file>
 
@@ -3885,7 +3911,7 @@
             </a:pPr>
             <a:fld id="{755FB5E2-7FE3-4C1C-A546-197204CCDA16}" type="datetime1">
               <a:rPr lang="de-DE" smtClean="0"/>
-              <a:t>23.08.2023</a:t>
+              <a:t>26.08.2023</a:t>
             </a:fld>
             <a:r>
               <a:rPr lang="de-DE"/>
@@ -3908,13 +3934,6 @@
   <p:clrMapOvr>
     <a:masterClrMapping/>
   </p:clrMapOvr>
-  <p:timing>
-    <p:tnLst>
-      <p:par>
-        <p:cTn id="1" dur="indefinite" restart="never" nodeType="tmRoot"/>
-      </p:par>
-    </p:tnLst>
-  </p:timing>
 </p:sldLayout>
 </file>
 
@@ -4126,7 +4145,7 @@
             </a:pPr>
             <a:fld id="{81CCD47A-0074-44BC-8734-BF6EAC998E36}" type="datetime1">
               <a:rPr lang="de-DE" smtClean="0"/>
-              <a:t>23.08.2023</a:t>
+              <a:t>26.08.2023</a:t>
             </a:fld>
             <a:r>
               <a:rPr lang="de-DE"/>
@@ -4149,13 +4168,6 @@
   <p:clrMapOvr>
     <a:masterClrMapping/>
   </p:clrMapOvr>
-  <p:timing>
-    <p:tnLst>
-      <p:par>
-        <p:cTn id="1" dur="indefinite" restart="never" nodeType="tmRoot"/>
-      </p:par>
-    </p:tnLst>
-  </p:timing>
 </p:sldLayout>
 </file>
 
@@ -4469,13 +4481,6 @@
   <p:clrMapOvr>
     <a:masterClrMapping/>
   </p:clrMapOvr>
-  <p:timing>
-    <p:tnLst>
-      <p:par>
-        <p:cTn id="1" dur="indefinite" restart="never" nodeType="tmRoot"/>
-      </p:par>
-    </p:tnLst>
-  </p:timing>
 </p:sldLayout>
 </file>
 
@@ -4866,7 +4871,7 @@
             </a:pPr>
             <a:fld id="{5574D11F-C905-4175-8B64-CB517D2FB7C3}" type="datetime1">
               <a:rPr lang="de-DE" smtClean="0"/>
-              <a:t>23.08.2023</a:t>
+              <a:t>26.08.2023</a:t>
             </a:fld>
             <a:r>
               <a:rPr lang="de-DE"/>
@@ -5177,7 +5182,7 @@
             </a:pPr>
             <a:fld id="{D77CFE8E-984B-4302-B359-2ECB5119A227}" type="datetime1">
               <a:rPr lang="de-DE" smtClean="0"/>
-              <a:t>23.08.2023</a:t>
+              <a:t>26.08.2023</a:t>
             </a:fld>
             <a:r>
               <a:rPr lang="de-DE"/>
@@ -5450,7 +5455,7 @@
             </a:pPr>
             <a:fld id="{D56584F4-F398-4738-AD99-6398DC9DD831}" type="datetime1">
               <a:rPr lang="de-DE" smtClean="0"/>
-              <a:t>23.08.2023</a:t>
+              <a:t>26.08.2023</a:t>
             </a:fld>
             <a:r>
               <a:rPr lang="de-DE"/>
@@ -5866,7 +5871,7 @@
             </a:pPr>
             <a:fld id="{14732845-90F0-42CE-90DD-E35022D3F8C6}" type="datetime1">
               <a:rPr lang="de-DE" smtClean="0"/>
-              <a:t>23.08.2023</a:t>
+              <a:t>26.08.2023</a:t>
             </a:fld>
             <a:r>
               <a:rPr lang="de-DE"/>
@@ -6339,7 +6344,7 @@
             </a:pPr>
             <a:fld id="{73CC5BAB-03BE-45F4-B994-C5CD24A5BCC0}" type="datetime1">
               <a:rPr lang="de-DE" smtClean="0"/>
-              <a:t>23.08.2023</a:t>
+              <a:t>26.08.2023</a:t>
             </a:fld>
             <a:r>
               <a:rPr lang="de-DE"/>
@@ -6774,7 +6779,7 @@
             </a:pPr>
             <a:fld id="{EA2A0BDB-93C2-444F-A0BA-FEEB5088E33B}" type="datetime1">
               <a:rPr lang="de-DE" smtClean="0"/>
-              <a:t>23.08.2023</a:t>
+              <a:t>26.08.2023</a:t>
             </a:fld>
             <a:r>
               <a:rPr lang="de-DE"/>
@@ -6946,7 +6951,7 @@
             </a:pPr>
             <a:fld id="{9B661170-952C-4BD8-AFEA-42DFE43A999C}" type="datetime1">
               <a:rPr lang="de-DE" smtClean="0"/>
-              <a:t>23.08.2023</a:t>
+              <a:t>26.08.2023</a:t>
             </a:fld>
             <a:r>
               <a:rPr lang="de-DE"/>
@@ -7223,7 +7228,7 @@
             </a:pPr>
             <a:fld id="{76ABF5BD-B635-4C99-9CCA-A9340BB4110B}" type="datetime1">
               <a:rPr lang="de-DE" smtClean="0"/>
-              <a:t>23.08.2023</a:t>
+              <a:t>26.08.2023</a:t>
             </a:fld>
             <a:r>
               <a:rPr lang="de-DE"/>
@@ -7387,7 +7392,7 @@
             </a:pPr>
             <a:fld id="{73ED40B3-2315-470F-9E4B-3DD2B716DE09}" type="datetime1">
               <a:rPr lang="de-DE" smtClean="0"/>
-              <a:t>23.08.2023</a:t>
+              <a:t>26.08.2023</a:t>
             </a:fld>
             <a:r>
               <a:rPr lang="de-DE"/>
@@ -11037,7 +11042,7 @@
             </a:pPr>
             <a:fld id="{DC230993-0427-44C9-AB1D-56E4037C0994}" type="datetime1">
               <a:rPr lang="de-DE" smtClean="0"/>
-              <a:t>23.08.2023</a:t>
+              <a:t>26.08.2023</a:t>
             </a:fld>
             <a:r>
               <a:rPr lang="de-DE"/>
@@ -11575,10 +11580,9 @@
           <a:lstStyle/>
           <a:p>
             <a:r>
-              <a:rPr lang="en-US" b="1" dirty="0" smtClean="0"/>
+              <a:rPr lang="en-US" b="1" dirty="0"/>
               <a:t>INDUSTRY CHALLENGES</a:t>
             </a:r>
-            <a:endParaRPr lang="en-US" b="1" dirty="0"/>
           </a:p>
         </p:txBody>
       </p:sp>
@@ -11884,14 +11888,11 @@
             </a:lstStyle>
             <a:p>
               <a:r>
-                <a:rPr lang="en-US" sz="1000" b="1" cap="none" dirty="0" smtClean="0">
+                <a:rPr lang="en-US" sz="1000" b="1" cap="none" dirty="0">
                   <a:latin typeface="+mn-lt"/>
                 </a:rPr>
                 <a:t>Gabriela K. Michelon</a:t>
               </a:r>
-              <a:endParaRPr lang="en-US" sz="1000" b="1" cap="none" dirty="0">
-                <a:latin typeface="+mn-lt"/>
-              </a:endParaRPr>
             </a:p>
           </p:txBody>
         </p:sp>
@@ -12075,13 +12076,13 @@
             </a:lstStyle>
             <a:p>
               <a:r>
-                <a:rPr lang="en-US" sz="1000" b="1" cap="none" dirty="0" smtClean="0">
+                <a:rPr lang="en-US" sz="1000" b="1" cap="none" dirty="0">
                   <a:latin typeface="+mn-lt"/>
                 </a:rPr>
                 <a:t>Karsten</a:t>
               </a:r>
               <a:r>
-                <a:rPr lang="de-DE" sz="1000" b="1" cap="none" dirty="0" smtClean="0">
+                <a:rPr lang="de-DE" sz="1000" b="1" cap="none" dirty="0">
                   <a:latin typeface="+mn-lt"/>
                 </a:rPr>
                 <a:t> A. M. Guenther</a:t>
@@ -12185,13 +12186,6 @@
   <p:clrMapOvr>
     <a:masterClrMapping/>
   </p:clrMapOvr>
-  <p:timing>
-    <p:tnLst>
-      <p:par>
-        <p:cTn id="1" dur="indefinite" restart="never" nodeType="tmRoot"/>
-      </p:par>
-    </p:tnLst>
-  </p:timing>
 </p:sld>
 </file>
 
@@ -12228,10 +12222,9 @@
           <a:lstStyle/>
           <a:p>
             <a:r>
-              <a:rPr lang="en-US" dirty="0" smtClean="0"/>
+              <a:rPr lang="en-US" dirty="0"/>
               <a:t>Who is Marquardt?</a:t>
             </a:r>
-            <a:endParaRPr lang="en-US" dirty="0"/>
           </a:p>
         </p:txBody>
       </p:sp>
@@ -12247,7 +12240,7 @@
         </p:nvSpPr>
         <p:spPr>
           <a:xfrm>
-            <a:off x="471237" y="1141111"/>
+            <a:off x="421269" y="956350"/>
             <a:ext cx="10941830" cy="5534326"/>
           </a:xfrm>
         </p:spPr>
@@ -12258,17 +12251,12 @@
           <a:lstStyle/>
           <a:p>
             <a:r>
-              <a:rPr lang="en-US" sz="3300" dirty="0" smtClean="0"/>
-              <a:t>Creative </a:t>
-            </a:r>
-            <a:r>
               <a:rPr lang="en-US" sz="3300" dirty="0"/>
-              <a:t>mechatronics expert, founded in </a:t>
-            </a:r>
-            <a:r>
-              <a:rPr lang="en-US" sz="3300" dirty="0" smtClean="0"/>
-              <a:t>1925, </a:t>
-            </a:r>
+              <a:t>Creative mechatronics expert, founded in 1925</a:t>
+            </a:r>
+            <a:br>
+              <a:rPr lang="en-US" sz="3300" dirty="0"/>
+            </a:br>
             <a:r>
               <a:rPr lang="en-US" sz="3300" dirty="0"/>
               <a:t>22 locations and 11,000 employees</a:t>
@@ -12532,18 +12520,13 @@
                 <a:buNone/>
               </a:pPr>
               <a:r>
-                <a:rPr lang="en-US" sz="1400" dirty="0" smtClean="0">
+                <a:rPr lang="en-US" sz="1400" dirty="0">
                   <a:solidFill>
                     <a:schemeClr val="tx2"/>
                   </a:solidFill>
                 </a:rPr>
                 <a:t>Operating Components (HMI)</a:t>
               </a:r>
-              <a:endParaRPr lang="en-US" sz="1400" dirty="0">
-                <a:solidFill>
-                  <a:schemeClr val="tx2"/>
-                </a:solidFill>
-              </a:endParaRPr>
             </a:p>
           </p:txBody>
         </p:sp>
@@ -13044,14 +13027,11 @@
                 <a:buNone/>
               </a:pPr>
               <a:r>
-                <a:rPr lang="en-US" sz="1600" dirty="0" smtClean="0">
+                <a:rPr lang="en-US" sz="1600" dirty="0">
                   <a:latin typeface="Franklin Gothic Book" panose="020B0503020102020204" pitchFamily="34" charset="0"/>
                 </a:rPr>
                 <a:t>Switches and Sensors</a:t>
               </a:r>
-              <a:endParaRPr lang="en-US" sz="1600" dirty="0">
-                <a:latin typeface="Franklin Gothic Book" panose="020B0503020102020204" pitchFamily="34" charset="0"/>
-              </a:endParaRPr>
             </a:p>
           </p:txBody>
         </p:sp>
@@ -13305,14 +13285,11 @@
                 <a:buNone/>
               </a:pPr>
               <a:r>
-                <a:rPr lang="en-US" sz="1600" dirty="0" smtClean="0">
+                <a:rPr lang="en-US" sz="1600" dirty="0">
                   <a:latin typeface="Franklin Gothic Book" panose="020B0503020102020204" pitchFamily="34" charset="0"/>
                 </a:rPr>
                 <a:t>Drive Authorization Systems</a:t>
               </a:r>
-              <a:endParaRPr lang="en-US" sz="1600" dirty="0">
-                <a:latin typeface="Franklin Gothic Book" panose="020B0503020102020204" pitchFamily="34" charset="0"/>
-              </a:endParaRPr>
             </a:p>
           </p:txBody>
         </p:sp>
@@ -13566,14 +13543,11 @@
                 <a:buNone/>
               </a:pPr>
               <a:r>
-                <a:rPr lang="en-US" sz="1600" dirty="0" smtClean="0">
+                <a:rPr lang="en-US" sz="1600" dirty="0">
                   <a:latin typeface="Franklin Gothic Book" panose="020B0503020102020204" pitchFamily="34" charset="0"/>
                 </a:rPr>
                 <a:t>Lighting</a:t>
               </a:r>
-              <a:endParaRPr lang="en-US" sz="1600" dirty="0">
-                <a:latin typeface="Franklin Gothic Book" panose="020B0503020102020204" pitchFamily="34" charset="0"/>
-              </a:endParaRPr>
             </a:p>
           </p:txBody>
         </p:sp>
@@ -13827,14 +13801,11 @@
                 <a:buNone/>
               </a:pPr>
               <a:r>
-                <a:rPr lang="en-US" sz="1600" dirty="0" smtClean="0">
+                <a:rPr lang="en-US" sz="1600" dirty="0">
                   <a:latin typeface="Franklin Gothic Book" panose="020B0503020102020204" pitchFamily="34" charset="0"/>
                 </a:rPr>
                 <a:t>Battery Management</a:t>
               </a:r>
-              <a:endParaRPr lang="en-US" sz="1600" dirty="0">
-                <a:latin typeface="Franklin Gothic Book" panose="020B0503020102020204" pitchFamily="34" charset="0"/>
-              </a:endParaRPr>
             </a:p>
           </p:txBody>
         </p:sp>
@@ -14088,14 +14059,11 @@
                 <a:buNone/>
               </a:pPr>
               <a:r>
-                <a:rPr lang="en-US" sz="1600" dirty="0" smtClean="0">
+                <a:rPr lang="en-US" sz="1600" dirty="0">
                   <a:latin typeface="Franklin Gothic Book" panose="020B0503020102020204" pitchFamily="34" charset="0"/>
                 </a:rPr>
                 <a:t>Pumps</a:t>
               </a:r>
-              <a:endParaRPr lang="en-US" sz="1600" dirty="0">
-                <a:latin typeface="Franklin Gothic Book" panose="020B0503020102020204" pitchFamily="34" charset="0"/>
-              </a:endParaRPr>
             </a:p>
           </p:txBody>
         </p:sp>
@@ -14110,13 +14078,6 @@
   <p:clrMapOvr>
     <a:masterClrMapping/>
   </p:clrMapOvr>
-  <p:timing>
-    <p:tnLst>
-      <p:par>
-        <p:cTn id="1" dur="indefinite" restart="never" nodeType="tmRoot"/>
-      </p:par>
-    </p:tnLst>
-  </p:timing>
 </p:sld>
 </file>
 
@@ -14153,26 +14114,25 @@
           <a:lstStyle/>
           <a:p>
             <a:r>
-              <a:rPr lang="de-DE" dirty="0" smtClean="0"/>
+              <a:rPr lang="de-DE" dirty="0"/>
               <a:t>Who </a:t>
             </a:r>
             <a:r>
-              <a:rPr lang="de-DE" dirty="0" err="1" smtClean="0"/>
+              <a:rPr lang="de-DE" dirty="0" err="1"/>
               <a:t>are</a:t>
             </a:r>
             <a:r>
-              <a:rPr lang="de-DE" dirty="0" smtClean="0"/>
+              <a:rPr lang="de-DE" dirty="0"/>
               <a:t> </a:t>
             </a:r>
             <a:r>
-              <a:rPr lang="de-DE" dirty="0" err="1" smtClean="0"/>
+              <a:rPr lang="de-DE" dirty="0" err="1"/>
               <a:t>we</a:t>
             </a:r>
             <a:r>
-              <a:rPr lang="de-DE" dirty="0" smtClean="0"/>
+              <a:rPr lang="de-DE" dirty="0"/>
               <a:t>?</a:t>
             </a:r>
-            <a:endParaRPr lang="de-DE" dirty="0"/>
           </a:p>
         </p:txBody>
       </p:sp>
@@ -14199,23 +14159,14 @@
             <a:pPr fontAlgn="base"/>
             <a:r>
               <a:rPr lang="en-US" dirty="0"/>
-              <a:t>Rhine-Main Team (RMT</a:t>
-            </a:r>
-            <a:r>
-              <a:rPr lang="en-US" dirty="0" smtClean="0"/>
-              <a:t>)</a:t>
-            </a:r>
-            <a:endParaRPr lang="en-US" dirty="0"/>
+              <a:t>Rhine-Main Team (RMT)</a:t>
+            </a:r>
           </a:p>
           <a:p>
             <a:pPr fontAlgn="base"/>
             <a:r>
-              <a:rPr lang="en-US" dirty="0" smtClean="0"/>
-              <a:t>Located </a:t>
-            </a:r>
-            <a:r>
-              <a:rPr lang="en-US" dirty="0" smtClean="0"/>
-              <a:t>in Sulzbach, Germany (Rhine-Main area)</a:t>
+              <a:rPr lang="en-US" dirty="0"/>
+              <a:t>Located in Sulzbach, Germany (Rhine-Main area)</a:t>
             </a:r>
             <a:endParaRPr lang="de-DE" dirty="0"/>
           </a:p>
@@ -14223,11 +14174,7 @@
             <a:pPr fontAlgn="base"/>
             <a:r>
               <a:rPr lang="en-US" dirty="0"/>
-              <a:t>Working </a:t>
-            </a:r>
-            <a:r>
-              <a:rPr lang="en-US" dirty="0" smtClean="0"/>
-              <a:t>on</a:t>
+              <a:t>Working on</a:t>
             </a:r>
             <a:endParaRPr lang="de-DE" dirty="0"/>
           </a:p>
@@ -14982,61 +14929,9 @@
           <a:lstStyle/>
           <a:p>
             <a:r>
-              <a:rPr lang="en-US" dirty="0" smtClean="0"/>
-              <a:t>Variants Configuration with Kconfig</a:t>
-            </a:r>
-            <a:endParaRPr lang="en-US" dirty="0"/>
-          </a:p>
-        </p:txBody>
-      </p:sp>
-      <p:sp>
-        <p:nvSpPr>
-          <p:cNvPr id="3" name="Content Placeholder 2"/>
-          <p:cNvSpPr>
-            <a:spLocks noGrp="1"/>
-          </p:cNvSpPr>
-          <p:nvPr>
-            <p:ph idx="1"/>
-          </p:nvPr>
-        </p:nvSpPr>
-        <p:spPr>
-          <a:xfrm>
-            <a:off x="838200" y="1825625"/>
-            <a:ext cx="6155267" cy="4351338"/>
-          </a:xfrm>
-        </p:spPr>
-        <p:txBody>
-          <a:bodyPr/>
-          <a:lstStyle/>
-          <a:p>
-            <a:pPr fontAlgn="base"/>
-            <a:r>
-              <a:rPr lang="en-US" dirty="0" smtClean="0"/>
-              <a:t>Usability</a:t>
-            </a:r>
-          </a:p>
-          <a:p>
-            <a:pPr fontAlgn="base"/>
-            <a:endParaRPr lang="en-US" dirty="0"/>
-          </a:p>
-          <a:p>
-            <a:pPr fontAlgn="base"/>
-            <a:r>
-              <a:rPr lang="en-US" dirty="0" smtClean="0"/>
-              <a:t>Overview of features</a:t>
-            </a:r>
-          </a:p>
-          <a:p>
-            <a:pPr fontAlgn="base"/>
-            <a:endParaRPr lang="en-US" dirty="0" smtClean="0"/>
-          </a:p>
-          <a:p>
-            <a:pPr fontAlgn="base"/>
-            <a:r>
-              <a:rPr lang="en-US" dirty="0" smtClean="0"/>
-              <a:t>Configuration of features</a:t>
-            </a:r>
-            <a:endParaRPr lang="de-DE" dirty="0"/>
+              <a:rPr lang="en-US" dirty="0"/>
+              <a:t> Challenge: Variant Handling in Automotive SPICE</a:t>
+            </a:r>
           </a:p>
         </p:txBody>
       </p:sp>
@@ -15081,13 +14976,13 @@
       </p:sp>
       <p:pic>
         <p:nvPicPr>
-          <p:cNvPr id="8" name="Picture 7"/>
+          <p:cNvPr id="5" name="Picture 2" descr="https://docs.marquardt.de/download/attachments/97530829/image2022-2-2_7-45-4.png?version=1&amp;modificationDate=1643784304000&amp;api=v2"/>
           <p:cNvPicPr>
-            <a:picLocks noChangeAspect="1"/>
+            <a:picLocks noChangeAspect="1" noChangeArrowheads="1"/>
           </p:cNvPicPr>
           <p:nvPr/>
         </p:nvPicPr>
-        <p:blipFill>
+        <p:blipFill rotWithShape="1">
           <a:blip r:embed="rId3">
             <a:extLst>
               <a:ext uri="{28A0092B-C50C-407E-A947-70E740481C1C}">
@@ -15095,34 +14990,33 @@
               </a:ext>
             </a:extLst>
           </a:blip>
-          <a:stretch>
-            <a:fillRect/>
-          </a:stretch>
+          <a:srcRect l="4533"/>
+          <a:stretch/>
         </p:blipFill>
-        <p:spPr>
+        <p:spPr bwMode="auto">
           <a:xfrm>
-            <a:off x="5729036" y="1722500"/>
-            <a:ext cx="5015163" cy="4583114"/>
+            <a:off x="1807710" y="902636"/>
+            <a:ext cx="9037499" cy="5689863"/>
           </a:xfrm>
           <a:prstGeom prst="rect">
             <a:avLst/>
           </a:prstGeom>
-          <a:ln>
-            <a:noFill/>
-          </a:ln>
-          <a:effectLst>
-            <a:outerShdw blurRad="190500" algn="tl" rotWithShape="0">
-              <a:srgbClr val="000000">
-                <a:alpha val="70000"/>
-              </a:srgbClr>
-            </a:outerShdw>
-          </a:effectLst>
+          <a:noFill/>
+          <a:extLst>
+            <a:ext uri="{909E8E84-426E-40DD-AFC4-6F175D3DCCD1}">
+              <a14:hiddenFill xmlns:a14="http://schemas.microsoft.com/office/drawing/2010/main">
+                <a:solidFill>
+                  <a:srgbClr val="FFFFFF"/>
+                </a:solidFill>
+              </a14:hiddenFill>
+            </a:ext>
+          </a:extLst>
         </p:spPr>
       </p:pic>
     </p:spTree>
     <p:extLst>
       <p:ext uri="{BB962C8B-B14F-4D97-AF65-F5344CB8AC3E}">
-        <p14:creationId xmlns:p14="http://schemas.microsoft.com/office/powerpoint/2010/main" val="1669189669"/>
+        <p14:creationId xmlns:p14="http://schemas.microsoft.com/office/powerpoint/2010/main" val="3559390204"/>
       </p:ext>
     </p:extLst>
   </p:cSld>
@@ -15132,7 +15026,83 @@
   <p:timing>
     <p:tnLst>
       <p:par>
-        <p:cTn id="1" dur="indefinite" restart="never" nodeType="tmRoot"/>
+        <p:cTn id="1" dur="indefinite" restart="never" nodeType="tmRoot">
+          <p:childTnLst>
+            <p:seq concurrent="1" nextAc="seek">
+              <p:cTn id="2" dur="indefinite" nodeType="mainSeq">
+                <p:childTnLst>
+                  <p:par>
+                    <p:cTn id="3" fill="hold">
+                      <p:stCondLst>
+                        <p:cond delay="indefinite"/>
+                      </p:stCondLst>
+                      <p:childTnLst>
+                        <p:par>
+                          <p:cTn id="4" fill="hold">
+                            <p:stCondLst>
+                              <p:cond delay="0"/>
+                            </p:stCondLst>
+                            <p:childTnLst>
+                              <p:par>
+                                <p:cTn id="5" presetID="10" presetClass="entr" presetSubtype="0" fill="hold" nodeType="clickEffect">
+                                  <p:stCondLst>
+                                    <p:cond delay="0"/>
+                                  </p:stCondLst>
+                                  <p:childTnLst>
+                                    <p:set>
+                                      <p:cBhvr>
+                                        <p:cTn id="6" dur="1" fill="hold">
+                                          <p:stCondLst>
+                                            <p:cond delay="0"/>
+                                          </p:stCondLst>
+                                        </p:cTn>
+                                        <p:tgtEl>
+                                          <p:spTgt spid="5"/>
+                                        </p:tgtEl>
+                                        <p:attrNameLst>
+                                          <p:attrName>style.visibility</p:attrName>
+                                        </p:attrNameLst>
+                                      </p:cBhvr>
+                                      <p:to>
+                                        <p:strVal val="visible"/>
+                                      </p:to>
+                                    </p:set>
+                                    <p:animEffect transition="in" filter="fade">
+                                      <p:cBhvr>
+                                        <p:cTn id="7" dur="500"/>
+                                        <p:tgtEl>
+                                          <p:spTgt spid="5"/>
+                                        </p:tgtEl>
+                                      </p:cBhvr>
+                                    </p:animEffect>
+                                  </p:childTnLst>
+                                </p:cTn>
+                              </p:par>
+                            </p:childTnLst>
+                          </p:cTn>
+                        </p:par>
+                      </p:childTnLst>
+                    </p:cTn>
+                  </p:par>
+                </p:childTnLst>
+              </p:cTn>
+              <p:prevCondLst>
+                <p:cond evt="onPrev" delay="0">
+                  <p:tgtEl>
+                    <p:sldTgt/>
+                  </p:tgtEl>
+                </p:cond>
+              </p:prevCondLst>
+              <p:nextCondLst>
+                <p:cond evt="onNext" delay="0">
+                  <p:tgtEl>
+                    <p:sldTgt/>
+                  </p:tgtEl>
+                </p:cond>
+              </p:nextCondLst>
+            </p:seq>
+          </p:childTnLst>
+        </p:cTn>
       </p:par>
     </p:tnLst>
   </p:timing>
@@ -15172,8 +15142,8 @@
           <a:lstStyle/>
           <a:p>
             <a:r>
-              <a:rPr lang="de-DE" dirty="0"/>
-              <a:t> Automotive SPICE</a:t>
+              <a:rPr lang="en-US" dirty="0"/>
+              <a:t>Challenge: Variant Configuration with Kconfig</a:t>
             </a:r>
           </a:p>
         </p:txBody>
@@ -15191,52 +15161,20 @@
         <p:spPr>
           <a:xfrm>
             <a:off x="838200" y="1825625"/>
-            <a:ext cx="5969000" cy="4351338"/>
+            <a:ext cx="6155267" cy="683659"/>
           </a:xfrm>
         </p:spPr>
         <p:txBody>
-          <a:bodyPr/>
+          <a:bodyPr>
+            <a:normAutofit/>
+          </a:bodyPr>
           <a:lstStyle/>
           <a:p>
             <a:pPr fontAlgn="base"/>
             <a:r>
-              <a:rPr lang="en-US" dirty="0" smtClean="0"/>
-              <a:t>Documentation</a:t>
-            </a:r>
-          </a:p>
-          <a:p>
-            <a:pPr fontAlgn="base"/>
-            <a:endParaRPr lang="de-DE" dirty="0"/>
-          </a:p>
-          <a:p>
-            <a:pPr fontAlgn="base"/>
-            <a:r>
-              <a:rPr lang="en-US" dirty="0" smtClean="0"/>
-              <a:t>Requirements</a:t>
-            </a:r>
-          </a:p>
-          <a:p>
-            <a:pPr fontAlgn="base"/>
-            <a:endParaRPr lang="de-DE" dirty="0"/>
-          </a:p>
-          <a:p>
-            <a:pPr fontAlgn="base"/>
-            <a:r>
-              <a:rPr lang="en-US" dirty="0" smtClean="0"/>
-              <a:t>Reporting</a:t>
-            </a:r>
-          </a:p>
-          <a:p>
-            <a:pPr fontAlgn="base"/>
-            <a:endParaRPr lang="en-US" dirty="0" smtClean="0"/>
-          </a:p>
-          <a:p>
-            <a:pPr fontAlgn="base"/>
-            <a:r>
-              <a:rPr lang="en-US" dirty="0" smtClean="0"/>
-              <a:t>Traceability</a:t>
-            </a:r>
-            <a:endParaRPr lang="de-DE" dirty="0"/>
+              <a:rPr lang="en-US" dirty="0"/>
+              <a:t>Usability</a:t>
+            </a:r>
           </a:p>
         </p:txBody>
       </p:sp>
@@ -15281,13 +15219,13 @@
       </p:sp>
       <p:pic>
         <p:nvPicPr>
-          <p:cNvPr id="5" name="Picture 2" descr="https://docs.marquardt.de/download/attachments/97530829/image2022-2-2_7-45-4.png?version=1&amp;modificationDate=1643784304000&amp;api=v2"/>
+          <p:cNvPr id="8" name="Picture 7"/>
           <p:cNvPicPr>
-            <a:picLocks noChangeAspect="1" noChangeArrowheads="1"/>
+            <a:picLocks noChangeAspect="1"/>
           </p:cNvPicPr>
           <p:nvPr/>
         </p:nvPicPr>
-        <p:blipFill rotWithShape="1">
+        <p:blipFill>
           <a:blip r:embed="rId3">
             <a:extLst>
               <a:ext uri="{28A0092B-C50C-407E-A947-70E740481C1C}">
@@ -15295,33 +15233,422 @@
               </a:ext>
             </a:extLst>
           </a:blip>
-          <a:srcRect l="4533"/>
-          <a:stretch/>
+          <a:stretch>
+            <a:fillRect/>
+          </a:stretch>
         </p:blipFill>
-        <p:spPr bwMode="auto">
+        <p:spPr>
           <a:xfrm>
-            <a:off x="3924300" y="1330570"/>
-            <a:ext cx="7912100" cy="4981330"/>
+            <a:off x="5971674" y="1244035"/>
+            <a:ext cx="5015163" cy="4583114"/>
           </a:xfrm>
           <a:prstGeom prst="rect">
             <a:avLst/>
           </a:prstGeom>
-          <a:noFill/>
-          <a:extLst>
-            <a:ext uri="{909E8E84-426E-40DD-AFC4-6F175D3DCCD1}">
-              <a14:hiddenFill xmlns:a14="http://schemas.microsoft.com/office/drawing/2010/main">
-                <a:solidFill>
-                  <a:srgbClr val="FFFFFF"/>
-                </a:solidFill>
-              </a14:hiddenFill>
-            </a:ext>
-          </a:extLst>
+          <a:ln>
+            <a:noFill/>
+          </a:ln>
+          <a:effectLst>
+            <a:outerShdw blurRad="190500" algn="tl" rotWithShape="0">
+              <a:srgbClr val="000000">
+                <a:alpha val="70000"/>
+              </a:srgbClr>
+            </a:outerShdw>
+          </a:effectLst>
         </p:spPr>
       </p:pic>
+      <p:sp>
+        <p:nvSpPr>
+          <p:cNvPr id="6" name="Content Placeholder 2"/>
+          <p:cNvSpPr txBox="1">
+            <a:spLocks/>
+          </p:cNvSpPr>
+          <p:nvPr/>
+        </p:nvSpPr>
+        <p:spPr>
+          <a:xfrm>
+            <a:off x="838199" y="3056308"/>
+            <a:ext cx="6155267" cy="654454"/>
+          </a:xfrm>
+          <a:prstGeom prst="rect">
+            <a:avLst/>
+          </a:prstGeom>
+        </p:spPr>
+        <p:txBody>
+          <a:bodyPr vert="horz" lIns="91440" tIns="45720" rIns="91440" bIns="45720" rtlCol="0">
+            <a:normAutofit/>
+          </a:bodyPr>
+          <a:lstStyle>
+            <a:lvl1pPr marL="228600" indent="-228600" algn="l" defTabSz="914400" rtl="0" eaLnBrk="1" latinLnBrk="0" hangingPunct="1">
+              <a:lnSpc>
+                <a:spcPct val="90000"/>
+              </a:lnSpc>
+              <a:spcBef>
+                <a:spcPts val="1000"/>
+              </a:spcBef>
+              <a:buFont typeface="Arial" panose="020B0604020202020204" pitchFamily="34" charset="0"/>
+              <a:buChar char="•"/>
+              <a:defRPr sz="2800" kern="1200">
+                <a:solidFill>
+                  <a:srgbClr val="595959"/>
+                </a:solidFill>
+                <a:latin typeface="Franklin Gothic Book" panose="020B0503020102020204" pitchFamily="34" charset="0"/>
+                <a:ea typeface="+mn-ea"/>
+                <a:cs typeface="+mn-cs"/>
+              </a:defRPr>
+            </a:lvl1pPr>
+            <a:lvl2pPr marL="685800" indent="-228600" algn="l" defTabSz="914400" rtl="0" eaLnBrk="1" latinLnBrk="0" hangingPunct="1">
+              <a:lnSpc>
+                <a:spcPct val="90000"/>
+              </a:lnSpc>
+              <a:spcBef>
+                <a:spcPts val="500"/>
+              </a:spcBef>
+              <a:buFont typeface="Arial" panose="020B0604020202020204" pitchFamily="34" charset="0"/>
+              <a:buChar char="•"/>
+              <a:defRPr sz="2400" kern="1200">
+                <a:solidFill>
+                  <a:srgbClr val="595959"/>
+                </a:solidFill>
+                <a:latin typeface="Franklin Gothic Book" panose="020B0503020102020204" pitchFamily="34" charset="0"/>
+                <a:ea typeface="+mn-ea"/>
+                <a:cs typeface="+mn-cs"/>
+              </a:defRPr>
+            </a:lvl2pPr>
+            <a:lvl3pPr marL="1143000" indent="-228600" algn="l" defTabSz="914400" rtl="0" eaLnBrk="1" latinLnBrk="0" hangingPunct="1">
+              <a:lnSpc>
+                <a:spcPct val="90000"/>
+              </a:lnSpc>
+              <a:spcBef>
+                <a:spcPts val="500"/>
+              </a:spcBef>
+              <a:buFont typeface="Arial" panose="020B0604020202020204" pitchFamily="34" charset="0"/>
+              <a:buChar char="•"/>
+              <a:defRPr sz="2000" kern="1200">
+                <a:solidFill>
+                  <a:srgbClr val="595959"/>
+                </a:solidFill>
+                <a:latin typeface="Franklin Gothic Book" panose="020B0503020102020204" pitchFamily="34" charset="0"/>
+                <a:ea typeface="+mn-ea"/>
+                <a:cs typeface="+mn-cs"/>
+              </a:defRPr>
+            </a:lvl3pPr>
+            <a:lvl4pPr marL="1600200" indent="-228600" algn="l" defTabSz="914400" rtl="0" eaLnBrk="1" latinLnBrk="0" hangingPunct="1">
+              <a:lnSpc>
+                <a:spcPct val="90000"/>
+              </a:lnSpc>
+              <a:spcBef>
+                <a:spcPts val="500"/>
+              </a:spcBef>
+              <a:buFont typeface="Arial" panose="020B0604020202020204" pitchFamily="34" charset="0"/>
+              <a:buChar char="•"/>
+              <a:defRPr sz="1800" kern="1200">
+                <a:solidFill>
+                  <a:srgbClr val="595959"/>
+                </a:solidFill>
+                <a:latin typeface="Franklin Gothic Book" panose="020B0503020102020204" pitchFamily="34" charset="0"/>
+                <a:ea typeface="+mn-ea"/>
+                <a:cs typeface="+mn-cs"/>
+              </a:defRPr>
+            </a:lvl4pPr>
+            <a:lvl5pPr marL="2057400" indent="-228600" algn="l" defTabSz="914400" rtl="0" eaLnBrk="1" latinLnBrk="0" hangingPunct="1">
+              <a:lnSpc>
+                <a:spcPct val="90000"/>
+              </a:lnSpc>
+              <a:spcBef>
+                <a:spcPts val="500"/>
+              </a:spcBef>
+              <a:buFont typeface="Arial" panose="020B0604020202020204" pitchFamily="34" charset="0"/>
+              <a:buChar char="•"/>
+              <a:defRPr sz="1800" kern="1200">
+                <a:solidFill>
+                  <a:srgbClr val="595959"/>
+                </a:solidFill>
+                <a:latin typeface="Franklin Gothic Book" panose="020B0503020102020204" pitchFamily="34" charset="0"/>
+                <a:ea typeface="+mn-ea"/>
+                <a:cs typeface="+mn-cs"/>
+              </a:defRPr>
+            </a:lvl5pPr>
+            <a:lvl6pPr marL="2514600" indent="-228600" algn="l" defTabSz="914400" rtl="0" eaLnBrk="1" latinLnBrk="0" hangingPunct="1">
+              <a:lnSpc>
+                <a:spcPct val="90000"/>
+              </a:lnSpc>
+              <a:spcBef>
+                <a:spcPts val="500"/>
+              </a:spcBef>
+              <a:buFont typeface="Arial" panose="020B0604020202020204" pitchFamily="34" charset="0"/>
+              <a:buChar char="•"/>
+              <a:defRPr sz="1800" kern="1200">
+                <a:solidFill>
+                  <a:schemeClr val="tx1"/>
+                </a:solidFill>
+                <a:latin typeface="+mn-lt"/>
+                <a:ea typeface="+mn-ea"/>
+                <a:cs typeface="+mn-cs"/>
+              </a:defRPr>
+            </a:lvl6pPr>
+            <a:lvl7pPr marL="2971800" indent="-228600" algn="l" defTabSz="914400" rtl="0" eaLnBrk="1" latinLnBrk="0" hangingPunct="1">
+              <a:lnSpc>
+                <a:spcPct val="90000"/>
+              </a:lnSpc>
+              <a:spcBef>
+                <a:spcPts val="500"/>
+              </a:spcBef>
+              <a:buFont typeface="Arial" panose="020B0604020202020204" pitchFamily="34" charset="0"/>
+              <a:buChar char="•"/>
+              <a:defRPr sz="1800" kern="1200">
+                <a:solidFill>
+                  <a:schemeClr val="tx1"/>
+                </a:solidFill>
+                <a:latin typeface="+mn-lt"/>
+                <a:ea typeface="+mn-ea"/>
+                <a:cs typeface="+mn-cs"/>
+              </a:defRPr>
+            </a:lvl7pPr>
+            <a:lvl8pPr marL="3429000" indent="-228600" algn="l" defTabSz="914400" rtl="0" eaLnBrk="1" latinLnBrk="0" hangingPunct="1">
+              <a:lnSpc>
+                <a:spcPct val="90000"/>
+              </a:lnSpc>
+              <a:spcBef>
+                <a:spcPts val="500"/>
+              </a:spcBef>
+              <a:buFont typeface="Arial" panose="020B0604020202020204" pitchFamily="34" charset="0"/>
+              <a:buChar char="•"/>
+              <a:defRPr sz="1800" kern="1200">
+                <a:solidFill>
+                  <a:schemeClr val="tx1"/>
+                </a:solidFill>
+                <a:latin typeface="+mn-lt"/>
+                <a:ea typeface="+mn-ea"/>
+                <a:cs typeface="+mn-cs"/>
+              </a:defRPr>
+            </a:lvl8pPr>
+            <a:lvl9pPr marL="3886200" indent="-228600" algn="l" defTabSz="914400" rtl="0" eaLnBrk="1" latinLnBrk="0" hangingPunct="1">
+              <a:lnSpc>
+                <a:spcPct val="90000"/>
+              </a:lnSpc>
+              <a:spcBef>
+                <a:spcPts val="500"/>
+              </a:spcBef>
+              <a:buFont typeface="Arial" panose="020B0604020202020204" pitchFamily="34" charset="0"/>
+              <a:buChar char="•"/>
+              <a:defRPr sz="1800" kern="1200">
+                <a:solidFill>
+                  <a:schemeClr val="tx1"/>
+                </a:solidFill>
+                <a:latin typeface="+mn-lt"/>
+                <a:ea typeface="+mn-ea"/>
+                <a:cs typeface="+mn-cs"/>
+              </a:defRPr>
+            </a:lvl9pPr>
+          </a:lstStyle>
+          <a:p>
+            <a:pPr fontAlgn="base"/>
+            <a:r>
+              <a:rPr lang="en-US" dirty="0"/>
+              <a:t>Overview of features</a:t>
+            </a:r>
+          </a:p>
+        </p:txBody>
+      </p:sp>
+      <p:sp>
+        <p:nvSpPr>
+          <p:cNvPr id="7" name="Content Placeholder 2"/>
+          <p:cNvSpPr txBox="1">
+            <a:spLocks/>
+          </p:cNvSpPr>
+          <p:nvPr/>
+        </p:nvSpPr>
+        <p:spPr>
+          <a:xfrm>
+            <a:off x="838198" y="4384140"/>
+            <a:ext cx="6155267" cy="654454"/>
+          </a:xfrm>
+          <a:prstGeom prst="rect">
+            <a:avLst/>
+          </a:prstGeom>
+        </p:spPr>
+        <p:txBody>
+          <a:bodyPr vert="horz" lIns="91440" tIns="45720" rIns="91440" bIns="45720" rtlCol="0">
+            <a:normAutofit/>
+          </a:bodyPr>
+          <a:lstStyle>
+            <a:lvl1pPr marL="228600" indent="-228600" algn="l" defTabSz="914400" rtl="0" eaLnBrk="1" latinLnBrk="0" hangingPunct="1">
+              <a:lnSpc>
+                <a:spcPct val="90000"/>
+              </a:lnSpc>
+              <a:spcBef>
+                <a:spcPts val="1000"/>
+              </a:spcBef>
+              <a:buFont typeface="Arial" panose="020B0604020202020204" pitchFamily="34" charset="0"/>
+              <a:buChar char="•"/>
+              <a:defRPr sz="2800" kern="1200">
+                <a:solidFill>
+                  <a:srgbClr val="595959"/>
+                </a:solidFill>
+                <a:latin typeface="Franklin Gothic Book" panose="020B0503020102020204" pitchFamily="34" charset="0"/>
+                <a:ea typeface="+mn-ea"/>
+                <a:cs typeface="+mn-cs"/>
+              </a:defRPr>
+            </a:lvl1pPr>
+            <a:lvl2pPr marL="685800" indent="-228600" algn="l" defTabSz="914400" rtl="0" eaLnBrk="1" latinLnBrk="0" hangingPunct="1">
+              <a:lnSpc>
+                <a:spcPct val="90000"/>
+              </a:lnSpc>
+              <a:spcBef>
+                <a:spcPts val="500"/>
+              </a:spcBef>
+              <a:buFont typeface="Arial" panose="020B0604020202020204" pitchFamily="34" charset="0"/>
+              <a:buChar char="•"/>
+              <a:defRPr sz="2400" kern="1200">
+                <a:solidFill>
+                  <a:srgbClr val="595959"/>
+                </a:solidFill>
+                <a:latin typeface="Franklin Gothic Book" panose="020B0503020102020204" pitchFamily="34" charset="0"/>
+                <a:ea typeface="+mn-ea"/>
+                <a:cs typeface="+mn-cs"/>
+              </a:defRPr>
+            </a:lvl2pPr>
+            <a:lvl3pPr marL="1143000" indent="-228600" algn="l" defTabSz="914400" rtl="0" eaLnBrk="1" latinLnBrk="0" hangingPunct="1">
+              <a:lnSpc>
+                <a:spcPct val="90000"/>
+              </a:lnSpc>
+              <a:spcBef>
+                <a:spcPts val="500"/>
+              </a:spcBef>
+              <a:buFont typeface="Arial" panose="020B0604020202020204" pitchFamily="34" charset="0"/>
+              <a:buChar char="•"/>
+              <a:defRPr sz="2000" kern="1200">
+                <a:solidFill>
+                  <a:srgbClr val="595959"/>
+                </a:solidFill>
+                <a:latin typeface="Franklin Gothic Book" panose="020B0503020102020204" pitchFamily="34" charset="0"/>
+                <a:ea typeface="+mn-ea"/>
+                <a:cs typeface="+mn-cs"/>
+              </a:defRPr>
+            </a:lvl3pPr>
+            <a:lvl4pPr marL="1600200" indent="-228600" algn="l" defTabSz="914400" rtl="0" eaLnBrk="1" latinLnBrk="0" hangingPunct="1">
+              <a:lnSpc>
+                <a:spcPct val="90000"/>
+              </a:lnSpc>
+              <a:spcBef>
+                <a:spcPts val="500"/>
+              </a:spcBef>
+              <a:buFont typeface="Arial" panose="020B0604020202020204" pitchFamily="34" charset="0"/>
+              <a:buChar char="•"/>
+              <a:defRPr sz="1800" kern="1200">
+                <a:solidFill>
+                  <a:srgbClr val="595959"/>
+                </a:solidFill>
+                <a:latin typeface="Franklin Gothic Book" panose="020B0503020102020204" pitchFamily="34" charset="0"/>
+                <a:ea typeface="+mn-ea"/>
+                <a:cs typeface="+mn-cs"/>
+              </a:defRPr>
+            </a:lvl4pPr>
+            <a:lvl5pPr marL="2057400" indent="-228600" algn="l" defTabSz="914400" rtl="0" eaLnBrk="1" latinLnBrk="0" hangingPunct="1">
+              <a:lnSpc>
+                <a:spcPct val="90000"/>
+              </a:lnSpc>
+              <a:spcBef>
+                <a:spcPts val="500"/>
+              </a:spcBef>
+              <a:buFont typeface="Arial" panose="020B0604020202020204" pitchFamily="34" charset="0"/>
+              <a:buChar char="•"/>
+              <a:defRPr sz="1800" kern="1200">
+                <a:solidFill>
+                  <a:srgbClr val="595959"/>
+                </a:solidFill>
+                <a:latin typeface="Franklin Gothic Book" panose="020B0503020102020204" pitchFamily="34" charset="0"/>
+                <a:ea typeface="+mn-ea"/>
+                <a:cs typeface="+mn-cs"/>
+              </a:defRPr>
+            </a:lvl5pPr>
+            <a:lvl6pPr marL="2514600" indent="-228600" algn="l" defTabSz="914400" rtl="0" eaLnBrk="1" latinLnBrk="0" hangingPunct="1">
+              <a:lnSpc>
+                <a:spcPct val="90000"/>
+              </a:lnSpc>
+              <a:spcBef>
+                <a:spcPts val="500"/>
+              </a:spcBef>
+              <a:buFont typeface="Arial" panose="020B0604020202020204" pitchFamily="34" charset="0"/>
+              <a:buChar char="•"/>
+              <a:defRPr sz="1800" kern="1200">
+                <a:solidFill>
+                  <a:schemeClr val="tx1"/>
+                </a:solidFill>
+                <a:latin typeface="+mn-lt"/>
+                <a:ea typeface="+mn-ea"/>
+                <a:cs typeface="+mn-cs"/>
+              </a:defRPr>
+            </a:lvl6pPr>
+            <a:lvl7pPr marL="2971800" indent="-228600" algn="l" defTabSz="914400" rtl="0" eaLnBrk="1" latinLnBrk="0" hangingPunct="1">
+              <a:lnSpc>
+                <a:spcPct val="90000"/>
+              </a:lnSpc>
+              <a:spcBef>
+                <a:spcPts val="500"/>
+              </a:spcBef>
+              <a:buFont typeface="Arial" panose="020B0604020202020204" pitchFamily="34" charset="0"/>
+              <a:buChar char="•"/>
+              <a:defRPr sz="1800" kern="1200">
+                <a:solidFill>
+                  <a:schemeClr val="tx1"/>
+                </a:solidFill>
+                <a:latin typeface="+mn-lt"/>
+                <a:ea typeface="+mn-ea"/>
+                <a:cs typeface="+mn-cs"/>
+              </a:defRPr>
+            </a:lvl7pPr>
+            <a:lvl8pPr marL="3429000" indent="-228600" algn="l" defTabSz="914400" rtl="0" eaLnBrk="1" latinLnBrk="0" hangingPunct="1">
+              <a:lnSpc>
+                <a:spcPct val="90000"/>
+              </a:lnSpc>
+              <a:spcBef>
+                <a:spcPts val="500"/>
+              </a:spcBef>
+              <a:buFont typeface="Arial" panose="020B0604020202020204" pitchFamily="34" charset="0"/>
+              <a:buChar char="•"/>
+              <a:defRPr sz="1800" kern="1200">
+                <a:solidFill>
+                  <a:schemeClr val="tx1"/>
+                </a:solidFill>
+                <a:latin typeface="+mn-lt"/>
+                <a:ea typeface="+mn-ea"/>
+                <a:cs typeface="+mn-cs"/>
+              </a:defRPr>
+            </a:lvl8pPr>
+            <a:lvl9pPr marL="3886200" indent="-228600" algn="l" defTabSz="914400" rtl="0" eaLnBrk="1" latinLnBrk="0" hangingPunct="1">
+              <a:lnSpc>
+                <a:spcPct val="90000"/>
+              </a:lnSpc>
+              <a:spcBef>
+                <a:spcPts val="500"/>
+              </a:spcBef>
+              <a:buFont typeface="Arial" panose="020B0604020202020204" pitchFamily="34" charset="0"/>
+              <a:buChar char="•"/>
+              <a:defRPr sz="1800" kern="1200">
+                <a:solidFill>
+                  <a:schemeClr val="tx1"/>
+                </a:solidFill>
+                <a:latin typeface="+mn-lt"/>
+                <a:ea typeface="+mn-ea"/>
+                <a:cs typeface="+mn-cs"/>
+              </a:defRPr>
+            </a:lvl9pPr>
+          </a:lstStyle>
+          <a:p>
+            <a:pPr fontAlgn="base"/>
+            <a:r>
+              <a:rPr lang="en-US" dirty="0"/>
+              <a:t>Configuration of features</a:t>
+            </a:r>
+          </a:p>
+        </p:txBody>
+      </p:sp>
     </p:spTree>
     <p:extLst>
       <p:ext uri="{BB962C8B-B14F-4D97-AF65-F5344CB8AC3E}">
-        <p14:creationId xmlns:p14="http://schemas.microsoft.com/office/powerpoint/2010/main" val="3559390204"/>
+        <p14:creationId xmlns:p14="http://schemas.microsoft.com/office/powerpoint/2010/main" val="1669189669"/>
       </p:ext>
     </p:extLst>
   </p:cSld>
@@ -15331,9 +15658,204 @@
   <p:timing>
     <p:tnLst>
       <p:par>
-        <p:cTn id="1" dur="indefinite" restart="never" nodeType="tmRoot"/>
+        <p:cTn id="1" dur="indefinite" restart="never" nodeType="tmRoot">
+          <p:childTnLst>
+            <p:seq concurrent="1" nextAc="seek">
+              <p:cTn id="2" dur="indefinite" nodeType="mainSeq">
+                <p:childTnLst>
+                  <p:par>
+                    <p:cTn id="3" fill="hold">
+                      <p:stCondLst>
+                        <p:cond delay="indefinite"/>
+                      </p:stCondLst>
+                      <p:childTnLst>
+                        <p:par>
+                          <p:cTn id="4" fill="hold">
+                            <p:stCondLst>
+                              <p:cond delay="0"/>
+                            </p:stCondLst>
+                            <p:childTnLst>
+                              <p:par>
+                                <p:cTn id="5" presetID="10" presetClass="entr" presetSubtype="0" fill="hold" grpId="0" nodeType="clickEffect">
+                                  <p:stCondLst>
+                                    <p:cond delay="0"/>
+                                  </p:stCondLst>
+                                  <p:childTnLst>
+                                    <p:set>
+                                      <p:cBhvr>
+                                        <p:cTn id="6" dur="1" fill="hold">
+                                          <p:stCondLst>
+                                            <p:cond delay="0"/>
+                                          </p:stCondLst>
+                                        </p:cTn>
+                                        <p:tgtEl>
+                                          <p:spTgt spid="3">
+                                            <p:txEl>
+                                              <p:pRg st="0" end="0"/>
+                                            </p:txEl>
+                                          </p:spTgt>
+                                        </p:tgtEl>
+                                        <p:attrNameLst>
+                                          <p:attrName>style.visibility</p:attrName>
+                                        </p:attrNameLst>
+                                      </p:cBhvr>
+                                      <p:to>
+                                        <p:strVal val="visible"/>
+                                      </p:to>
+                                    </p:set>
+                                    <p:animEffect transition="in" filter="fade">
+                                      <p:cBhvr>
+                                        <p:cTn id="7" dur="500"/>
+                                        <p:tgtEl>
+                                          <p:spTgt spid="3">
+                                            <p:txEl>
+                                              <p:pRg st="0" end="0"/>
+                                            </p:txEl>
+                                          </p:spTgt>
+                                        </p:tgtEl>
+                                      </p:cBhvr>
+                                    </p:animEffect>
+                                  </p:childTnLst>
+                                </p:cTn>
+                              </p:par>
+                            </p:childTnLst>
+                          </p:cTn>
+                        </p:par>
+                      </p:childTnLst>
+                    </p:cTn>
+                  </p:par>
+                  <p:par>
+                    <p:cTn id="8" fill="hold">
+                      <p:stCondLst>
+                        <p:cond delay="indefinite"/>
+                      </p:stCondLst>
+                      <p:childTnLst>
+                        <p:par>
+                          <p:cTn id="9" fill="hold">
+                            <p:stCondLst>
+                              <p:cond delay="0"/>
+                            </p:stCondLst>
+                            <p:childTnLst>
+                              <p:par>
+                                <p:cTn id="10" presetID="10" presetClass="entr" presetSubtype="0" fill="hold" grpId="0" nodeType="clickEffect">
+                                  <p:stCondLst>
+                                    <p:cond delay="0"/>
+                                  </p:stCondLst>
+                                  <p:childTnLst>
+                                    <p:set>
+                                      <p:cBhvr>
+                                        <p:cTn id="11" dur="1" fill="hold">
+                                          <p:stCondLst>
+                                            <p:cond delay="0"/>
+                                          </p:stCondLst>
+                                        </p:cTn>
+                                        <p:tgtEl>
+                                          <p:spTgt spid="6"/>
+                                        </p:tgtEl>
+                                        <p:attrNameLst>
+                                          <p:attrName>style.visibility</p:attrName>
+                                        </p:attrNameLst>
+                                      </p:cBhvr>
+                                      <p:to>
+                                        <p:strVal val="visible"/>
+                                      </p:to>
+                                    </p:set>
+                                    <p:animEffect transition="in" filter="fade">
+                                      <p:cBhvr>
+                                        <p:cTn id="12" dur="500"/>
+                                        <p:tgtEl>
+                                          <p:spTgt spid="6"/>
+                                        </p:tgtEl>
+                                      </p:cBhvr>
+                                    </p:animEffect>
+                                  </p:childTnLst>
+                                </p:cTn>
+                              </p:par>
+                            </p:childTnLst>
+                          </p:cTn>
+                        </p:par>
+                      </p:childTnLst>
+                    </p:cTn>
+                  </p:par>
+                  <p:par>
+                    <p:cTn id="13" fill="hold">
+                      <p:stCondLst>
+                        <p:cond delay="indefinite"/>
+                      </p:stCondLst>
+                      <p:childTnLst>
+                        <p:par>
+                          <p:cTn id="14" fill="hold">
+                            <p:stCondLst>
+                              <p:cond delay="0"/>
+                            </p:stCondLst>
+                            <p:childTnLst>
+                              <p:par>
+                                <p:cTn id="15" presetID="10" presetClass="entr" presetSubtype="0" fill="hold" grpId="0" nodeType="clickEffect">
+                                  <p:stCondLst>
+                                    <p:cond delay="0"/>
+                                  </p:stCondLst>
+                                  <p:childTnLst>
+                                    <p:set>
+                                      <p:cBhvr>
+                                        <p:cTn id="16" dur="1" fill="hold">
+                                          <p:stCondLst>
+                                            <p:cond delay="0"/>
+                                          </p:stCondLst>
+                                        </p:cTn>
+                                        <p:tgtEl>
+                                          <p:spTgt spid="7"/>
+                                        </p:tgtEl>
+                                        <p:attrNameLst>
+                                          <p:attrName>style.visibility</p:attrName>
+                                        </p:attrNameLst>
+                                      </p:cBhvr>
+                                      <p:to>
+                                        <p:strVal val="visible"/>
+                                      </p:to>
+                                    </p:set>
+                                    <p:animEffect transition="in" filter="fade">
+                                      <p:cBhvr>
+                                        <p:cTn id="17" dur="500"/>
+                                        <p:tgtEl>
+                                          <p:spTgt spid="7"/>
+                                        </p:tgtEl>
+                                      </p:cBhvr>
+                                    </p:animEffect>
+                                  </p:childTnLst>
+                                </p:cTn>
+                              </p:par>
+                            </p:childTnLst>
+                          </p:cTn>
+                        </p:par>
+                      </p:childTnLst>
+                    </p:cTn>
+                  </p:par>
+                </p:childTnLst>
+              </p:cTn>
+              <p:prevCondLst>
+                <p:cond evt="onPrev" delay="0">
+                  <p:tgtEl>
+                    <p:sldTgt/>
+                  </p:tgtEl>
+                </p:cond>
+              </p:prevCondLst>
+              <p:nextCondLst>
+                <p:cond evt="onNext" delay="0">
+                  <p:tgtEl>
+                    <p:sldTgt/>
+                  </p:tgtEl>
+                </p:cond>
+              </p:nextCondLst>
+            </p:seq>
+          </p:childTnLst>
+        </p:cTn>
       </p:par>
     </p:tnLst>
+    <p:bldLst>
+      <p:bldP spid="3" grpId="0" build="p"/>
+      <p:bldP spid="6" grpId="0"/>
+      <p:bldP spid="7" grpId="0"/>
+    </p:bldLst>
   </p:timing>
 </p:sld>
 </file>
@@ -15371,10 +15893,9 @@
           <a:lstStyle/>
           <a:p>
             <a:r>
-              <a:rPr lang="en-US" dirty="0" smtClean="0"/>
-              <a:t>Continuous Integration</a:t>
-            </a:r>
-            <a:endParaRPr lang="en-US" dirty="0"/>
+              <a:rPr lang="en-US" dirty="0"/>
+              <a:t>Challenge: Continuous Integration and Delivery (CI/CD)</a:t>
+            </a:r>
           </a:p>
         </p:txBody>
       </p:sp>
@@ -15390,45 +15911,18 @@
         </p:nvSpPr>
         <p:spPr>
           <a:xfrm>
-            <a:off x="838200" y="1571861"/>
-            <a:ext cx="10515600" cy="4605102"/>
+            <a:off x="5729037" y="2306195"/>
+            <a:ext cx="10515600" cy="2747963"/>
           </a:xfrm>
         </p:spPr>
         <p:txBody>
           <a:bodyPr/>
           <a:lstStyle/>
           <a:p>
-            <a:r>
-              <a:rPr lang="en-US" dirty="0" smtClean="0"/>
-              <a:t>Test strategy</a:t>
-            </a:r>
-          </a:p>
-          <a:p>
-            <a:endParaRPr lang="en-US" dirty="0" smtClean="0"/>
-          </a:p>
-          <a:p>
-            <a:r>
-              <a:rPr lang="en-US" dirty="0" smtClean="0"/>
-              <a:t>Fast feedback</a:t>
-            </a:r>
-          </a:p>
-          <a:p>
-            <a:endParaRPr lang="en-US" dirty="0" smtClean="0"/>
-          </a:p>
-          <a:p>
-            <a:r>
-              <a:rPr lang="en-US" dirty="0" smtClean="0"/>
-              <a:t>Quality gates</a:t>
-            </a:r>
-          </a:p>
-          <a:p>
-            <a:endParaRPr lang="en-US" dirty="0" smtClean="0"/>
-          </a:p>
-          <a:p>
-            <a:r>
-              <a:rPr lang="en-US" dirty="0" smtClean="0"/>
-              <a:t>User/customer/project acceptance</a:t>
-            </a:r>
+            <a:endParaRPr lang="en-US" dirty="0"/>
+          </a:p>
+          <a:p>
+            <a:endParaRPr lang="en-US" dirty="0"/>
           </a:p>
           <a:p>
             <a:endParaRPr lang="en-US" dirty="0"/>
@@ -15474,6 +15968,803 @@
           </a:p>
         </p:txBody>
       </p:sp>
+      <p:sp>
+        <p:nvSpPr>
+          <p:cNvPr id="7" name="Content Placeholder 2">
+            <a:extLst>
+              <a:ext uri="{FF2B5EF4-FFF2-40B4-BE49-F238E27FC236}">
+                <a16:creationId xmlns:a16="http://schemas.microsoft.com/office/drawing/2014/main" id="{789DB53B-DEFB-F693-EC9F-F0EB0A761576}"/>
+              </a:ext>
+            </a:extLst>
+          </p:cNvPr>
+          <p:cNvSpPr txBox="1">
+            <a:spLocks/>
+          </p:cNvSpPr>
+          <p:nvPr/>
+        </p:nvSpPr>
+        <p:spPr>
+          <a:xfrm>
+            <a:off x="1218341" y="2443925"/>
+            <a:ext cx="6155267" cy="683659"/>
+          </a:xfrm>
+          <a:prstGeom prst="rect">
+            <a:avLst/>
+          </a:prstGeom>
+        </p:spPr>
+        <p:txBody>
+          <a:bodyPr vert="horz" lIns="91440" tIns="45720" rIns="91440" bIns="45720" rtlCol="0">
+            <a:normAutofit/>
+          </a:bodyPr>
+          <a:lstStyle>
+            <a:lvl1pPr marL="228600" indent="-228600" algn="l" defTabSz="914400" rtl="0" eaLnBrk="1" latinLnBrk="0" hangingPunct="1">
+              <a:lnSpc>
+                <a:spcPct val="90000"/>
+              </a:lnSpc>
+              <a:spcBef>
+                <a:spcPts val="1000"/>
+              </a:spcBef>
+              <a:buFont typeface="Arial" panose="020B0604020202020204" pitchFamily="34" charset="0"/>
+              <a:buChar char="•"/>
+              <a:defRPr sz="2800" kern="1200">
+                <a:solidFill>
+                  <a:srgbClr val="595959"/>
+                </a:solidFill>
+                <a:latin typeface="Franklin Gothic Book" panose="020B0503020102020204" pitchFamily="34" charset="0"/>
+                <a:ea typeface="+mn-ea"/>
+                <a:cs typeface="+mn-cs"/>
+              </a:defRPr>
+            </a:lvl1pPr>
+            <a:lvl2pPr marL="685800" indent="-228600" algn="l" defTabSz="914400" rtl="0" eaLnBrk="1" latinLnBrk="0" hangingPunct="1">
+              <a:lnSpc>
+                <a:spcPct val="90000"/>
+              </a:lnSpc>
+              <a:spcBef>
+                <a:spcPts val="500"/>
+              </a:spcBef>
+              <a:buFont typeface="Arial" panose="020B0604020202020204" pitchFamily="34" charset="0"/>
+              <a:buChar char="•"/>
+              <a:defRPr sz="2400" kern="1200">
+                <a:solidFill>
+                  <a:srgbClr val="595959"/>
+                </a:solidFill>
+                <a:latin typeface="Franklin Gothic Book" panose="020B0503020102020204" pitchFamily="34" charset="0"/>
+                <a:ea typeface="+mn-ea"/>
+                <a:cs typeface="+mn-cs"/>
+              </a:defRPr>
+            </a:lvl2pPr>
+            <a:lvl3pPr marL="1143000" indent="-228600" algn="l" defTabSz="914400" rtl="0" eaLnBrk="1" latinLnBrk="0" hangingPunct="1">
+              <a:lnSpc>
+                <a:spcPct val="90000"/>
+              </a:lnSpc>
+              <a:spcBef>
+                <a:spcPts val="500"/>
+              </a:spcBef>
+              <a:buFont typeface="Arial" panose="020B0604020202020204" pitchFamily="34" charset="0"/>
+              <a:buChar char="•"/>
+              <a:defRPr sz="2000" kern="1200">
+                <a:solidFill>
+                  <a:srgbClr val="595959"/>
+                </a:solidFill>
+                <a:latin typeface="Franklin Gothic Book" panose="020B0503020102020204" pitchFamily="34" charset="0"/>
+                <a:ea typeface="+mn-ea"/>
+                <a:cs typeface="+mn-cs"/>
+              </a:defRPr>
+            </a:lvl3pPr>
+            <a:lvl4pPr marL="1600200" indent="-228600" algn="l" defTabSz="914400" rtl="0" eaLnBrk="1" latinLnBrk="0" hangingPunct="1">
+              <a:lnSpc>
+                <a:spcPct val="90000"/>
+              </a:lnSpc>
+              <a:spcBef>
+                <a:spcPts val="500"/>
+              </a:spcBef>
+              <a:buFont typeface="Arial" panose="020B0604020202020204" pitchFamily="34" charset="0"/>
+              <a:buChar char="•"/>
+              <a:defRPr sz="1800" kern="1200">
+                <a:solidFill>
+                  <a:srgbClr val="595959"/>
+                </a:solidFill>
+                <a:latin typeface="Franklin Gothic Book" panose="020B0503020102020204" pitchFamily="34" charset="0"/>
+                <a:ea typeface="+mn-ea"/>
+                <a:cs typeface="+mn-cs"/>
+              </a:defRPr>
+            </a:lvl4pPr>
+            <a:lvl5pPr marL="2057400" indent="-228600" algn="l" defTabSz="914400" rtl="0" eaLnBrk="1" latinLnBrk="0" hangingPunct="1">
+              <a:lnSpc>
+                <a:spcPct val="90000"/>
+              </a:lnSpc>
+              <a:spcBef>
+                <a:spcPts val="500"/>
+              </a:spcBef>
+              <a:buFont typeface="Arial" panose="020B0604020202020204" pitchFamily="34" charset="0"/>
+              <a:buChar char="•"/>
+              <a:defRPr sz="1800" kern="1200">
+                <a:solidFill>
+                  <a:srgbClr val="595959"/>
+                </a:solidFill>
+                <a:latin typeface="Franklin Gothic Book" panose="020B0503020102020204" pitchFamily="34" charset="0"/>
+                <a:ea typeface="+mn-ea"/>
+                <a:cs typeface="+mn-cs"/>
+              </a:defRPr>
+            </a:lvl5pPr>
+            <a:lvl6pPr marL="2514600" indent="-228600" algn="l" defTabSz="914400" rtl="0" eaLnBrk="1" latinLnBrk="0" hangingPunct="1">
+              <a:lnSpc>
+                <a:spcPct val="90000"/>
+              </a:lnSpc>
+              <a:spcBef>
+                <a:spcPts val="500"/>
+              </a:spcBef>
+              <a:buFont typeface="Arial" panose="020B0604020202020204" pitchFamily="34" charset="0"/>
+              <a:buChar char="•"/>
+              <a:defRPr sz="1800" kern="1200">
+                <a:solidFill>
+                  <a:schemeClr val="tx1"/>
+                </a:solidFill>
+                <a:latin typeface="+mn-lt"/>
+                <a:ea typeface="+mn-ea"/>
+                <a:cs typeface="+mn-cs"/>
+              </a:defRPr>
+            </a:lvl6pPr>
+            <a:lvl7pPr marL="2971800" indent="-228600" algn="l" defTabSz="914400" rtl="0" eaLnBrk="1" latinLnBrk="0" hangingPunct="1">
+              <a:lnSpc>
+                <a:spcPct val="90000"/>
+              </a:lnSpc>
+              <a:spcBef>
+                <a:spcPts val="500"/>
+              </a:spcBef>
+              <a:buFont typeface="Arial" panose="020B0604020202020204" pitchFamily="34" charset="0"/>
+              <a:buChar char="•"/>
+              <a:defRPr sz="1800" kern="1200">
+                <a:solidFill>
+                  <a:schemeClr val="tx1"/>
+                </a:solidFill>
+                <a:latin typeface="+mn-lt"/>
+                <a:ea typeface="+mn-ea"/>
+                <a:cs typeface="+mn-cs"/>
+              </a:defRPr>
+            </a:lvl7pPr>
+            <a:lvl8pPr marL="3429000" indent="-228600" algn="l" defTabSz="914400" rtl="0" eaLnBrk="1" latinLnBrk="0" hangingPunct="1">
+              <a:lnSpc>
+                <a:spcPct val="90000"/>
+              </a:lnSpc>
+              <a:spcBef>
+                <a:spcPts val="500"/>
+              </a:spcBef>
+              <a:buFont typeface="Arial" panose="020B0604020202020204" pitchFamily="34" charset="0"/>
+              <a:buChar char="•"/>
+              <a:defRPr sz="1800" kern="1200">
+                <a:solidFill>
+                  <a:schemeClr val="tx1"/>
+                </a:solidFill>
+                <a:latin typeface="+mn-lt"/>
+                <a:ea typeface="+mn-ea"/>
+                <a:cs typeface="+mn-cs"/>
+              </a:defRPr>
+            </a:lvl8pPr>
+            <a:lvl9pPr marL="3886200" indent="-228600" algn="l" defTabSz="914400" rtl="0" eaLnBrk="1" latinLnBrk="0" hangingPunct="1">
+              <a:lnSpc>
+                <a:spcPct val="90000"/>
+              </a:lnSpc>
+              <a:spcBef>
+                <a:spcPts val="500"/>
+              </a:spcBef>
+              <a:buFont typeface="Arial" panose="020B0604020202020204" pitchFamily="34" charset="0"/>
+              <a:buChar char="•"/>
+              <a:defRPr sz="1800" kern="1200">
+                <a:solidFill>
+                  <a:schemeClr val="tx1"/>
+                </a:solidFill>
+                <a:latin typeface="+mn-lt"/>
+                <a:ea typeface="+mn-ea"/>
+                <a:cs typeface="+mn-cs"/>
+              </a:defRPr>
+            </a:lvl9pPr>
+          </a:lstStyle>
+          <a:p>
+            <a:pPr fontAlgn="base"/>
+            <a:r>
+              <a:rPr lang="en-US" dirty="0"/>
+              <a:t>Test strategy</a:t>
+            </a:r>
+          </a:p>
+        </p:txBody>
+      </p:sp>
+      <p:sp>
+        <p:nvSpPr>
+          <p:cNvPr id="8" name="Content Placeholder 2">
+            <a:extLst>
+              <a:ext uri="{FF2B5EF4-FFF2-40B4-BE49-F238E27FC236}">
+                <a16:creationId xmlns:a16="http://schemas.microsoft.com/office/drawing/2014/main" id="{6880126D-41AF-284A-6697-B0030968F63A}"/>
+              </a:ext>
+            </a:extLst>
+          </p:cNvPr>
+          <p:cNvSpPr txBox="1">
+            <a:spLocks/>
+          </p:cNvSpPr>
+          <p:nvPr/>
+        </p:nvSpPr>
+        <p:spPr>
+          <a:xfrm>
+            <a:off x="1218341" y="1205463"/>
+            <a:ext cx="6155267" cy="683659"/>
+          </a:xfrm>
+          <a:prstGeom prst="rect">
+            <a:avLst/>
+          </a:prstGeom>
+        </p:spPr>
+        <p:txBody>
+          <a:bodyPr vert="horz" lIns="91440" tIns="45720" rIns="91440" bIns="45720" rtlCol="0">
+            <a:normAutofit/>
+          </a:bodyPr>
+          <a:lstStyle>
+            <a:lvl1pPr marL="228600" indent="-228600" algn="l" defTabSz="914400" rtl="0" eaLnBrk="1" latinLnBrk="0" hangingPunct="1">
+              <a:lnSpc>
+                <a:spcPct val="90000"/>
+              </a:lnSpc>
+              <a:spcBef>
+                <a:spcPts val="1000"/>
+              </a:spcBef>
+              <a:buFont typeface="Arial" panose="020B0604020202020204" pitchFamily="34" charset="0"/>
+              <a:buChar char="•"/>
+              <a:defRPr sz="2800" kern="1200">
+                <a:solidFill>
+                  <a:srgbClr val="595959"/>
+                </a:solidFill>
+                <a:latin typeface="Franklin Gothic Book" panose="020B0503020102020204" pitchFamily="34" charset="0"/>
+                <a:ea typeface="+mn-ea"/>
+                <a:cs typeface="+mn-cs"/>
+              </a:defRPr>
+            </a:lvl1pPr>
+            <a:lvl2pPr marL="685800" indent="-228600" algn="l" defTabSz="914400" rtl="0" eaLnBrk="1" latinLnBrk="0" hangingPunct="1">
+              <a:lnSpc>
+                <a:spcPct val="90000"/>
+              </a:lnSpc>
+              <a:spcBef>
+                <a:spcPts val="500"/>
+              </a:spcBef>
+              <a:buFont typeface="Arial" panose="020B0604020202020204" pitchFamily="34" charset="0"/>
+              <a:buChar char="•"/>
+              <a:defRPr sz="2400" kern="1200">
+                <a:solidFill>
+                  <a:srgbClr val="595959"/>
+                </a:solidFill>
+                <a:latin typeface="Franklin Gothic Book" panose="020B0503020102020204" pitchFamily="34" charset="0"/>
+                <a:ea typeface="+mn-ea"/>
+                <a:cs typeface="+mn-cs"/>
+              </a:defRPr>
+            </a:lvl2pPr>
+            <a:lvl3pPr marL="1143000" indent="-228600" algn="l" defTabSz="914400" rtl="0" eaLnBrk="1" latinLnBrk="0" hangingPunct="1">
+              <a:lnSpc>
+                <a:spcPct val="90000"/>
+              </a:lnSpc>
+              <a:spcBef>
+                <a:spcPts val="500"/>
+              </a:spcBef>
+              <a:buFont typeface="Arial" panose="020B0604020202020204" pitchFamily="34" charset="0"/>
+              <a:buChar char="•"/>
+              <a:defRPr sz="2000" kern="1200">
+                <a:solidFill>
+                  <a:srgbClr val="595959"/>
+                </a:solidFill>
+                <a:latin typeface="Franklin Gothic Book" panose="020B0503020102020204" pitchFamily="34" charset="0"/>
+                <a:ea typeface="+mn-ea"/>
+                <a:cs typeface="+mn-cs"/>
+              </a:defRPr>
+            </a:lvl3pPr>
+            <a:lvl4pPr marL="1600200" indent="-228600" algn="l" defTabSz="914400" rtl="0" eaLnBrk="1" latinLnBrk="0" hangingPunct="1">
+              <a:lnSpc>
+                <a:spcPct val="90000"/>
+              </a:lnSpc>
+              <a:spcBef>
+                <a:spcPts val="500"/>
+              </a:spcBef>
+              <a:buFont typeface="Arial" panose="020B0604020202020204" pitchFamily="34" charset="0"/>
+              <a:buChar char="•"/>
+              <a:defRPr sz="1800" kern="1200">
+                <a:solidFill>
+                  <a:srgbClr val="595959"/>
+                </a:solidFill>
+                <a:latin typeface="Franklin Gothic Book" panose="020B0503020102020204" pitchFamily="34" charset="0"/>
+                <a:ea typeface="+mn-ea"/>
+                <a:cs typeface="+mn-cs"/>
+              </a:defRPr>
+            </a:lvl4pPr>
+            <a:lvl5pPr marL="2057400" indent="-228600" algn="l" defTabSz="914400" rtl="0" eaLnBrk="1" latinLnBrk="0" hangingPunct="1">
+              <a:lnSpc>
+                <a:spcPct val="90000"/>
+              </a:lnSpc>
+              <a:spcBef>
+                <a:spcPts val="500"/>
+              </a:spcBef>
+              <a:buFont typeface="Arial" panose="020B0604020202020204" pitchFamily="34" charset="0"/>
+              <a:buChar char="•"/>
+              <a:defRPr sz="1800" kern="1200">
+                <a:solidFill>
+                  <a:srgbClr val="595959"/>
+                </a:solidFill>
+                <a:latin typeface="Franklin Gothic Book" panose="020B0503020102020204" pitchFamily="34" charset="0"/>
+                <a:ea typeface="+mn-ea"/>
+                <a:cs typeface="+mn-cs"/>
+              </a:defRPr>
+            </a:lvl5pPr>
+            <a:lvl6pPr marL="2514600" indent="-228600" algn="l" defTabSz="914400" rtl="0" eaLnBrk="1" latinLnBrk="0" hangingPunct="1">
+              <a:lnSpc>
+                <a:spcPct val="90000"/>
+              </a:lnSpc>
+              <a:spcBef>
+                <a:spcPts val="500"/>
+              </a:spcBef>
+              <a:buFont typeface="Arial" panose="020B0604020202020204" pitchFamily="34" charset="0"/>
+              <a:buChar char="•"/>
+              <a:defRPr sz="1800" kern="1200">
+                <a:solidFill>
+                  <a:schemeClr val="tx1"/>
+                </a:solidFill>
+                <a:latin typeface="+mn-lt"/>
+                <a:ea typeface="+mn-ea"/>
+                <a:cs typeface="+mn-cs"/>
+              </a:defRPr>
+            </a:lvl6pPr>
+            <a:lvl7pPr marL="2971800" indent="-228600" algn="l" defTabSz="914400" rtl="0" eaLnBrk="1" latinLnBrk="0" hangingPunct="1">
+              <a:lnSpc>
+                <a:spcPct val="90000"/>
+              </a:lnSpc>
+              <a:spcBef>
+                <a:spcPts val="500"/>
+              </a:spcBef>
+              <a:buFont typeface="Arial" panose="020B0604020202020204" pitchFamily="34" charset="0"/>
+              <a:buChar char="•"/>
+              <a:defRPr sz="1800" kern="1200">
+                <a:solidFill>
+                  <a:schemeClr val="tx1"/>
+                </a:solidFill>
+                <a:latin typeface="+mn-lt"/>
+                <a:ea typeface="+mn-ea"/>
+                <a:cs typeface="+mn-cs"/>
+              </a:defRPr>
+            </a:lvl7pPr>
+            <a:lvl8pPr marL="3429000" indent="-228600" algn="l" defTabSz="914400" rtl="0" eaLnBrk="1" latinLnBrk="0" hangingPunct="1">
+              <a:lnSpc>
+                <a:spcPct val="90000"/>
+              </a:lnSpc>
+              <a:spcBef>
+                <a:spcPts val="500"/>
+              </a:spcBef>
+              <a:buFont typeface="Arial" panose="020B0604020202020204" pitchFamily="34" charset="0"/>
+              <a:buChar char="•"/>
+              <a:defRPr sz="1800" kern="1200">
+                <a:solidFill>
+                  <a:schemeClr val="tx1"/>
+                </a:solidFill>
+                <a:latin typeface="+mn-lt"/>
+                <a:ea typeface="+mn-ea"/>
+                <a:cs typeface="+mn-cs"/>
+              </a:defRPr>
+            </a:lvl8pPr>
+            <a:lvl9pPr marL="3886200" indent="-228600" algn="l" defTabSz="914400" rtl="0" eaLnBrk="1" latinLnBrk="0" hangingPunct="1">
+              <a:lnSpc>
+                <a:spcPct val="90000"/>
+              </a:lnSpc>
+              <a:spcBef>
+                <a:spcPts val="500"/>
+              </a:spcBef>
+              <a:buFont typeface="Arial" panose="020B0604020202020204" pitchFamily="34" charset="0"/>
+              <a:buChar char="•"/>
+              <a:defRPr sz="1800" kern="1200">
+                <a:solidFill>
+                  <a:schemeClr val="tx1"/>
+                </a:solidFill>
+                <a:latin typeface="+mn-lt"/>
+                <a:ea typeface="+mn-ea"/>
+                <a:cs typeface="+mn-cs"/>
+              </a:defRPr>
+            </a:lvl9pPr>
+          </a:lstStyle>
+          <a:p>
+            <a:r>
+              <a:rPr lang="en-US" dirty="0"/>
+              <a:t>Fast feedback</a:t>
+            </a:r>
+          </a:p>
+        </p:txBody>
+      </p:sp>
+      <p:sp>
+        <p:nvSpPr>
+          <p:cNvPr id="9" name="Content Placeholder 2">
+            <a:extLst>
+              <a:ext uri="{FF2B5EF4-FFF2-40B4-BE49-F238E27FC236}">
+                <a16:creationId xmlns:a16="http://schemas.microsoft.com/office/drawing/2014/main" id="{6C013AA8-0315-1AAE-8246-6968F85A5B07}"/>
+              </a:ext>
+            </a:extLst>
+          </p:cNvPr>
+          <p:cNvSpPr txBox="1">
+            <a:spLocks/>
+          </p:cNvSpPr>
+          <p:nvPr/>
+        </p:nvSpPr>
+        <p:spPr>
+          <a:xfrm>
+            <a:off x="1218341" y="3682387"/>
+            <a:ext cx="6155267" cy="683659"/>
+          </a:xfrm>
+          <a:prstGeom prst="rect">
+            <a:avLst/>
+          </a:prstGeom>
+        </p:spPr>
+        <p:txBody>
+          <a:bodyPr vert="horz" lIns="91440" tIns="45720" rIns="91440" bIns="45720" rtlCol="0">
+            <a:normAutofit/>
+          </a:bodyPr>
+          <a:lstStyle>
+            <a:lvl1pPr marL="228600" indent="-228600" algn="l" defTabSz="914400" rtl="0" eaLnBrk="1" latinLnBrk="0" hangingPunct="1">
+              <a:lnSpc>
+                <a:spcPct val="90000"/>
+              </a:lnSpc>
+              <a:spcBef>
+                <a:spcPts val="1000"/>
+              </a:spcBef>
+              <a:buFont typeface="Arial" panose="020B0604020202020204" pitchFamily="34" charset="0"/>
+              <a:buChar char="•"/>
+              <a:defRPr sz="2800" kern="1200">
+                <a:solidFill>
+                  <a:srgbClr val="595959"/>
+                </a:solidFill>
+                <a:latin typeface="Franklin Gothic Book" panose="020B0503020102020204" pitchFamily="34" charset="0"/>
+                <a:ea typeface="+mn-ea"/>
+                <a:cs typeface="+mn-cs"/>
+              </a:defRPr>
+            </a:lvl1pPr>
+            <a:lvl2pPr marL="685800" indent="-228600" algn="l" defTabSz="914400" rtl="0" eaLnBrk="1" latinLnBrk="0" hangingPunct="1">
+              <a:lnSpc>
+                <a:spcPct val="90000"/>
+              </a:lnSpc>
+              <a:spcBef>
+                <a:spcPts val="500"/>
+              </a:spcBef>
+              <a:buFont typeface="Arial" panose="020B0604020202020204" pitchFamily="34" charset="0"/>
+              <a:buChar char="•"/>
+              <a:defRPr sz="2400" kern="1200">
+                <a:solidFill>
+                  <a:srgbClr val="595959"/>
+                </a:solidFill>
+                <a:latin typeface="Franklin Gothic Book" panose="020B0503020102020204" pitchFamily="34" charset="0"/>
+                <a:ea typeface="+mn-ea"/>
+                <a:cs typeface="+mn-cs"/>
+              </a:defRPr>
+            </a:lvl2pPr>
+            <a:lvl3pPr marL="1143000" indent="-228600" algn="l" defTabSz="914400" rtl="0" eaLnBrk="1" latinLnBrk="0" hangingPunct="1">
+              <a:lnSpc>
+                <a:spcPct val="90000"/>
+              </a:lnSpc>
+              <a:spcBef>
+                <a:spcPts val="500"/>
+              </a:spcBef>
+              <a:buFont typeface="Arial" panose="020B0604020202020204" pitchFamily="34" charset="0"/>
+              <a:buChar char="•"/>
+              <a:defRPr sz="2000" kern="1200">
+                <a:solidFill>
+                  <a:srgbClr val="595959"/>
+                </a:solidFill>
+                <a:latin typeface="Franklin Gothic Book" panose="020B0503020102020204" pitchFamily="34" charset="0"/>
+                <a:ea typeface="+mn-ea"/>
+                <a:cs typeface="+mn-cs"/>
+              </a:defRPr>
+            </a:lvl3pPr>
+            <a:lvl4pPr marL="1600200" indent="-228600" algn="l" defTabSz="914400" rtl="0" eaLnBrk="1" latinLnBrk="0" hangingPunct="1">
+              <a:lnSpc>
+                <a:spcPct val="90000"/>
+              </a:lnSpc>
+              <a:spcBef>
+                <a:spcPts val="500"/>
+              </a:spcBef>
+              <a:buFont typeface="Arial" panose="020B0604020202020204" pitchFamily="34" charset="0"/>
+              <a:buChar char="•"/>
+              <a:defRPr sz="1800" kern="1200">
+                <a:solidFill>
+                  <a:srgbClr val="595959"/>
+                </a:solidFill>
+                <a:latin typeface="Franklin Gothic Book" panose="020B0503020102020204" pitchFamily="34" charset="0"/>
+                <a:ea typeface="+mn-ea"/>
+                <a:cs typeface="+mn-cs"/>
+              </a:defRPr>
+            </a:lvl4pPr>
+            <a:lvl5pPr marL="2057400" indent="-228600" algn="l" defTabSz="914400" rtl="0" eaLnBrk="1" latinLnBrk="0" hangingPunct="1">
+              <a:lnSpc>
+                <a:spcPct val="90000"/>
+              </a:lnSpc>
+              <a:spcBef>
+                <a:spcPts val="500"/>
+              </a:spcBef>
+              <a:buFont typeface="Arial" panose="020B0604020202020204" pitchFamily="34" charset="0"/>
+              <a:buChar char="•"/>
+              <a:defRPr sz="1800" kern="1200">
+                <a:solidFill>
+                  <a:srgbClr val="595959"/>
+                </a:solidFill>
+                <a:latin typeface="Franklin Gothic Book" panose="020B0503020102020204" pitchFamily="34" charset="0"/>
+                <a:ea typeface="+mn-ea"/>
+                <a:cs typeface="+mn-cs"/>
+              </a:defRPr>
+            </a:lvl5pPr>
+            <a:lvl6pPr marL="2514600" indent="-228600" algn="l" defTabSz="914400" rtl="0" eaLnBrk="1" latinLnBrk="0" hangingPunct="1">
+              <a:lnSpc>
+                <a:spcPct val="90000"/>
+              </a:lnSpc>
+              <a:spcBef>
+                <a:spcPts val="500"/>
+              </a:spcBef>
+              <a:buFont typeface="Arial" panose="020B0604020202020204" pitchFamily="34" charset="0"/>
+              <a:buChar char="•"/>
+              <a:defRPr sz="1800" kern="1200">
+                <a:solidFill>
+                  <a:schemeClr val="tx1"/>
+                </a:solidFill>
+                <a:latin typeface="+mn-lt"/>
+                <a:ea typeface="+mn-ea"/>
+                <a:cs typeface="+mn-cs"/>
+              </a:defRPr>
+            </a:lvl6pPr>
+            <a:lvl7pPr marL="2971800" indent="-228600" algn="l" defTabSz="914400" rtl="0" eaLnBrk="1" latinLnBrk="0" hangingPunct="1">
+              <a:lnSpc>
+                <a:spcPct val="90000"/>
+              </a:lnSpc>
+              <a:spcBef>
+                <a:spcPts val="500"/>
+              </a:spcBef>
+              <a:buFont typeface="Arial" panose="020B0604020202020204" pitchFamily="34" charset="0"/>
+              <a:buChar char="•"/>
+              <a:defRPr sz="1800" kern="1200">
+                <a:solidFill>
+                  <a:schemeClr val="tx1"/>
+                </a:solidFill>
+                <a:latin typeface="+mn-lt"/>
+                <a:ea typeface="+mn-ea"/>
+                <a:cs typeface="+mn-cs"/>
+              </a:defRPr>
+            </a:lvl7pPr>
+            <a:lvl8pPr marL="3429000" indent="-228600" algn="l" defTabSz="914400" rtl="0" eaLnBrk="1" latinLnBrk="0" hangingPunct="1">
+              <a:lnSpc>
+                <a:spcPct val="90000"/>
+              </a:lnSpc>
+              <a:spcBef>
+                <a:spcPts val="500"/>
+              </a:spcBef>
+              <a:buFont typeface="Arial" panose="020B0604020202020204" pitchFamily="34" charset="0"/>
+              <a:buChar char="•"/>
+              <a:defRPr sz="1800" kern="1200">
+                <a:solidFill>
+                  <a:schemeClr val="tx1"/>
+                </a:solidFill>
+                <a:latin typeface="+mn-lt"/>
+                <a:ea typeface="+mn-ea"/>
+                <a:cs typeface="+mn-cs"/>
+              </a:defRPr>
+            </a:lvl8pPr>
+            <a:lvl9pPr marL="3886200" indent="-228600" algn="l" defTabSz="914400" rtl="0" eaLnBrk="1" latinLnBrk="0" hangingPunct="1">
+              <a:lnSpc>
+                <a:spcPct val="90000"/>
+              </a:lnSpc>
+              <a:spcBef>
+                <a:spcPts val="500"/>
+              </a:spcBef>
+              <a:buFont typeface="Arial" panose="020B0604020202020204" pitchFamily="34" charset="0"/>
+              <a:buChar char="•"/>
+              <a:defRPr sz="1800" kern="1200">
+                <a:solidFill>
+                  <a:schemeClr val="tx1"/>
+                </a:solidFill>
+                <a:latin typeface="+mn-lt"/>
+                <a:ea typeface="+mn-ea"/>
+                <a:cs typeface="+mn-cs"/>
+              </a:defRPr>
+            </a:lvl9pPr>
+          </a:lstStyle>
+          <a:p>
+            <a:r>
+              <a:rPr lang="en-US" dirty="0"/>
+              <a:t>Quality gates</a:t>
+            </a:r>
+          </a:p>
+        </p:txBody>
+      </p:sp>
+      <p:sp>
+        <p:nvSpPr>
+          <p:cNvPr id="10" name="Content Placeholder 2">
+            <a:extLst>
+              <a:ext uri="{FF2B5EF4-FFF2-40B4-BE49-F238E27FC236}">
+                <a16:creationId xmlns:a16="http://schemas.microsoft.com/office/drawing/2014/main" id="{E066DF7E-BF86-2BAF-5A54-850C9D9E7FB2}"/>
+              </a:ext>
+            </a:extLst>
+          </p:cNvPr>
+          <p:cNvSpPr txBox="1">
+            <a:spLocks/>
+          </p:cNvSpPr>
+          <p:nvPr/>
+        </p:nvSpPr>
+        <p:spPr>
+          <a:xfrm>
+            <a:off x="1218342" y="4920849"/>
+            <a:ext cx="6155267" cy="683659"/>
+          </a:xfrm>
+          <a:prstGeom prst="rect">
+            <a:avLst/>
+          </a:prstGeom>
+        </p:spPr>
+        <p:txBody>
+          <a:bodyPr vert="horz" lIns="91440" tIns="45720" rIns="91440" bIns="45720" rtlCol="0">
+            <a:normAutofit fontScale="92500"/>
+          </a:bodyPr>
+          <a:lstStyle>
+            <a:lvl1pPr marL="228600" indent="-228600" algn="l" defTabSz="914400" rtl="0" eaLnBrk="1" latinLnBrk="0" hangingPunct="1">
+              <a:lnSpc>
+                <a:spcPct val="90000"/>
+              </a:lnSpc>
+              <a:spcBef>
+                <a:spcPts val="1000"/>
+              </a:spcBef>
+              <a:buFont typeface="Arial" panose="020B0604020202020204" pitchFamily="34" charset="0"/>
+              <a:buChar char="•"/>
+              <a:defRPr sz="2800" kern="1200">
+                <a:solidFill>
+                  <a:srgbClr val="595959"/>
+                </a:solidFill>
+                <a:latin typeface="Franklin Gothic Book" panose="020B0503020102020204" pitchFamily="34" charset="0"/>
+                <a:ea typeface="+mn-ea"/>
+                <a:cs typeface="+mn-cs"/>
+              </a:defRPr>
+            </a:lvl1pPr>
+            <a:lvl2pPr marL="685800" indent="-228600" algn="l" defTabSz="914400" rtl="0" eaLnBrk="1" latinLnBrk="0" hangingPunct="1">
+              <a:lnSpc>
+                <a:spcPct val="90000"/>
+              </a:lnSpc>
+              <a:spcBef>
+                <a:spcPts val="500"/>
+              </a:spcBef>
+              <a:buFont typeface="Arial" panose="020B0604020202020204" pitchFamily="34" charset="0"/>
+              <a:buChar char="•"/>
+              <a:defRPr sz="2400" kern="1200">
+                <a:solidFill>
+                  <a:srgbClr val="595959"/>
+                </a:solidFill>
+                <a:latin typeface="Franklin Gothic Book" panose="020B0503020102020204" pitchFamily="34" charset="0"/>
+                <a:ea typeface="+mn-ea"/>
+                <a:cs typeface="+mn-cs"/>
+              </a:defRPr>
+            </a:lvl2pPr>
+            <a:lvl3pPr marL="1143000" indent="-228600" algn="l" defTabSz="914400" rtl="0" eaLnBrk="1" latinLnBrk="0" hangingPunct="1">
+              <a:lnSpc>
+                <a:spcPct val="90000"/>
+              </a:lnSpc>
+              <a:spcBef>
+                <a:spcPts val="500"/>
+              </a:spcBef>
+              <a:buFont typeface="Arial" panose="020B0604020202020204" pitchFamily="34" charset="0"/>
+              <a:buChar char="•"/>
+              <a:defRPr sz="2000" kern="1200">
+                <a:solidFill>
+                  <a:srgbClr val="595959"/>
+                </a:solidFill>
+                <a:latin typeface="Franklin Gothic Book" panose="020B0503020102020204" pitchFamily="34" charset="0"/>
+                <a:ea typeface="+mn-ea"/>
+                <a:cs typeface="+mn-cs"/>
+              </a:defRPr>
+            </a:lvl3pPr>
+            <a:lvl4pPr marL="1600200" indent="-228600" algn="l" defTabSz="914400" rtl="0" eaLnBrk="1" latinLnBrk="0" hangingPunct="1">
+              <a:lnSpc>
+                <a:spcPct val="90000"/>
+              </a:lnSpc>
+              <a:spcBef>
+                <a:spcPts val="500"/>
+              </a:spcBef>
+              <a:buFont typeface="Arial" panose="020B0604020202020204" pitchFamily="34" charset="0"/>
+              <a:buChar char="•"/>
+              <a:defRPr sz="1800" kern="1200">
+                <a:solidFill>
+                  <a:srgbClr val="595959"/>
+                </a:solidFill>
+                <a:latin typeface="Franklin Gothic Book" panose="020B0503020102020204" pitchFamily="34" charset="0"/>
+                <a:ea typeface="+mn-ea"/>
+                <a:cs typeface="+mn-cs"/>
+              </a:defRPr>
+            </a:lvl4pPr>
+            <a:lvl5pPr marL="2057400" indent="-228600" algn="l" defTabSz="914400" rtl="0" eaLnBrk="1" latinLnBrk="0" hangingPunct="1">
+              <a:lnSpc>
+                <a:spcPct val="90000"/>
+              </a:lnSpc>
+              <a:spcBef>
+                <a:spcPts val="500"/>
+              </a:spcBef>
+              <a:buFont typeface="Arial" panose="020B0604020202020204" pitchFamily="34" charset="0"/>
+              <a:buChar char="•"/>
+              <a:defRPr sz="1800" kern="1200">
+                <a:solidFill>
+                  <a:srgbClr val="595959"/>
+                </a:solidFill>
+                <a:latin typeface="Franklin Gothic Book" panose="020B0503020102020204" pitchFamily="34" charset="0"/>
+                <a:ea typeface="+mn-ea"/>
+                <a:cs typeface="+mn-cs"/>
+              </a:defRPr>
+            </a:lvl5pPr>
+            <a:lvl6pPr marL="2514600" indent="-228600" algn="l" defTabSz="914400" rtl="0" eaLnBrk="1" latinLnBrk="0" hangingPunct="1">
+              <a:lnSpc>
+                <a:spcPct val="90000"/>
+              </a:lnSpc>
+              <a:spcBef>
+                <a:spcPts val="500"/>
+              </a:spcBef>
+              <a:buFont typeface="Arial" panose="020B0604020202020204" pitchFamily="34" charset="0"/>
+              <a:buChar char="•"/>
+              <a:defRPr sz="1800" kern="1200">
+                <a:solidFill>
+                  <a:schemeClr val="tx1"/>
+                </a:solidFill>
+                <a:latin typeface="+mn-lt"/>
+                <a:ea typeface="+mn-ea"/>
+                <a:cs typeface="+mn-cs"/>
+              </a:defRPr>
+            </a:lvl6pPr>
+            <a:lvl7pPr marL="2971800" indent="-228600" algn="l" defTabSz="914400" rtl="0" eaLnBrk="1" latinLnBrk="0" hangingPunct="1">
+              <a:lnSpc>
+                <a:spcPct val="90000"/>
+              </a:lnSpc>
+              <a:spcBef>
+                <a:spcPts val="500"/>
+              </a:spcBef>
+              <a:buFont typeface="Arial" panose="020B0604020202020204" pitchFamily="34" charset="0"/>
+              <a:buChar char="•"/>
+              <a:defRPr sz="1800" kern="1200">
+                <a:solidFill>
+                  <a:schemeClr val="tx1"/>
+                </a:solidFill>
+                <a:latin typeface="+mn-lt"/>
+                <a:ea typeface="+mn-ea"/>
+                <a:cs typeface="+mn-cs"/>
+              </a:defRPr>
+            </a:lvl7pPr>
+            <a:lvl8pPr marL="3429000" indent="-228600" algn="l" defTabSz="914400" rtl="0" eaLnBrk="1" latinLnBrk="0" hangingPunct="1">
+              <a:lnSpc>
+                <a:spcPct val="90000"/>
+              </a:lnSpc>
+              <a:spcBef>
+                <a:spcPts val="500"/>
+              </a:spcBef>
+              <a:buFont typeface="Arial" panose="020B0604020202020204" pitchFamily="34" charset="0"/>
+              <a:buChar char="•"/>
+              <a:defRPr sz="1800" kern="1200">
+                <a:solidFill>
+                  <a:schemeClr val="tx1"/>
+                </a:solidFill>
+                <a:latin typeface="+mn-lt"/>
+                <a:ea typeface="+mn-ea"/>
+                <a:cs typeface="+mn-cs"/>
+              </a:defRPr>
+            </a:lvl8pPr>
+            <a:lvl9pPr marL="3886200" indent="-228600" algn="l" defTabSz="914400" rtl="0" eaLnBrk="1" latinLnBrk="0" hangingPunct="1">
+              <a:lnSpc>
+                <a:spcPct val="90000"/>
+              </a:lnSpc>
+              <a:spcBef>
+                <a:spcPts val="500"/>
+              </a:spcBef>
+              <a:buFont typeface="Arial" panose="020B0604020202020204" pitchFamily="34" charset="0"/>
+              <a:buChar char="•"/>
+              <a:defRPr sz="1800" kern="1200">
+                <a:solidFill>
+                  <a:schemeClr val="tx1"/>
+                </a:solidFill>
+                <a:latin typeface="+mn-lt"/>
+                <a:ea typeface="+mn-ea"/>
+                <a:cs typeface="+mn-cs"/>
+              </a:defRPr>
+            </a:lvl9pPr>
+          </a:lstStyle>
+          <a:p>
+            <a:r>
+              <a:rPr lang="en-US" dirty="0"/>
+              <a:t>Developer/customer/project acceptance</a:t>
+            </a:r>
+          </a:p>
+        </p:txBody>
+      </p:sp>
     </p:spTree>
     <p:extLst>
       <p:ext uri="{BB962C8B-B14F-4D97-AF65-F5344CB8AC3E}">
@@ -15487,9 +16778,282 @@
   <p:timing>
     <p:tnLst>
       <p:par>
-        <p:cTn id="1" dur="indefinite" restart="never" nodeType="tmRoot"/>
+        <p:cTn id="1" dur="indefinite" restart="never" nodeType="tmRoot">
+          <p:childTnLst>
+            <p:seq concurrent="1" nextAc="seek">
+              <p:cTn id="2" dur="indefinite" nodeType="mainSeq">
+                <p:childTnLst>
+                  <p:par>
+                    <p:cTn id="3" fill="hold">
+                      <p:stCondLst>
+                        <p:cond delay="indefinite"/>
+                      </p:stCondLst>
+                      <p:childTnLst>
+                        <p:par>
+                          <p:cTn id="4" fill="hold">
+                            <p:stCondLst>
+                              <p:cond delay="0"/>
+                            </p:stCondLst>
+                            <p:childTnLst>
+                              <p:par>
+                                <p:cTn id="5" presetID="10" presetClass="entr" presetSubtype="0" fill="hold" grpId="0" nodeType="clickEffect">
+                                  <p:stCondLst>
+                                    <p:cond delay="0"/>
+                                  </p:stCondLst>
+                                  <p:childTnLst>
+                                    <p:set>
+                                      <p:cBhvr>
+                                        <p:cTn id="6" dur="1" fill="hold">
+                                          <p:stCondLst>
+                                            <p:cond delay="0"/>
+                                          </p:stCondLst>
+                                        </p:cTn>
+                                        <p:tgtEl>
+                                          <p:spTgt spid="8">
+                                            <p:txEl>
+                                              <p:pRg st="0" end="0"/>
+                                            </p:txEl>
+                                          </p:spTgt>
+                                        </p:tgtEl>
+                                        <p:attrNameLst>
+                                          <p:attrName>style.visibility</p:attrName>
+                                        </p:attrNameLst>
+                                      </p:cBhvr>
+                                      <p:to>
+                                        <p:strVal val="visible"/>
+                                      </p:to>
+                                    </p:set>
+                                    <p:animEffect transition="in" filter="fade">
+                                      <p:cBhvr>
+                                        <p:cTn id="7" dur="500"/>
+                                        <p:tgtEl>
+                                          <p:spTgt spid="8">
+                                            <p:txEl>
+                                              <p:pRg st="0" end="0"/>
+                                            </p:txEl>
+                                          </p:spTgt>
+                                        </p:tgtEl>
+                                      </p:cBhvr>
+                                    </p:animEffect>
+                                  </p:childTnLst>
+                                </p:cTn>
+                              </p:par>
+                            </p:childTnLst>
+                          </p:cTn>
+                        </p:par>
+                      </p:childTnLst>
+                    </p:cTn>
+                  </p:par>
+                  <p:par>
+                    <p:cTn id="8" fill="hold">
+                      <p:stCondLst>
+                        <p:cond delay="indefinite"/>
+                      </p:stCondLst>
+                      <p:childTnLst>
+                        <p:par>
+                          <p:cTn id="9" fill="hold">
+                            <p:stCondLst>
+                              <p:cond delay="0"/>
+                            </p:stCondLst>
+                            <p:childTnLst>
+                              <p:par>
+                                <p:cTn id="10" presetID="10" presetClass="entr" presetSubtype="0" fill="hold" grpId="0" nodeType="clickEffect">
+                                  <p:stCondLst>
+                                    <p:cond delay="0"/>
+                                  </p:stCondLst>
+                                  <p:childTnLst>
+                                    <p:set>
+                                      <p:cBhvr>
+                                        <p:cTn id="11" dur="1" fill="hold">
+                                          <p:stCondLst>
+                                            <p:cond delay="0"/>
+                                          </p:stCondLst>
+                                        </p:cTn>
+                                        <p:tgtEl>
+                                          <p:spTgt spid="7">
+                                            <p:txEl>
+                                              <p:pRg st="0" end="0"/>
+                                            </p:txEl>
+                                          </p:spTgt>
+                                        </p:tgtEl>
+                                        <p:attrNameLst>
+                                          <p:attrName>style.visibility</p:attrName>
+                                        </p:attrNameLst>
+                                      </p:cBhvr>
+                                      <p:to>
+                                        <p:strVal val="visible"/>
+                                      </p:to>
+                                    </p:set>
+                                    <p:animEffect transition="in" filter="fade">
+                                      <p:cBhvr>
+                                        <p:cTn id="12" dur="500"/>
+                                        <p:tgtEl>
+                                          <p:spTgt spid="7">
+                                            <p:txEl>
+                                              <p:pRg st="0" end="0"/>
+                                            </p:txEl>
+                                          </p:spTgt>
+                                        </p:tgtEl>
+                                      </p:cBhvr>
+                                    </p:animEffect>
+                                  </p:childTnLst>
+                                </p:cTn>
+                              </p:par>
+                            </p:childTnLst>
+                          </p:cTn>
+                        </p:par>
+                      </p:childTnLst>
+                    </p:cTn>
+                  </p:par>
+                  <p:par>
+                    <p:cTn id="13" fill="hold">
+                      <p:stCondLst>
+                        <p:cond delay="indefinite"/>
+                      </p:stCondLst>
+                      <p:childTnLst>
+                        <p:par>
+                          <p:cTn id="14" fill="hold">
+                            <p:stCondLst>
+                              <p:cond delay="0"/>
+                            </p:stCondLst>
+                            <p:childTnLst>
+                              <p:par>
+                                <p:cTn id="15" presetID="10" presetClass="entr" presetSubtype="0" fill="hold" grpId="0" nodeType="clickEffect">
+                                  <p:stCondLst>
+                                    <p:cond delay="0"/>
+                                  </p:stCondLst>
+                                  <p:childTnLst>
+                                    <p:set>
+                                      <p:cBhvr>
+                                        <p:cTn id="16" dur="1" fill="hold">
+                                          <p:stCondLst>
+                                            <p:cond delay="0"/>
+                                          </p:stCondLst>
+                                        </p:cTn>
+                                        <p:tgtEl>
+                                          <p:spTgt spid="9">
+                                            <p:txEl>
+                                              <p:pRg st="0" end="0"/>
+                                            </p:txEl>
+                                          </p:spTgt>
+                                        </p:tgtEl>
+                                        <p:attrNameLst>
+                                          <p:attrName>style.visibility</p:attrName>
+                                        </p:attrNameLst>
+                                      </p:cBhvr>
+                                      <p:to>
+                                        <p:strVal val="visible"/>
+                                      </p:to>
+                                    </p:set>
+                                    <p:animEffect transition="in" filter="fade">
+                                      <p:cBhvr>
+                                        <p:cTn id="17" dur="500"/>
+                                        <p:tgtEl>
+                                          <p:spTgt spid="9">
+                                            <p:txEl>
+                                              <p:pRg st="0" end="0"/>
+                                            </p:txEl>
+                                          </p:spTgt>
+                                        </p:tgtEl>
+                                      </p:cBhvr>
+                                    </p:animEffect>
+                                  </p:childTnLst>
+                                </p:cTn>
+                              </p:par>
+                            </p:childTnLst>
+                          </p:cTn>
+                        </p:par>
+                      </p:childTnLst>
+                    </p:cTn>
+                  </p:par>
+                  <p:par>
+                    <p:cTn id="18" fill="hold">
+                      <p:stCondLst>
+                        <p:cond delay="indefinite"/>
+                      </p:stCondLst>
+                      <p:childTnLst>
+                        <p:par>
+                          <p:cTn id="19" fill="hold">
+                            <p:stCondLst>
+                              <p:cond delay="0"/>
+                            </p:stCondLst>
+                            <p:childTnLst>
+                              <p:par>
+                                <p:cTn id="20" presetID="10" presetClass="entr" presetSubtype="0" fill="hold" grpId="0" nodeType="clickEffect">
+                                  <p:stCondLst>
+                                    <p:cond delay="0"/>
+                                  </p:stCondLst>
+                                  <p:childTnLst>
+                                    <p:set>
+                                      <p:cBhvr>
+                                        <p:cTn id="21" dur="1" fill="hold">
+                                          <p:stCondLst>
+                                            <p:cond delay="0"/>
+                                          </p:stCondLst>
+                                        </p:cTn>
+                                        <p:tgtEl>
+                                          <p:spTgt spid="10">
+                                            <p:txEl>
+                                              <p:pRg st="0" end="0"/>
+                                            </p:txEl>
+                                          </p:spTgt>
+                                        </p:tgtEl>
+                                        <p:attrNameLst>
+                                          <p:attrName>style.visibility</p:attrName>
+                                        </p:attrNameLst>
+                                      </p:cBhvr>
+                                      <p:to>
+                                        <p:strVal val="visible"/>
+                                      </p:to>
+                                    </p:set>
+                                    <p:animEffect transition="in" filter="fade">
+                                      <p:cBhvr>
+                                        <p:cTn id="22" dur="500"/>
+                                        <p:tgtEl>
+                                          <p:spTgt spid="10">
+                                            <p:txEl>
+                                              <p:pRg st="0" end="0"/>
+                                            </p:txEl>
+                                          </p:spTgt>
+                                        </p:tgtEl>
+                                      </p:cBhvr>
+                                    </p:animEffect>
+                                  </p:childTnLst>
+                                </p:cTn>
+                              </p:par>
+                            </p:childTnLst>
+                          </p:cTn>
+                        </p:par>
+                      </p:childTnLst>
+                    </p:cTn>
+                  </p:par>
+                </p:childTnLst>
+              </p:cTn>
+              <p:prevCondLst>
+                <p:cond evt="onPrev" delay="0">
+                  <p:tgtEl>
+                    <p:sldTgt/>
+                  </p:tgtEl>
+                </p:cond>
+              </p:prevCondLst>
+              <p:nextCondLst>
+                <p:cond evt="onNext" delay="0">
+                  <p:tgtEl>
+                    <p:sldTgt/>
+                  </p:tgtEl>
+                </p:cond>
+              </p:nextCondLst>
+            </p:seq>
+          </p:childTnLst>
+        </p:cTn>
       </p:par>
     </p:tnLst>
+    <p:bldLst>
+      <p:bldP spid="7" grpId="0" build="p"/>
+      <p:bldP spid="8" grpId="0" build="p"/>
+      <p:bldP spid="9" grpId="0" build="p"/>
+      <p:bldP spid="10" grpId="0" build="p"/>
+    </p:bldLst>
   </p:timing>
 </p:sld>
 </file>
@@ -15527,48 +17091,9 @@
           <a:lstStyle/>
           <a:p>
             <a:r>
-              <a:rPr lang="de-DE" dirty="0" err="1" smtClean="0"/>
-              <a:t>Organizational</a:t>
-            </a:r>
-            <a:r>
-              <a:rPr lang="de-DE" dirty="0" smtClean="0"/>
-              <a:t> </a:t>
-            </a:r>
-            <a:r>
-              <a:rPr lang="de-DE" dirty="0" err="1" smtClean="0"/>
-              <a:t>Challenges</a:t>
-            </a:r>
-            <a:endParaRPr lang="de-DE" dirty="0"/>
-          </a:p>
-        </p:txBody>
-      </p:sp>
-      <p:sp>
-        <p:nvSpPr>
-          <p:cNvPr id="3" name="Content Placeholder 2"/>
-          <p:cNvSpPr>
-            <a:spLocks noGrp="1"/>
-          </p:cNvSpPr>
-          <p:nvPr>
-            <p:ph idx="1"/>
-          </p:nvPr>
-        </p:nvSpPr>
-        <p:spPr>
-          <a:xfrm>
-            <a:off x="838200" y="1266405"/>
-            <a:ext cx="10148637" cy="4351338"/>
-          </a:xfrm>
-        </p:spPr>
-        <p:txBody>
-          <a:bodyPr/>
-          <a:lstStyle/>
-          <a:p>
-            <a:r>
-              <a:rPr lang="en-US" dirty="0"/>
-              <a:t>Introducing new tools and methodologies in the organization</a:t>
-            </a:r>
-          </a:p>
-          <a:p>
-            <a:endParaRPr lang="de-DE" dirty="0"/>
+              <a:rPr lang="en-US"/>
+              <a:t>Challenge: Changing the Organization</a:t>
+            </a:r>
           </a:p>
         </p:txBody>
       </p:sp>
@@ -15633,8 +17158,8 @@
         </p:blipFill>
         <p:spPr>
           <a:xfrm>
-            <a:off x="2307306" y="2394882"/>
-            <a:ext cx="7210423" cy="3605212"/>
+            <a:off x="1957984" y="1675690"/>
+            <a:ext cx="8007948" cy="4003975"/>
           </a:xfrm>
           <a:prstGeom prst="rect">
             <a:avLst/>
@@ -15651,13 +17176,6 @@
   <p:clrMapOvr>
     <a:masterClrMapping/>
   </p:clrMapOvr>
-  <p:timing>
-    <p:tnLst>
-      <p:par>
-        <p:cTn id="1" dur="indefinite" restart="never" nodeType="tmRoot"/>
-      </p:par>
-    </p:tnLst>
-  </p:timing>
 </p:sld>
 </file>
 
@@ -15726,7 +17244,7 @@
           <p:nvPr/>
         </p:nvPicPr>
         <p:blipFill>
-          <a:blip r:embed="rId2" cstate="print">
+          <a:blip r:embed="rId3" cstate="print">
             <a:extLst>
               <a:ext uri="{28A0092B-C50C-407E-A947-70E740481C1C}">
                 <a14:useLocalDpi xmlns:a14="http://schemas.microsoft.com/office/drawing/2010/main" val="0"/>
@@ -15779,10 +17297,9 @@
           <a:lstStyle/>
           <a:p>
             <a:r>
-              <a:rPr lang="en-US" dirty="0" smtClean="0"/>
+              <a:rPr lang="en-US" dirty="0"/>
               <a:t>Contact</a:t>
             </a:r>
-            <a:endParaRPr lang="en-US" dirty="0"/>
           </a:p>
         </p:txBody>
       </p:sp>
@@ -15796,13 +17313,6 @@
   <p:clrMapOvr>
     <a:masterClrMapping/>
   </p:clrMapOvr>
-  <p:timing>
-    <p:tnLst>
-      <p:par>
-        <p:cTn id="1" dur="indefinite" restart="never" nodeType="tmRoot"/>
-      </p:par>
-    </p:tnLst>
-  </p:timing>
 </p:sld>
 </file>
 

</xml_diff>

<commit_message>
font size correction slide 2
</commit_message>
<xml_diff>
--- a/Challenges_at_Marquardt.pptx
+++ b/Challenges_at_Marquardt.pptx
@@ -205,7 +205,7 @@
           <a:p>
             <a:fld id="{BF03CDB5-E06A-44D8-95AE-B90958F409FC}" type="datetimeFigureOut">
               <a:rPr lang="en-US" smtClean="0"/>
-              <a:t>8/26/2023</a:t>
+              <a:t>8/29/2023</a:t>
             </a:fld>
             <a:endParaRPr lang="en-US"/>
           </a:p>
@@ -2600,7 +2600,7 @@
             </a:pPr>
             <a:fld id="{5A041D07-D634-42E1-A207-F238794E15C1}" type="datetime1">
               <a:rPr lang="de-DE" smtClean="0"/>
-              <a:t>26.08.2023</a:t>
+              <a:t>29.08.2023</a:t>
             </a:fld>
             <a:r>
               <a:rPr lang="de-DE"/>
@@ -3113,7 +3113,7 @@
             </a:pPr>
             <a:fld id="{F0673D75-DA8D-43FF-B525-D907D1F7F66A}" type="datetime1">
               <a:rPr lang="de-DE" smtClean="0"/>
-              <a:t>26.08.2023</a:t>
+              <a:t>29.08.2023</a:t>
             </a:fld>
             <a:r>
               <a:rPr lang="de-DE"/>
@@ -3405,7 +3405,7 @@
             </a:pPr>
             <a:fld id="{DBD5DA68-7E84-4C0E-854E-B0F2B8DCA9D2}" type="datetime1">
               <a:rPr lang="de-DE" smtClean="0"/>
-              <a:t>26.08.2023</a:t>
+              <a:t>29.08.2023</a:t>
             </a:fld>
             <a:r>
               <a:rPr lang="de-DE"/>
@@ -3677,7 +3677,7 @@
             </a:pPr>
             <a:fld id="{147A2559-3B61-4F5F-A7EF-5560E7D1A675}" type="datetime1">
               <a:rPr lang="de-DE" smtClean="0"/>
-              <a:t>26.08.2023</a:t>
+              <a:t>29.08.2023</a:t>
             </a:fld>
             <a:r>
               <a:rPr lang="de-DE"/>
@@ -3911,7 +3911,7 @@
             </a:pPr>
             <a:fld id="{755FB5E2-7FE3-4C1C-A546-197204CCDA16}" type="datetime1">
               <a:rPr lang="de-DE" smtClean="0"/>
-              <a:t>26.08.2023</a:t>
+              <a:t>29.08.2023</a:t>
             </a:fld>
             <a:r>
               <a:rPr lang="de-DE"/>
@@ -4145,7 +4145,7 @@
             </a:pPr>
             <a:fld id="{81CCD47A-0074-44BC-8734-BF6EAC998E36}" type="datetime1">
               <a:rPr lang="de-DE" smtClean="0"/>
-              <a:t>26.08.2023</a:t>
+              <a:t>29.08.2023</a:t>
             </a:fld>
             <a:r>
               <a:rPr lang="de-DE"/>
@@ -4871,7 +4871,7 @@
             </a:pPr>
             <a:fld id="{5574D11F-C905-4175-8B64-CB517D2FB7C3}" type="datetime1">
               <a:rPr lang="de-DE" smtClean="0"/>
-              <a:t>26.08.2023</a:t>
+              <a:t>29.08.2023</a:t>
             </a:fld>
             <a:r>
               <a:rPr lang="de-DE"/>
@@ -5182,7 +5182,7 @@
             </a:pPr>
             <a:fld id="{D77CFE8E-984B-4302-B359-2ECB5119A227}" type="datetime1">
               <a:rPr lang="de-DE" smtClean="0"/>
-              <a:t>26.08.2023</a:t>
+              <a:t>29.08.2023</a:t>
             </a:fld>
             <a:r>
               <a:rPr lang="de-DE"/>
@@ -5455,7 +5455,7 @@
             </a:pPr>
             <a:fld id="{D56584F4-F398-4738-AD99-6398DC9DD831}" type="datetime1">
               <a:rPr lang="de-DE" smtClean="0"/>
-              <a:t>26.08.2023</a:t>
+              <a:t>29.08.2023</a:t>
             </a:fld>
             <a:r>
               <a:rPr lang="de-DE"/>
@@ -5871,7 +5871,7 @@
             </a:pPr>
             <a:fld id="{14732845-90F0-42CE-90DD-E35022D3F8C6}" type="datetime1">
               <a:rPr lang="de-DE" smtClean="0"/>
-              <a:t>26.08.2023</a:t>
+              <a:t>29.08.2023</a:t>
             </a:fld>
             <a:r>
               <a:rPr lang="de-DE"/>
@@ -6344,7 +6344,7 @@
             </a:pPr>
             <a:fld id="{73CC5BAB-03BE-45F4-B994-C5CD24A5BCC0}" type="datetime1">
               <a:rPr lang="de-DE" smtClean="0"/>
-              <a:t>26.08.2023</a:t>
+              <a:t>29.08.2023</a:t>
             </a:fld>
             <a:r>
               <a:rPr lang="de-DE"/>
@@ -6779,7 +6779,7 @@
             </a:pPr>
             <a:fld id="{EA2A0BDB-93C2-444F-A0BA-FEEB5088E33B}" type="datetime1">
               <a:rPr lang="de-DE" smtClean="0"/>
-              <a:t>26.08.2023</a:t>
+              <a:t>29.08.2023</a:t>
             </a:fld>
             <a:r>
               <a:rPr lang="de-DE"/>
@@ -6951,7 +6951,7 @@
             </a:pPr>
             <a:fld id="{9B661170-952C-4BD8-AFEA-42DFE43A999C}" type="datetime1">
               <a:rPr lang="de-DE" smtClean="0"/>
-              <a:t>26.08.2023</a:t>
+              <a:t>29.08.2023</a:t>
             </a:fld>
             <a:r>
               <a:rPr lang="de-DE"/>
@@ -7228,7 +7228,7 @@
             </a:pPr>
             <a:fld id="{76ABF5BD-B635-4C99-9CCA-A9340BB4110B}" type="datetime1">
               <a:rPr lang="de-DE" smtClean="0"/>
-              <a:t>26.08.2023</a:t>
+              <a:t>29.08.2023</a:t>
             </a:fld>
             <a:r>
               <a:rPr lang="de-DE"/>
@@ -7392,7 +7392,7 @@
             </a:pPr>
             <a:fld id="{73ED40B3-2315-470F-9E4B-3DD2B716DE09}" type="datetime1">
               <a:rPr lang="de-DE" smtClean="0"/>
-              <a:t>26.08.2023</a:t>
+              <a:t>29.08.2023</a:t>
             </a:fld>
             <a:r>
               <a:rPr lang="de-DE"/>
@@ -11042,7 +11042,7 @@
             </a:pPr>
             <a:fld id="{DC230993-0427-44C9-AB1D-56E4037C0994}" type="datetime1">
               <a:rPr lang="de-DE" smtClean="0"/>
-              <a:t>26.08.2023</a:t>
+              <a:t>29.08.2023</a:t>
             </a:fld>
             <a:r>
               <a:rPr lang="de-DE"/>
@@ -12323,10 +12323,10 @@
         </p:nvGrpSpPr>
         <p:grpSpPr>
           <a:xfrm>
-            <a:off x="1233484" y="2266491"/>
-            <a:ext cx="9417336" cy="4226384"/>
-            <a:chOff x="680821" y="1260016"/>
-            <a:chExt cx="10564294" cy="5041169"/>
+            <a:off x="1141584" y="2266491"/>
+            <a:ext cx="9509236" cy="4226384"/>
+            <a:chOff x="577729" y="1260016"/>
+            <a:chExt cx="10667386" cy="5041169"/>
           </a:xfrm>
         </p:grpSpPr>
         <p:sp>
@@ -12339,8 +12339,8 @@
           </p:nvSpPr>
           <p:spPr>
             <a:xfrm>
-              <a:off x="680821" y="3099292"/>
-              <a:ext cx="2923459" cy="319665"/>
+              <a:off x="577729" y="3099292"/>
+              <a:ext cx="3069738" cy="319665"/>
             </a:xfrm>
             <a:prstGeom prst="rect">
               <a:avLst/>
@@ -12348,7 +12348,7 @@
           </p:spPr>
           <p:txBody>
             <a:bodyPr vert="horz" lIns="91440" tIns="45720" rIns="91440" bIns="45720" rtlCol="0">
-              <a:normAutofit fontScale="92500" lnSpcReduction="10000"/>
+              <a:noAutofit/>
             </a:bodyPr>
             <a:lstStyle>
               <a:lvl1pPr marL="228600" indent="-228600" algn="l" defTabSz="914400" rtl="0" eaLnBrk="1" latinLnBrk="0" hangingPunct="1">
@@ -12520,7 +12520,7 @@
                 <a:buNone/>
               </a:pPr>
               <a:r>
-                <a:rPr lang="en-US" sz="1400" dirty="0">
+                <a:rPr lang="en-US" sz="1600" dirty="0">
                   <a:solidFill>
                     <a:schemeClr val="tx2"/>
                   </a:solidFill>
@@ -14078,6 +14078,13 @@
   <p:clrMapOvr>
     <a:masterClrMapping/>
   </p:clrMapOvr>
+  <p:timing>
+    <p:tnLst>
+      <p:par>
+        <p:cTn id="1" dur="indefinite" restart="never" nodeType="tmRoot"/>
+      </p:par>
+    </p:tnLst>
+  </p:timing>
 </p:sld>
 </file>
 

</xml_diff>